<commit_message>
Mise à jour suite à mise en place présentation
</commit_message>
<xml_diff>
--- a/P7/Presentation_p7.pptx
+++ b/P7/Presentation_p7.pptx
@@ -5,7 +5,7 @@
     <p:sldMasterId id="2147483648" r:id="rId1"/>
   </p:sldMasterIdLst>
   <p:notesMasterIdLst>
-    <p:notesMasterId r:id="rId32"/>
+    <p:notesMasterId r:id="rId34"/>
   </p:notesMasterIdLst>
   <p:sldIdLst>
     <p:sldId id="256" r:id="rId2"/>
@@ -16,28 +16,30 @@
     <p:sldId id="286" r:id="rId7"/>
     <p:sldId id="287" r:id="rId8"/>
     <p:sldId id="298" r:id="rId9"/>
-    <p:sldId id="302" r:id="rId10"/>
-    <p:sldId id="299" r:id="rId11"/>
-    <p:sldId id="305" r:id="rId12"/>
-    <p:sldId id="304" r:id="rId13"/>
-    <p:sldId id="301" r:id="rId14"/>
-    <p:sldId id="303" r:id="rId15"/>
-    <p:sldId id="306" r:id="rId16"/>
-    <p:sldId id="288" r:id="rId17"/>
-    <p:sldId id="289" r:id="rId18"/>
-    <p:sldId id="290" r:id="rId19"/>
-    <p:sldId id="291" r:id="rId20"/>
-    <p:sldId id="292" r:id="rId21"/>
-    <p:sldId id="296" r:id="rId22"/>
-    <p:sldId id="297" r:id="rId23"/>
-    <p:sldId id="307" r:id="rId24"/>
-    <p:sldId id="281" r:id="rId25"/>
-    <p:sldId id="282" r:id="rId26"/>
-    <p:sldId id="293" r:id="rId27"/>
-    <p:sldId id="294" r:id="rId28"/>
-    <p:sldId id="295" r:id="rId29"/>
-    <p:sldId id="283" r:id="rId30"/>
-    <p:sldId id="263" r:id="rId31"/>
+    <p:sldId id="308" r:id="rId10"/>
+    <p:sldId id="302" r:id="rId11"/>
+    <p:sldId id="299" r:id="rId12"/>
+    <p:sldId id="305" r:id="rId13"/>
+    <p:sldId id="304" r:id="rId14"/>
+    <p:sldId id="301" r:id="rId15"/>
+    <p:sldId id="303" r:id="rId16"/>
+    <p:sldId id="306" r:id="rId17"/>
+    <p:sldId id="309" r:id="rId18"/>
+    <p:sldId id="288" r:id="rId19"/>
+    <p:sldId id="289" r:id="rId20"/>
+    <p:sldId id="290" r:id="rId21"/>
+    <p:sldId id="291" r:id="rId22"/>
+    <p:sldId id="292" r:id="rId23"/>
+    <p:sldId id="296" r:id="rId24"/>
+    <p:sldId id="297" r:id="rId25"/>
+    <p:sldId id="307" r:id="rId26"/>
+    <p:sldId id="281" r:id="rId27"/>
+    <p:sldId id="282" r:id="rId28"/>
+    <p:sldId id="293" r:id="rId29"/>
+    <p:sldId id="294" r:id="rId30"/>
+    <p:sldId id="295" r:id="rId31"/>
+    <p:sldId id="283" r:id="rId32"/>
+    <p:sldId id="263" r:id="rId33"/>
   </p:sldIdLst>
   <p:sldSz cx="9144000" cy="6858000" type="screen4x3"/>
   <p:notesSz cx="6858000" cy="9144000"/>
@@ -221,7 +223,7 @@
           <a:p>
             <a:fld id="{E66492E5-39EF-4EC5-9E99-7F0DBC26806B}" type="datetimeFigureOut">
               <a:rPr lang="fr-FR" smtClean="0"/>
-              <a:t>15/01/2018</a:t>
+              <a:t>18/01/2018</a:t>
             </a:fld>
             <a:endParaRPr lang="fr-FR"/>
           </a:p>
@@ -754,7 +756,7 @@
           <a:p>
             <a:fld id="{2A35F02A-33DF-42A4-9F54-2DFA5B84052E}" type="datetime1">
               <a:rPr lang="fr-FR" smtClean="0"/>
-              <a:t>15/01/2018</a:t>
+              <a:t>18/01/2018</a:t>
             </a:fld>
             <a:endParaRPr lang="fr-FR"/>
           </a:p>
@@ -928,7 +930,7 @@
           <a:p>
             <a:fld id="{AA7084F6-C923-4306-BC74-6AA1A26D5992}" type="datetime1">
               <a:rPr lang="fr-FR" smtClean="0"/>
-              <a:t>15/01/2018</a:t>
+              <a:t>18/01/2018</a:t>
             </a:fld>
             <a:endParaRPr lang="fr-FR"/>
           </a:p>
@@ -1112,7 +1114,7 @@
           <a:p>
             <a:fld id="{6B9DA1C8-56AA-40E0-92DC-CCF13B41CFF7}" type="datetime1">
               <a:rPr lang="fr-FR" smtClean="0"/>
-              <a:t>15/01/2018</a:t>
+              <a:t>18/01/2018</a:t>
             </a:fld>
             <a:endParaRPr lang="fr-FR"/>
           </a:p>
@@ -1286,7 +1288,7 @@
           <a:p>
             <a:fld id="{30547005-2CCE-4AAF-810C-C33FB4661996}" type="datetime1">
               <a:rPr lang="fr-FR" smtClean="0"/>
-              <a:t>15/01/2018</a:t>
+              <a:t>18/01/2018</a:t>
             </a:fld>
             <a:endParaRPr lang="fr-FR"/>
           </a:p>
@@ -1536,7 +1538,7 @@
           <a:p>
             <a:fld id="{3EBD0647-CE4F-4B82-BC14-997434234D2E}" type="datetime1">
               <a:rPr lang="fr-FR" smtClean="0"/>
-              <a:t>15/01/2018</a:t>
+              <a:t>18/01/2018</a:t>
             </a:fld>
             <a:endParaRPr lang="fr-FR"/>
           </a:p>
@@ -1828,7 +1830,7 @@
           <a:p>
             <a:fld id="{263CA1C6-1D15-44B1-8495-DE2EC5425D2F}" type="datetime1">
               <a:rPr lang="fr-FR" smtClean="0"/>
-              <a:t>15/01/2018</a:t>
+              <a:t>18/01/2018</a:t>
             </a:fld>
             <a:endParaRPr lang="fr-FR"/>
           </a:p>
@@ -2254,7 +2256,7 @@
           <a:p>
             <a:fld id="{5F86B07A-1301-4558-A6E0-D7A436826ECB}" type="datetime1">
               <a:rPr lang="fr-FR" smtClean="0"/>
-              <a:t>15/01/2018</a:t>
+              <a:t>18/01/2018</a:t>
             </a:fld>
             <a:endParaRPr lang="fr-FR"/>
           </a:p>
@@ -2376,7 +2378,7 @@
           <a:p>
             <a:fld id="{10CD6315-9A1E-41E9-BC28-33D394163B67}" type="datetime1">
               <a:rPr lang="fr-FR" smtClean="0"/>
-              <a:t>15/01/2018</a:t>
+              <a:t>18/01/2018</a:t>
             </a:fld>
             <a:endParaRPr lang="fr-FR"/>
           </a:p>
@@ -2475,7 +2477,7 @@
           <a:p>
             <a:fld id="{8EA7A85C-1960-4CA0-B72B-A39E81C20158}" type="datetime1">
               <a:rPr lang="fr-FR" smtClean="0"/>
-              <a:t>15/01/2018</a:t>
+              <a:t>18/01/2018</a:t>
             </a:fld>
             <a:endParaRPr lang="fr-FR"/>
           </a:p>
@@ -2756,7 +2758,7 @@
           <a:p>
             <a:fld id="{885A14C0-C539-4FC5-A6ED-ABABD975303B}" type="datetime1">
               <a:rPr lang="fr-FR" smtClean="0"/>
-              <a:t>15/01/2018</a:t>
+              <a:t>18/01/2018</a:t>
             </a:fld>
             <a:endParaRPr lang="fr-FR"/>
           </a:p>
@@ -3013,7 +3015,7 @@
           <a:p>
             <a:fld id="{D772F3C9-8121-4DF6-9420-FBC4A08EF57A}" type="datetime1">
               <a:rPr lang="fr-FR" smtClean="0"/>
-              <a:t>15/01/2018</a:t>
+              <a:t>18/01/2018</a:t>
             </a:fld>
             <a:endParaRPr lang="fr-FR"/>
           </a:p>
@@ -3251,7 +3253,7 @@
           <a:p>
             <a:fld id="{C13329EF-B01B-4D4B-83A1-AFBB7696C373}" type="datetime1">
               <a:rPr lang="fr-FR" smtClean="0"/>
-              <a:t>15/01/2018</a:t>
+              <a:t>18/01/2018</a:t>
             </a:fld>
             <a:endParaRPr lang="fr-FR"/>
           </a:p>
@@ -3748,7 +3750,7 @@
                   <a:srgbClr val="95023C"/>
                 </a:solidFill>
               </a:rPr>
-              <a:t>15/01/2018</a:t>
+              <a:t>18/01/2018</a:t>
             </a:fld>
             <a:endParaRPr lang="fr-FR" dirty="0">
               <a:solidFill>
@@ -4002,6 +4004,309 @@
           <a:lstStyle/>
           <a:p>
             <a:r>
+              <a:rPr lang="fr-FR" dirty="0" err="1" smtClean="0">
+                <a:solidFill>
+                  <a:srgbClr val="E8750C"/>
+                </a:solidFill>
+              </a:rPr>
+              <a:t>Clustering</a:t>
+            </a:r>
+            <a:r>
+              <a:rPr lang="fr-FR" dirty="0" smtClean="0">
+                <a:solidFill>
+                  <a:srgbClr val="E8750C"/>
+                </a:solidFill>
+              </a:rPr>
+              <a:t> (pas de </a:t>
+            </a:r>
+            <a:r>
+              <a:rPr lang="fr-FR" dirty="0" err="1" smtClean="0">
+                <a:solidFill>
+                  <a:srgbClr val="E8750C"/>
+                </a:solidFill>
+              </a:rPr>
+              <a:t>scaling</a:t>
+            </a:r>
+            <a:r>
+              <a:rPr lang="fr-FR" dirty="0" smtClean="0">
+                <a:solidFill>
+                  <a:srgbClr val="E8750C"/>
+                </a:solidFill>
+              </a:rPr>
+              <a:t>)</a:t>
+            </a:r>
+          </a:p>
+          <a:p>
+            <a:pPr lvl="1"/>
+            <a:r>
+              <a:rPr lang="fr-FR" dirty="0" smtClean="0">
+                <a:solidFill>
+                  <a:srgbClr val="E8750C"/>
+                </a:solidFill>
+              </a:rPr>
+              <a:t>Env. </a:t>
+            </a:r>
+            <a:r>
+              <a:rPr lang="fr-FR" dirty="0" smtClean="0">
+                <a:solidFill>
+                  <a:srgbClr val="E8750C"/>
+                </a:solidFill>
+              </a:rPr>
+              <a:t>1k features / images</a:t>
+            </a:r>
+          </a:p>
+          <a:p>
+            <a:pPr lvl="1"/>
+            <a:r>
+              <a:rPr lang="fr-FR" dirty="0" smtClean="0">
+                <a:solidFill>
+                  <a:srgbClr val="E8750C"/>
+                </a:solidFill>
+              </a:rPr>
+              <a:t>Sélection :100 Clusters</a:t>
+            </a:r>
+          </a:p>
+          <a:p>
+            <a:pPr lvl="1"/>
+            <a:r>
+              <a:rPr lang="fr-FR" dirty="0" smtClean="0">
+                <a:solidFill>
+                  <a:srgbClr val="E8750C"/>
+                </a:solidFill>
+              </a:rPr>
+              <a:t>Optimal : 27 Clusters</a:t>
+            </a:r>
+          </a:p>
+        </p:txBody>
+      </p:sp>
+      <p:sp>
+        <p:nvSpPr>
+          <p:cNvPr id="4" name="Espace réservé de la date 3"/>
+          <p:cNvSpPr>
+            <a:spLocks noGrp="1"/>
+          </p:cNvSpPr>
+          <p:nvPr>
+            <p:ph type="dt" sz="half" idx="10"/>
+          </p:nvPr>
+        </p:nvSpPr>
+        <p:spPr/>
+        <p:txBody>
+          <a:bodyPr/>
+          <a:lstStyle/>
+          <a:p>
+            <a:fld id="{30547005-2CCE-4AAF-810C-C33FB4661996}" type="datetime1">
+              <a:rPr lang="fr-FR" smtClean="0"/>
+              <a:t>18/01/2018</a:t>
+            </a:fld>
+            <a:endParaRPr lang="fr-FR"/>
+          </a:p>
+        </p:txBody>
+      </p:sp>
+      <p:sp>
+        <p:nvSpPr>
+          <p:cNvPr id="5" name="Espace réservé du pied de page 4"/>
+          <p:cNvSpPr>
+            <a:spLocks noGrp="1"/>
+          </p:cNvSpPr>
+          <p:nvPr>
+            <p:ph type="ftr" sz="quarter" idx="11"/>
+          </p:nvPr>
+        </p:nvSpPr>
+        <p:spPr/>
+        <p:txBody>
+          <a:bodyPr/>
+          <a:lstStyle/>
+          <a:p>
+            <a:r>
+              <a:rPr lang="fr-FR" dirty="0" smtClean="0"/>
+              <a:t>MINE Nicolas</a:t>
+            </a:r>
+            <a:endParaRPr lang="fr-FR" dirty="0"/>
+          </a:p>
+        </p:txBody>
+      </p:sp>
+      <p:pic>
+        <p:nvPicPr>
+          <p:cNvPr id="3074" name="Picture 2" descr="F:\Nicolas\Documents\OpenClassRoom\P7\img\silhouette.png"/>
+          <p:cNvPicPr>
+            <a:picLocks noChangeAspect="1" noChangeArrowheads="1"/>
+          </p:cNvPicPr>
+          <p:nvPr/>
+        </p:nvPicPr>
+        <p:blipFill>
+          <a:blip r:embed="rId2" cstate="print">
+            <a:clrChange>
+              <a:clrFrom>
+                <a:srgbClr val="FFFFFF"/>
+              </a:clrFrom>
+              <a:clrTo>
+                <a:srgbClr val="FFFFFF">
+                  <a:alpha val="0"/>
+                </a:srgbClr>
+              </a:clrTo>
+            </a:clrChange>
+            <a:extLst>
+              <a:ext uri="{28A0092B-C50C-407E-A947-70E740481C1C}">
+                <a14:useLocalDpi xmlns:a14="http://schemas.microsoft.com/office/drawing/2010/main" val="0"/>
+              </a:ext>
+            </a:extLst>
+          </a:blip>
+          <a:srcRect/>
+          <a:stretch>
+            <a:fillRect/>
+          </a:stretch>
+        </p:blipFill>
+        <p:spPr bwMode="auto">
+          <a:xfrm>
+            <a:off x="-324543" y="3472205"/>
+            <a:ext cx="5328592" cy="3197155"/>
+          </a:xfrm>
+          <a:prstGeom prst="rect">
+            <a:avLst/>
+          </a:prstGeom>
+          <a:noFill/>
+          <a:extLst>
+            <a:ext uri="{909E8E84-426E-40DD-AFC4-6F175D3DCCD1}">
+              <a14:hiddenFill xmlns:a14="http://schemas.microsoft.com/office/drawing/2010/main">
+                <a:solidFill>
+                  <a:srgbClr val="FFFFFF"/>
+                </a:solidFill>
+              </a14:hiddenFill>
+            </a:ext>
+          </a:extLst>
+        </p:spPr>
+      </p:pic>
+      <p:pic>
+        <p:nvPicPr>
+          <p:cNvPr id="3075" name="Picture 3" descr="F:\Nicolas\Documents\OpenClassRoom\P7\img\elbow.png"/>
+          <p:cNvPicPr>
+            <a:picLocks noChangeAspect="1" noChangeArrowheads="1"/>
+          </p:cNvPicPr>
+          <p:nvPr/>
+        </p:nvPicPr>
+        <p:blipFill>
+          <a:blip r:embed="rId3" cstate="print">
+            <a:clrChange>
+              <a:clrFrom>
+                <a:srgbClr val="FFFFFF"/>
+              </a:clrFrom>
+              <a:clrTo>
+                <a:srgbClr val="FFFFFF">
+                  <a:alpha val="0"/>
+                </a:srgbClr>
+              </a:clrTo>
+            </a:clrChange>
+            <a:extLst>
+              <a:ext uri="{28A0092B-C50C-407E-A947-70E740481C1C}">
+                <a14:useLocalDpi xmlns:a14="http://schemas.microsoft.com/office/drawing/2010/main" val="0"/>
+              </a:ext>
+            </a:extLst>
+          </a:blip>
+          <a:srcRect/>
+          <a:stretch>
+            <a:fillRect/>
+          </a:stretch>
+        </p:blipFill>
+        <p:spPr bwMode="auto">
+          <a:xfrm>
+            <a:off x="4139952" y="3472205"/>
+            <a:ext cx="5328592" cy="3197155"/>
+          </a:xfrm>
+          <a:prstGeom prst="rect">
+            <a:avLst/>
+          </a:prstGeom>
+          <a:noFill/>
+          <a:extLst>
+            <a:ext uri="{909E8E84-426E-40DD-AFC4-6F175D3DCCD1}">
+              <a14:hiddenFill xmlns:a14="http://schemas.microsoft.com/office/drawing/2010/main">
+                <a:solidFill>
+                  <a:srgbClr val="FFFFFF"/>
+                </a:solidFill>
+              </a14:hiddenFill>
+            </a:ext>
+          </a:extLst>
+        </p:spPr>
+      </p:pic>
+    </p:spTree>
+    <p:extLst>
+      <p:ext uri="{BB962C8B-B14F-4D97-AF65-F5344CB8AC3E}">
+        <p14:creationId xmlns:p14="http://schemas.microsoft.com/office/powerpoint/2010/main" val="3609989512"/>
+      </p:ext>
+    </p:extLst>
+  </p:cSld>
+  <p:clrMapOvr>
+    <a:masterClrMapping/>
+  </p:clrMapOvr>
+  <p:timing>
+    <p:tnLst>
+      <p:par>
+        <p:cTn id="1" dur="indefinite" restart="never" nodeType="tmRoot"/>
+      </p:par>
+    </p:tnLst>
+  </p:timing>
+</p:sld>
+</file>
+
+<file path=ppt/slides/slide11.xml><?xml version="1.0" encoding="utf-8"?>
+<p:sld xmlns:a="http://schemas.openxmlformats.org/drawingml/2006/main" xmlns:r="http://schemas.openxmlformats.org/officeDocument/2006/relationships" xmlns:p="http://schemas.openxmlformats.org/presentationml/2006/main">
+  <p:cSld>
+    <p:spTree>
+      <p:nvGrpSpPr>
+        <p:cNvPr id="1" name=""/>
+        <p:cNvGrpSpPr/>
+        <p:nvPr/>
+      </p:nvGrpSpPr>
+      <p:grpSpPr>
+        <a:xfrm>
+          <a:off x="0" y="0"/>
+          <a:ext cx="0" cy="0"/>
+          <a:chOff x="0" y="0"/>
+          <a:chExt cx="0" cy="0"/>
+        </a:xfrm>
+      </p:grpSpPr>
+      <p:sp>
+        <p:nvSpPr>
+          <p:cNvPr id="2" name="Titre 1"/>
+          <p:cNvSpPr>
+            <a:spLocks noGrp="1"/>
+          </p:cNvSpPr>
+          <p:nvPr>
+            <p:ph type="title"/>
+          </p:nvPr>
+        </p:nvSpPr>
+        <p:spPr/>
+        <p:txBody>
+          <a:bodyPr>
+            <a:normAutofit/>
+          </a:bodyPr>
+          <a:lstStyle/>
+          <a:p>
+            <a:r>
+              <a:rPr lang="fr-FR" dirty="0" smtClean="0"/>
+              <a:t>Modèle Classique</a:t>
+            </a:r>
+            <a:endParaRPr lang="fr-FR" dirty="0"/>
+          </a:p>
+        </p:txBody>
+      </p:sp>
+      <p:sp>
+        <p:nvSpPr>
+          <p:cNvPr id="3" name="Espace réservé du contenu 2"/>
+          <p:cNvSpPr>
+            <a:spLocks noGrp="1"/>
+          </p:cNvSpPr>
+          <p:nvPr>
+            <p:ph idx="1"/>
+          </p:nvPr>
+        </p:nvSpPr>
+        <p:spPr/>
+        <p:txBody>
+          <a:bodyPr>
+            <a:normAutofit/>
+          </a:bodyPr>
+          <a:lstStyle/>
+          <a:p>
+            <a:r>
               <a:rPr lang="fr-FR" dirty="0">
                 <a:solidFill>
                   <a:srgbClr val="E8750C"/>
@@ -4018,26 +4323,15 @@
                   <a:srgbClr val="E8750C"/>
                 </a:solidFill>
               </a:rPr>
-              <a:t>Conversion HSV</a:t>
-            </a:r>
-          </a:p>
-          <a:p>
-            <a:pPr lvl="1"/>
-            <a:r>
-              <a:rPr lang="fr-FR" dirty="0">
-                <a:solidFill>
-                  <a:srgbClr val="E8750C"/>
-                </a:solidFill>
-              </a:rPr>
-              <a:t>Histogramme </a:t>
-            </a:r>
-            <a:r>
-              <a:rPr lang="fr-FR" dirty="0" smtClean="0">
-                <a:solidFill>
-                  <a:srgbClr val="E8750C"/>
-                </a:solidFill>
-              </a:rPr>
-              <a:t>Hue/Saturation</a:t>
+              <a:t>Conversion </a:t>
+            </a:r>
+            <a:r>
+              <a:rPr lang="fr-FR" dirty="0" smtClean="0">
+                <a:solidFill>
+                  <a:srgbClr val="E8750C"/>
+                </a:solidFill>
+              </a:rPr>
+              <a:t>RGB à HSV</a:t>
             </a:r>
             <a:endParaRPr lang="fr-FR" dirty="0">
               <a:solidFill>
@@ -4048,23 +4342,20 @@
           <a:p>
             <a:pPr lvl="1"/>
             <a:r>
-              <a:rPr lang="fr-FR" dirty="0" smtClean="0">
-                <a:solidFill>
-                  <a:srgbClr val="E8750C"/>
-                </a:solidFill>
-              </a:rPr>
-              <a:t>180 x 256 valeurs</a:t>
-            </a:r>
-          </a:p>
-          <a:p>
-            <a:pPr lvl="2"/>
-            <a:r>
-              <a:rPr lang="fr-FR" dirty="0" smtClean="0">
-                <a:solidFill>
-                  <a:srgbClr val="E8750C"/>
-                </a:solidFill>
-              </a:rPr>
-              <a:t>Réduction PCA : 90% variance = 151 dimensions</a:t>
+              <a:rPr lang="fr-FR" dirty="0">
+                <a:solidFill>
+                  <a:srgbClr val="E8750C"/>
+                </a:solidFill>
+              </a:rPr>
+              <a:t>Histogramme </a:t>
+            </a:r>
+            <a:r>
+              <a:rPr lang="fr-FR" dirty="0" smtClean="0">
+                <a:solidFill>
+                  <a:srgbClr val="E8750C"/>
+                </a:solidFill>
+              </a:rPr>
+              <a:t>Hue/Saturation</a:t>
             </a:r>
             <a:endParaRPr lang="fr-FR" dirty="0">
               <a:solidFill>
@@ -4072,6 +4363,33 @@
               </a:solidFill>
             </a:endParaRPr>
           </a:p>
+          <a:p>
+            <a:pPr lvl="1"/>
+            <a:r>
+              <a:rPr lang="fr-FR" dirty="0" smtClean="0">
+                <a:solidFill>
+                  <a:srgbClr val="E8750C"/>
+                </a:solidFill>
+              </a:rPr>
+              <a:t>180 x 256 valeurs</a:t>
+            </a:r>
+          </a:p>
+          <a:p>
+            <a:pPr lvl="2"/>
+            <a:r>
+              <a:rPr lang="fr-FR" dirty="0" smtClean="0">
+                <a:solidFill>
+                  <a:srgbClr val="E8750C"/>
+                </a:solidFill>
+              </a:rPr>
+              <a:t>Réduction PCA : 90% variance = 151 dimensions</a:t>
+            </a:r>
+            <a:endParaRPr lang="fr-FR" dirty="0">
+              <a:solidFill>
+                <a:srgbClr val="E8750C"/>
+              </a:solidFill>
+            </a:endParaRPr>
+          </a:p>
         </p:txBody>
       </p:sp>
       <p:sp>
@@ -4091,7 +4409,7 @@
           <a:p>
             <a:fld id="{30547005-2CCE-4AAF-810C-C33FB4661996}" type="datetime1">
               <a:rPr lang="fr-FR" smtClean="0"/>
-              <a:t>15/01/2018</a:t>
+              <a:t>18/01/2018</a:t>
             </a:fld>
             <a:endParaRPr lang="fr-FR"/>
           </a:p>
@@ -4283,7 +4601,7 @@
 </p:sld>
 </file>
 
-<file path=ppt/slides/slide11.xml><?xml version="1.0" encoding="utf-8"?>
+<file path=ppt/slides/slide12.xml><?xml version="1.0" encoding="utf-8"?>
 <p:sld xmlns:a="http://schemas.openxmlformats.org/drawingml/2006/main" xmlns:r="http://schemas.openxmlformats.org/officeDocument/2006/relationships" xmlns:p="http://schemas.openxmlformats.org/presentationml/2006/main">
   <p:cSld>
     <p:spTree>
@@ -4359,15 +4677,7 @@
                   <a:srgbClr val="E8750C"/>
                 </a:solidFill>
               </a:rPr>
-              <a:t>Analyse </a:t>
-            </a:r>
-            <a:r>
-              <a:rPr lang="fr-FR" sz="2400" dirty="0" smtClean="0">
-                <a:solidFill>
-                  <a:srgbClr val="E8750C"/>
-                </a:solidFill>
-              </a:rPr>
-              <a:t>FFT</a:t>
+              <a:t>Analyse FFT</a:t>
             </a:r>
           </a:p>
           <a:p>
@@ -4402,11 +4712,6 @@
               </a:rPr>
               <a:t>Variance 90 % = 4500 dimensions</a:t>
             </a:r>
-            <a:endParaRPr lang="fr-FR" sz="1800" dirty="0" smtClean="0">
-              <a:solidFill>
-                <a:srgbClr val="E8750C"/>
-              </a:solidFill>
-            </a:endParaRPr>
           </a:p>
           <a:p>
             <a:pPr lvl="2"/>
@@ -4464,7 +4769,7 @@
           <a:p>
             <a:fld id="{30547005-2CCE-4AAF-810C-C33FB4661996}" type="datetime1">
               <a:rPr lang="fr-FR" smtClean="0"/>
-              <a:t>15/01/2018</a:t>
+              <a:t>18/01/2018</a:t>
             </a:fld>
             <a:endParaRPr lang="fr-FR"/>
           </a:p>
@@ -4778,7 +5083,7 @@
 </p:sld>
 </file>
 
-<file path=ppt/slides/slide12.xml><?xml version="1.0" encoding="utf-8"?>
+<file path=ppt/slides/slide13.xml><?xml version="1.0" encoding="utf-8"?>
 <p:sld xmlns:a="http://schemas.openxmlformats.org/drawingml/2006/main" xmlns:r="http://schemas.openxmlformats.org/officeDocument/2006/relationships" xmlns:p="http://schemas.openxmlformats.org/presentationml/2006/main">
   <p:cSld>
     <p:spTree>
@@ -4926,7 +5231,7 @@
           <a:p>
             <a:fld id="{30547005-2CCE-4AAF-810C-C33FB4661996}" type="datetime1">
               <a:rPr lang="fr-FR" smtClean="0"/>
-              <a:t>15/01/2018</a:t>
+              <a:t>18/01/2018</a:t>
             </a:fld>
             <a:endParaRPr lang="fr-FR"/>
           </a:p>
@@ -5128,285 +5433,6 @@
 </p:sld>
 </file>
 
-<file path=ppt/slides/slide13.xml><?xml version="1.0" encoding="utf-8"?>
-<p:sld xmlns:a="http://schemas.openxmlformats.org/drawingml/2006/main" xmlns:r="http://schemas.openxmlformats.org/officeDocument/2006/relationships" xmlns:p="http://schemas.openxmlformats.org/presentationml/2006/main">
-  <p:cSld>
-    <p:spTree>
-      <p:nvGrpSpPr>
-        <p:cNvPr id="1" name=""/>
-        <p:cNvGrpSpPr/>
-        <p:nvPr/>
-      </p:nvGrpSpPr>
-      <p:grpSpPr>
-        <a:xfrm>
-          <a:off x="0" y="0"/>
-          <a:ext cx="0" cy="0"/>
-          <a:chOff x="0" y="0"/>
-          <a:chExt cx="0" cy="0"/>
-        </a:xfrm>
-      </p:grpSpPr>
-      <p:sp>
-        <p:nvSpPr>
-          <p:cNvPr id="2" name="Titre 1"/>
-          <p:cNvSpPr>
-            <a:spLocks noGrp="1"/>
-          </p:cNvSpPr>
-          <p:nvPr>
-            <p:ph type="title"/>
-          </p:nvPr>
-        </p:nvSpPr>
-        <p:spPr/>
-        <p:txBody>
-          <a:bodyPr>
-            <a:normAutofit/>
-          </a:bodyPr>
-          <a:lstStyle/>
-          <a:p>
-            <a:r>
-              <a:rPr lang="fr-FR" dirty="0" smtClean="0"/>
-              <a:t>Modèle Classique</a:t>
-            </a:r>
-            <a:endParaRPr lang="fr-FR" dirty="0"/>
-          </a:p>
-        </p:txBody>
-      </p:sp>
-      <p:sp>
-        <p:nvSpPr>
-          <p:cNvPr id="3" name="Espace réservé du contenu 2"/>
-          <p:cNvSpPr>
-            <a:spLocks noGrp="1"/>
-          </p:cNvSpPr>
-          <p:nvPr>
-            <p:ph idx="1"/>
-          </p:nvPr>
-        </p:nvSpPr>
-        <p:spPr/>
-        <p:txBody>
-          <a:bodyPr>
-            <a:normAutofit/>
-          </a:bodyPr>
-          <a:lstStyle/>
-          <a:p>
-            <a:r>
-              <a:rPr lang="fr-FR" dirty="0">
-                <a:solidFill>
-                  <a:srgbClr val="E8750C"/>
-                </a:solidFill>
-              </a:rPr>
-              <a:t>Moments</a:t>
-            </a:r>
-          </a:p>
-          <a:p>
-            <a:pPr lvl="1"/>
-            <a:r>
-              <a:rPr lang="fr-FR" dirty="0" smtClean="0">
-                <a:solidFill>
-                  <a:srgbClr val="E8750C"/>
-                </a:solidFill>
-              </a:rPr>
-              <a:t>Récupération des moments par couleurs</a:t>
-            </a:r>
-          </a:p>
-          <a:p>
-            <a:pPr lvl="1"/>
-            <a:r>
-              <a:rPr lang="fr-FR" dirty="0" smtClean="0">
-                <a:solidFill>
-                  <a:srgbClr val="E8750C"/>
-                </a:solidFill>
-              </a:rPr>
-              <a:t>3 * 24 features </a:t>
-            </a:r>
-            <a:r>
-              <a:rPr lang="fr-FR" dirty="0" smtClean="0">
-                <a:solidFill>
-                  <a:srgbClr val="E8750C"/>
-                </a:solidFill>
-              </a:rPr>
-              <a:t>additionnelles</a:t>
-            </a:r>
-          </a:p>
-          <a:p>
-            <a:pPr lvl="1"/>
-            <a:r>
-              <a:rPr lang="fr-FR" dirty="0" smtClean="0">
-                <a:solidFill>
-                  <a:srgbClr val="E8750C"/>
-                </a:solidFill>
-              </a:rPr>
-              <a:t>Très variables (de 10^7 à 10^-7)</a:t>
-            </a:r>
-          </a:p>
-          <a:p>
-            <a:pPr lvl="1"/>
-            <a:r>
-              <a:rPr lang="fr-FR" dirty="0" smtClean="0">
-                <a:solidFill>
-                  <a:srgbClr val="E8750C"/>
-                </a:solidFill>
-              </a:rPr>
-              <a:t>Standard </a:t>
-            </a:r>
-            <a:r>
-              <a:rPr lang="fr-FR" dirty="0" err="1" smtClean="0">
-                <a:solidFill>
-                  <a:srgbClr val="E8750C"/>
-                </a:solidFill>
-              </a:rPr>
-              <a:t>Scaling</a:t>
-            </a:r>
-            <a:r>
-              <a:rPr lang="fr-FR" dirty="0" smtClean="0">
-                <a:solidFill>
-                  <a:srgbClr val="E8750C"/>
-                </a:solidFill>
-              </a:rPr>
-              <a:t> par features</a:t>
-            </a:r>
-          </a:p>
-          <a:p>
-            <a:pPr lvl="1"/>
-            <a:r>
-              <a:rPr lang="fr-FR" dirty="0" smtClean="0">
-                <a:solidFill>
-                  <a:srgbClr val="E8750C"/>
-                </a:solidFill>
-              </a:rPr>
-              <a:t>10 Moments </a:t>
-            </a:r>
-            <a:r>
-              <a:rPr lang="fr-FR" dirty="0" smtClean="0">
-                <a:solidFill>
-                  <a:srgbClr val="E8750C"/>
-                </a:solidFill>
-              </a:rPr>
-              <a:t>Ordre 1, 2, 3</a:t>
-            </a:r>
-          </a:p>
-          <a:p>
-            <a:pPr lvl="1"/>
-            <a:r>
-              <a:rPr lang="fr-FR" dirty="0" smtClean="0">
-                <a:solidFill>
-                  <a:srgbClr val="E8750C"/>
-                </a:solidFill>
-              </a:rPr>
-              <a:t>7 Moments Centrés Ordre 1, 2, 3</a:t>
-            </a:r>
-          </a:p>
-          <a:p>
-            <a:pPr lvl="1"/>
-            <a:r>
-              <a:rPr lang="fr-FR" dirty="0" smtClean="0">
-                <a:solidFill>
-                  <a:srgbClr val="E8750C"/>
-                </a:solidFill>
-              </a:rPr>
-              <a:t>7 Moments Centrés Normalisés </a:t>
-            </a:r>
-            <a:r>
-              <a:rPr lang="fr-FR" dirty="0">
-                <a:solidFill>
-                  <a:srgbClr val="E8750C"/>
-                </a:solidFill>
-              </a:rPr>
-              <a:t>Ordre 1, 2, 3</a:t>
-            </a:r>
-          </a:p>
-          <a:p>
-            <a:pPr lvl="1"/>
-            <a:endParaRPr lang="fr-FR" dirty="0" smtClean="0">
-              <a:solidFill>
-                <a:srgbClr val="E8750C"/>
-              </a:solidFill>
-            </a:endParaRPr>
-          </a:p>
-          <a:p>
-            <a:pPr lvl="2"/>
-            <a:endParaRPr lang="fr-FR" dirty="0">
-              <a:solidFill>
-                <a:srgbClr val="E8750C"/>
-              </a:solidFill>
-            </a:endParaRPr>
-          </a:p>
-          <a:p>
-            <a:pPr marL="914400" lvl="2" indent="0">
-              <a:buNone/>
-            </a:pPr>
-            <a:endParaRPr lang="fr-FR" dirty="0">
-              <a:solidFill>
-                <a:srgbClr val="E8750C"/>
-              </a:solidFill>
-            </a:endParaRPr>
-          </a:p>
-        </p:txBody>
-      </p:sp>
-      <p:sp>
-        <p:nvSpPr>
-          <p:cNvPr id="4" name="Espace réservé de la date 3"/>
-          <p:cNvSpPr>
-            <a:spLocks noGrp="1"/>
-          </p:cNvSpPr>
-          <p:nvPr>
-            <p:ph type="dt" sz="half" idx="10"/>
-          </p:nvPr>
-        </p:nvSpPr>
-        <p:spPr/>
-        <p:txBody>
-          <a:bodyPr/>
-          <a:lstStyle/>
-          <a:p>
-            <a:fld id="{30547005-2CCE-4AAF-810C-C33FB4661996}" type="datetime1">
-              <a:rPr lang="fr-FR" smtClean="0"/>
-              <a:t>15/01/2018</a:t>
-            </a:fld>
-            <a:endParaRPr lang="fr-FR"/>
-          </a:p>
-        </p:txBody>
-      </p:sp>
-      <p:sp>
-        <p:nvSpPr>
-          <p:cNvPr id="5" name="Espace réservé du pied de page 4"/>
-          <p:cNvSpPr>
-            <a:spLocks noGrp="1"/>
-          </p:cNvSpPr>
-          <p:nvPr>
-            <p:ph type="ftr" sz="quarter" idx="11"/>
-          </p:nvPr>
-        </p:nvSpPr>
-        <p:spPr/>
-        <p:txBody>
-          <a:bodyPr/>
-          <a:lstStyle/>
-          <a:p>
-            <a:r>
-              <a:rPr lang="fr-FR" dirty="0" smtClean="0"/>
-              <a:t>MINE Nicolas</a:t>
-            </a:r>
-            <a:endParaRPr lang="fr-FR" dirty="0"/>
-          </a:p>
-        </p:txBody>
-      </p:sp>
-    </p:spTree>
-    <p:extLst>
-      <p:ext uri="{BB962C8B-B14F-4D97-AF65-F5344CB8AC3E}">
-        <p14:creationId xmlns:p14="http://schemas.microsoft.com/office/powerpoint/2010/main" val="3318771327"/>
-      </p:ext>
-    </p:extLst>
-  </p:cSld>
-  <p:clrMapOvr>
-    <a:masterClrMapping/>
-  </p:clrMapOvr>
-  <p:timing>
-    <p:tnLst>
-      <p:par>
-        <p:cTn id="1" dur="indefinite" restart="never" nodeType="tmRoot"/>
-      </p:par>
-    </p:tnLst>
-  </p:timing>
-</p:sld>
-</file>
-
 <file path=ppt/slides/slide14.xml><?xml version="1.0" encoding="utf-8"?>
 <p:sld xmlns:a="http://schemas.openxmlformats.org/drawingml/2006/main" xmlns:r="http://schemas.openxmlformats.org/officeDocument/2006/relationships" xmlns:p="http://schemas.openxmlformats.org/presentationml/2006/main">
   <p:cSld>
@@ -5462,18 +5488,130 @@
         <p:spPr/>
         <p:txBody>
           <a:bodyPr>
-            <a:normAutofit lnSpcReduction="10000"/>
+            <a:normAutofit/>
           </a:bodyPr>
           <a:lstStyle/>
           <a:p>
             <a:r>
-              <a:rPr lang="fr-FR" dirty="0" smtClean="0">
-                <a:solidFill>
-                  <a:srgbClr val="E8750C"/>
-                </a:solidFill>
-              </a:rPr>
-              <a:t>Evaluation</a:t>
-            </a:r>
+              <a:rPr lang="fr-FR" dirty="0">
+                <a:solidFill>
+                  <a:srgbClr val="E8750C"/>
+                </a:solidFill>
+              </a:rPr>
+              <a:t>Moments</a:t>
+            </a:r>
+          </a:p>
+          <a:p>
+            <a:pPr lvl="1"/>
+            <a:r>
+              <a:rPr lang="fr-FR" dirty="0" smtClean="0">
+                <a:solidFill>
+                  <a:srgbClr val="E8750C"/>
+                </a:solidFill>
+              </a:rPr>
+              <a:t>Récupération des moments par couleurs</a:t>
+            </a:r>
+          </a:p>
+          <a:p>
+            <a:pPr lvl="1"/>
+            <a:r>
+              <a:rPr lang="fr-FR" dirty="0" smtClean="0">
+                <a:solidFill>
+                  <a:srgbClr val="E8750C"/>
+                </a:solidFill>
+              </a:rPr>
+              <a:t>3 * 24 features additionnelles</a:t>
+            </a:r>
+          </a:p>
+          <a:p>
+            <a:pPr lvl="1"/>
+            <a:r>
+              <a:rPr lang="fr-FR" dirty="0" smtClean="0">
+                <a:solidFill>
+                  <a:srgbClr val="E8750C"/>
+                </a:solidFill>
+              </a:rPr>
+              <a:t>Très variables (de 10^7 à 10^-7)</a:t>
+            </a:r>
+          </a:p>
+          <a:p>
+            <a:pPr lvl="1"/>
+            <a:r>
+              <a:rPr lang="fr-FR" dirty="0" smtClean="0">
+                <a:solidFill>
+                  <a:srgbClr val="E8750C"/>
+                </a:solidFill>
+              </a:rPr>
+              <a:t>Standard </a:t>
+            </a:r>
+            <a:r>
+              <a:rPr lang="fr-FR" dirty="0" err="1" smtClean="0">
+                <a:solidFill>
+                  <a:srgbClr val="E8750C"/>
+                </a:solidFill>
+              </a:rPr>
+              <a:t>Scaling</a:t>
+            </a:r>
+            <a:r>
+              <a:rPr lang="fr-FR" dirty="0" smtClean="0">
+                <a:solidFill>
+                  <a:srgbClr val="E8750C"/>
+                </a:solidFill>
+              </a:rPr>
+              <a:t> par features</a:t>
+            </a:r>
+          </a:p>
+          <a:p>
+            <a:pPr lvl="1"/>
+            <a:r>
+              <a:rPr lang="fr-FR" dirty="0" smtClean="0">
+                <a:solidFill>
+                  <a:srgbClr val="E8750C"/>
+                </a:solidFill>
+              </a:rPr>
+              <a:t>10 Moments Ordre 1, 2, 3</a:t>
+            </a:r>
+          </a:p>
+          <a:p>
+            <a:pPr lvl="1"/>
+            <a:r>
+              <a:rPr lang="fr-FR" dirty="0" smtClean="0">
+                <a:solidFill>
+                  <a:srgbClr val="E8750C"/>
+                </a:solidFill>
+              </a:rPr>
+              <a:t>7 Moments Centrés Ordre 1, 2, 3</a:t>
+            </a:r>
+          </a:p>
+          <a:p>
+            <a:pPr lvl="1"/>
+            <a:r>
+              <a:rPr lang="fr-FR" dirty="0" smtClean="0">
+                <a:solidFill>
+                  <a:srgbClr val="E8750C"/>
+                </a:solidFill>
+              </a:rPr>
+              <a:t>7 Moments Centrés Normalisés </a:t>
+            </a:r>
+            <a:r>
+              <a:rPr lang="fr-FR" dirty="0">
+                <a:solidFill>
+                  <a:srgbClr val="E8750C"/>
+                </a:solidFill>
+              </a:rPr>
+              <a:t>Ordre 1, 2, 3</a:t>
+            </a:r>
+          </a:p>
+          <a:p>
+            <a:pPr lvl="1"/>
+            <a:endParaRPr lang="fr-FR" dirty="0" smtClean="0">
+              <a:solidFill>
+                <a:srgbClr val="E8750C"/>
+              </a:solidFill>
+            </a:endParaRPr>
+          </a:p>
+          <a:p>
+            <a:pPr lvl="2"/>
             <a:endParaRPr lang="fr-FR" dirty="0">
               <a:solidFill>
                 <a:srgbClr val="E8750C"/>
@@ -5481,162 +5619,9 @@
             </a:endParaRPr>
           </a:p>
           <a:p>
-            <a:pPr lvl="1"/>
-            <a:r>
-              <a:rPr lang="fr-FR" dirty="0" smtClean="0">
-                <a:solidFill>
-                  <a:srgbClr val="E8750C"/>
-                </a:solidFill>
-              </a:rPr>
-              <a:t>Concaténation des matrices</a:t>
-            </a:r>
-          </a:p>
-          <a:p>
-            <a:pPr lvl="2"/>
-            <a:r>
-              <a:rPr lang="fr-FR" dirty="0" smtClean="0">
-                <a:solidFill>
-                  <a:srgbClr val="E8750C"/>
-                </a:solidFill>
-              </a:rPr>
-              <a:t>X = 10222 x 523 (100+151+100+100+3*24)</a:t>
-            </a:r>
-          </a:p>
-          <a:p>
-            <a:pPr lvl="2"/>
-            <a:r>
-              <a:rPr lang="fr-FR" dirty="0" smtClean="0">
-                <a:solidFill>
-                  <a:srgbClr val="E8750C"/>
-                </a:solidFill>
-              </a:rPr>
-              <a:t>Y = 10222 x 120 (120 races</a:t>
-            </a:r>
-            <a:r>
-              <a:rPr lang="fr-FR" dirty="0" smtClean="0">
-                <a:solidFill>
-                  <a:srgbClr val="E8750C"/>
-                </a:solidFill>
-              </a:rPr>
-              <a:t>)</a:t>
-            </a:r>
-          </a:p>
-          <a:p>
-            <a:pPr lvl="1"/>
-            <a:r>
-              <a:rPr lang="fr-FR" dirty="0" err="1" smtClean="0">
-                <a:solidFill>
-                  <a:srgbClr val="E8750C"/>
-                </a:solidFill>
-              </a:rPr>
-              <a:t>Dummy</a:t>
-            </a:r>
-            <a:r>
-              <a:rPr lang="fr-FR" dirty="0" smtClean="0">
-                <a:solidFill>
-                  <a:srgbClr val="E8750C"/>
-                </a:solidFill>
-              </a:rPr>
-              <a:t> </a:t>
-            </a:r>
-            <a:r>
-              <a:rPr lang="fr-FR" dirty="0" err="1" smtClean="0">
-                <a:solidFill>
-                  <a:srgbClr val="E8750C"/>
-                </a:solidFill>
-              </a:rPr>
-              <a:t>Classifieurs</a:t>
-            </a:r>
-            <a:r>
-              <a:rPr lang="fr-FR" dirty="0" smtClean="0">
-                <a:solidFill>
-                  <a:srgbClr val="E8750C"/>
-                </a:solidFill>
-              </a:rPr>
-              <a:t> (</a:t>
-            </a:r>
-            <a:r>
-              <a:rPr lang="fr-FR" dirty="0" err="1" smtClean="0">
-                <a:solidFill>
-                  <a:srgbClr val="E8750C"/>
-                </a:solidFill>
-              </a:rPr>
-              <a:t>Stratified</a:t>
-            </a:r>
-            <a:r>
-              <a:rPr lang="fr-FR" dirty="0" smtClean="0">
-                <a:solidFill>
-                  <a:srgbClr val="E8750C"/>
-                </a:solidFill>
-              </a:rPr>
-              <a:t>)</a:t>
-            </a:r>
-          </a:p>
-          <a:p>
-            <a:pPr lvl="2"/>
-            <a:r>
-              <a:rPr lang="fr-FR" dirty="0" smtClean="0">
-                <a:solidFill>
-                  <a:srgbClr val="E8750C"/>
-                </a:solidFill>
-              </a:rPr>
-              <a:t>Full Dataset : </a:t>
-            </a:r>
-          </a:p>
-          <a:p>
-            <a:pPr lvl="3"/>
-            <a:r>
-              <a:rPr lang="fr-FR" dirty="0" smtClean="0">
-                <a:solidFill>
-                  <a:srgbClr val="E8750C"/>
-                </a:solidFill>
-              </a:rPr>
-              <a:t>0,93 % (train)</a:t>
-            </a:r>
-          </a:p>
-          <a:p>
-            <a:pPr lvl="3"/>
-            <a:r>
-              <a:rPr lang="fr-FR" dirty="0" smtClean="0">
-                <a:solidFill>
-                  <a:srgbClr val="E8750C"/>
-                </a:solidFill>
-              </a:rPr>
-              <a:t>0,98% (test)</a:t>
-            </a:r>
-          </a:p>
-          <a:p>
-            <a:pPr lvl="2"/>
-            <a:r>
-              <a:rPr lang="fr-FR" dirty="0" smtClean="0">
-                <a:solidFill>
-                  <a:srgbClr val="E8750C"/>
-                </a:solidFill>
-              </a:rPr>
-              <a:t>Réduction à 5 classes : </a:t>
-            </a:r>
-          </a:p>
-          <a:p>
-            <a:pPr lvl="3"/>
-            <a:r>
-              <a:rPr lang="fr-FR" dirty="0" smtClean="0">
-                <a:solidFill>
-                  <a:srgbClr val="E8750C"/>
-                </a:solidFill>
-              </a:rPr>
-              <a:t>20,8% (train)</a:t>
-            </a:r>
-          </a:p>
-          <a:p>
-            <a:pPr lvl="3"/>
-            <a:r>
-              <a:rPr lang="fr-FR" dirty="0" smtClean="0">
-                <a:solidFill>
-                  <a:srgbClr val="E8750C"/>
-                </a:solidFill>
-              </a:rPr>
-              <a:t>23,5%(test)</a:t>
-            </a:r>
+            <a:pPr marL="914400" lvl="2" indent="0">
+              <a:buNone/>
+            </a:pPr>
             <a:endParaRPr lang="fr-FR" dirty="0">
               <a:solidFill>
                 <a:srgbClr val="E8750C"/>
@@ -5662,7 +5647,7 @@
           <a:p>
             <a:fld id="{30547005-2CCE-4AAF-810C-C33FB4661996}" type="datetime1">
               <a:rPr lang="fr-FR" smtClean="0"/>
-              <a:t>15/01/2018</a:t>
+              <a:t>18/01/2018</a:t>
             </a:fld>
             <a:endParaRPr lang="fr-FR"/>
           </a:p>
@@ -5694,7 +5679,7 @@
     </p:spTree>
     <p:extLst>
       <p:ext uri="{BB962C8B-B14F-4D97-AF65-F5344CB8AC3E}">
-        <p14:creationId xmlns:p14="http://schemas.microsoft.com/office/powerpoint/2010/main" val="1301056466"/>
+        <p14:creationId xmlns:p14="http://schemas.microsoft.com/office/powerpoint/2010/main" val="3318771327"/>
       </p:ext>
     </p:extLst>
   </p:cSld>
@@ -5766,7 +5751,7 @@
         <p:spPr/>
         <p:txBody>
           <a:bodyPr>
-            <a:normAutofit/>
+            <a:normAutofit lnSpcReduction="10000"/>
           </a:bodyPr>
           <a:lstStyle/>
           <a:p>
@@ -5776,7 +5761,7 @@
                   <a:srgbClr val="E8750C"/>
                 </a:solidFill>
               </a:rPr>
-              <a:t>Résultats</a:t>
+              <a:t>Evaluation</a:t>
             </a:r>
             <a:endParaRPr lang="fr-FR" dirty="0">
               <a:solidFill>
@@ -5784,6 +5769,161 @@
               </a:solidFill>
             </a:endParaRPr>
           </a:p>
+          <a:p>
+            <a:pPr lvl="1"/>
+            <a:r>
+              <a:rPr lang="fr-FR" dirty="0" smtClean="0">
+                <a:solidFill>
+                  <a:srgbClr val="E8750C"/>
+                </a:solidFill>
+              </a:rPr>
+              <a:t>Concaténation des matrices</a:t>
+            </a:r>
+          </a:p>
+          <a:p>
+            <a:pPr lvl="2"/>
+            <a:r>
+              <a:rPr lang="fr-FR" dirty="0" smtClean="0">
+                <a:solidFill>
+                  <a:srgbClr val="E8750C"/>
+                </a:solidFill>
+              </a:rPr>
+              <a:t>X = 10222 x 523 (100+151+100+100+3*24)</a:t>
+            </a:r>
+          </a:p>
+          <a:p>
+            <a:pPr lvl="2"/>
+            <a:r>
+              <a:rPr lang="fr-FR" dirty="0" smtClean="0">
+                <a:solidFill>
+                  <a:srgbClr val="E8750C"/>
+                </a:solidFill>
+              </a:rPr>
+              <a:t>Y = 10222 x 120 (120 races)</a:t>
+            </a:r>
+          </a:p>
+          <a:p>
+            <a:pPr lvl="1"/>
+            <a:r>
+              <a:rPr lang="fr-FR" dirty="0" err="1" smtClean="0">
+                <a:solidFill>
+                  <a:srgbClr val="E8750C"/>
+                </a:solidFill>
+              </a:rPr>
+              <a:t>Dummy</a:t>
+            </a:r>
+            <a:r>
+              <a:rPr lang="fr-FR" dirty="0" smtClean="0">
+                <a:solidFill>
+                  <a:srgbClr val="E8750C"/>
+                </a:solidFill>
+              </a:rPr>
+              <a:t> </a:t>
+            </a:r>
+            <a:r>
+              <a:rPr lang="fr-FR" dirty="0" err="1" smtClean="0">
+                <a:solidFill>
+                  <a:srgbClr val="E8750C"/>
+                </a:solidFill>
+              </a:rPr>
+              <a:t>Classifieurs</a:t>
+            </a:r>
+            <a:r>
+              <a:rPr lang="fr-FR" dirty="0" smtClean="0">
+                <a:solidFill>
+                  <a:srgbClr val="E8750C"/>
+                </a:solidFill>
+              </a:rPr>
+              <a:t> (</a:t>
+            </a:r>
+            <a:r>
+              <a:rPr lang="fr-FR" dirty="0" err="1" smtClean="0">
+                <a:solidFill>
+                  <a:srgbClr val="E8750C"/>
+                </a:solidFill>
+              </a:rPr>
+              <a:t>Stratified</a:t>
+            </a:r>
+            <a:r>
+              <a:rPr lang="fr-FR" dirty="0" smtClean="0">
+                <a:solidFill>
+                  <a:srgbClr val="E8750C"/>
+                </a:solidFill>
+              </a:rPr>
+              <a:t>)</a:t>
+            </a:r>
+          </a:p>
+          <a:p>
+            <a:pPr lvl="2"/>
+            <a:r>
+              <a:rPr lang="fr-FR" dirty="0" smtClean="0">
+                <a:solidFill>
+                  <a:srgbClr val="E8750C"/>
+                </a:solidFill>
+              </a:rPr>
+              <a:t>Full Dataset : </a:t>
+            </a:r>
+          </a:p>
+          <a:p>
+            <a:pPr lvl="3"/>
+            <a:r>
+              <a:rPr lang="fr-FR" dirty="0" smtClean="0">
+                <a:solidFill>
+                  <a:srgbClr val="E8750C"/>
+                </a:solidFill>
+              </a:rPr>
+              <a:t>0,93 % (train)</a:t>
+            </a:r>
+          </a:p>
+          <a:p>
+            <a:pPr lvl="3"/>
+            <a:r>
+              <a:rPr lang="fr-FR" dirty="0" smtClean="0">
+                <a:solidFill>
+                  <a:srgbClr val="E8750C"/>
+                </a:solidFill>
+              </a:rPr>
+              <a:t>0,98% (test)</a:t>
+            </a:r>
+          </a:p>
+          <a:p>
+            <a:pPr lvl="2"/>
+            <a:r>
+              <a:rPr lang="fr-FR" dirty="0" smtClean="0">
+                <a:solidFill>
+                  <a:srgbClr val="E8750C"/>
+                </a:solidFill>
+              </a:rPr>
+              <a:t>Réduction à 5 classes : </a:t>
+            </a:r>
+          </a:p>
+          <a:p>
+            <a:pPr lvl="3"/>
+            <a:r>
+              <a:rPr lang="fr-FR" dirty="0" smtClean="0">
+                <a:solidFill>
+                  <a:srgbClr val="E8750C"/>
+                </a:solidFill>
+              </a:rPr>
+              <a:t>20,8% (train)</a:t>
+            </a:r>
+          </a:p>
+          <a:p>
+            <a:pPr lvl="3"/>
+            <a:r>
+              <a:rPr lang="fr-FR" dirty="0" smtClean="0">
+                <a:solidFill>
+                  <a:srgbClr val="E8750C"/>
+                </a:solidFill>
+              </a:rPr>
+              <a:t>23,5%(test)</a:t>
+            </a:r>
+            <a:endParaRPr lang="fr-FR" dirty="0">
+              <a:solidFill>
+                <a:srgbClr val="E8750C"/>
+              </a:solidFill>
+            </a:endParaRPr>
+          </a:p>
         </p:txBody>
       </p:sp>
       <p:sp>
@@ -5803,7 +5943,7 @@
           <a:p>
             <a:fld id="{30547005-2CCE-4AAF-810C-C33FB4661996}" type="datetime1">
               <a:rPr lang="fr-FR" smtClean="0"/>
-              <a:t>15/01/2018</a:t>
+              <a:t>18/01/2018</a:t>
             </a:fld>
             <a:endParaRPr lang="fr-FR"/>
           </a:p>
@@ -5835,7 +5975,7 @@
     </p:spTree>
     <p:extLst>
       <p:ext uri="{BB962C8B-B14F-4D97-AF65-F5344CB8AC3E}">
-        <p14:creationId xmlns:p14="http://schemas.microsoft.com/office/powerpoint/2010/main" val="2232345721"/>
+        <p14:creationId xmlns:p14="http://schemas.microsoft.com/office/powerpoint/2010/main" val="1301056466"/>
       </p:ext>
     </p:extLst>
   </p:cSld>
@@ -5887,6 +6027,637 @@
           <a:lstStyle/>
           <a:p>
             <a:r>
+              <a:rPr lang="fr-FR" dirty="0" smtClean="0"/>
+              <a:t>Modèle Classique</a:t>
+            </a:r>
+            <a:endParaRPr lang="fr-FR" dirty="0"/>
+          </a:p>
+        </p:txBody>
+      </p:sp>
+      <p:sp>
+        <p:nvSpPr>
+          <p:cNvPr id="3" name="Espace réservé du contenu 2"/>
+          <p:cNvSpPr>
+            <a:spLocks noGrp="1"/>
+          </p:cNvSpPr>
+          <p:nvPr>
+            <p:ph idx="1"/>
+          </p:nvPr>
+        </p:nvSpPr>
+        <p:spPr/>
+        <p:txBody>
+          <a:bodyPr>
+            <a:normAutofit fontScale="92500" lnSpcReduction="10000"/>
+          </a:bodyPr>
+          <a:lstStyle/>
+          <a:p>
+            <a:r>
+              <a:rPr lang="fr-FR" dirty="0" smtClean="0">
+                <a:solidFill>
+                  <a:srgbClr val="E8750C"/>
+                </a:solidFill>
+              </a:rPr>
+              <a:t>Résultats</a:t>
+            </a:r>
+          </a:p>
+          <a:p>
+            <a:pPr lvl="1"/>
+            <a:r>
+              <a:rPr lang="fr-FR" dirty="0" smtClean="0">
+                <a:solidFill>
+                  <a:srgbClr val="E8750C"/>
+                </a:solidFill>
+              </a:rPr>
+              <a:t>Multiples modèles testés</a:t>
+            </a:r>
+          </a:p>
+          <a:p>
+            <a:pPr lvl="2"/>
+            <a:r>
+              <a:rPr lang="fr-FR" dirty="0" err="1" smtClean="0">
+                <a:solidFill>
+                  <a:srgbClr val="E8750C"/>
+                </a:solidFill>
+              </a:rPr>
+              <a:t>Tree</a:t>
+            </a:r>
+            <a:r>
+              <a:rPr lang="fr-FR" dirty="0" smtClean="0">
+                <a:solidFill>
+                  <a:srgbClr val="E8750C"/>
+                </a:solidFill>
+              </a:rPr>
+              <a:t>, Ensemble, KNN, Modèle Linéaire (SGDC), Modèle Non linéaire (SVC) </a:t>
+            </a:r>
+            <a:endParaRPr lang="fr-FR" dirty="0" smtClean="0">
+              <a:solidFill>
+                <a:srgbClr val="E8750C"/>
+              </a:solidFill>
+            </a:endParaRPr>
+          </a:p>
+          <a:p>
+            <a:pPr lvl="1"/>
+            <a:r>
+              <a:rPr lang="fr-FR" dirty="0" smtClean="0">
+                <a:solidFill>
+                  <a:srgbClr val="E8750C"/>
+                </a:solidFill>
+              </a:rPr>
+              <a:t>Très gros </a:t>
+            </a:r>
+            <a:r>
+              <a:rPr lang="fr-FR" dirty="0" err="1" smtClean="0">
+                <a:solidFill>
+                  <a:srgbClr val="E8750C"/>
+                </a:solidFill>
+              </a:rPr>
+              <a:t>overtiffing</a:t>
+            </a:r>
+            <a:endParaRPr lang="fr-FR" dirty="0" smtClean="0">
+              <a:solidFill>
+                <a:srgbClr val="E8750C"/>
+              </a:solidFill>
+            </a:endParaRPr>
+          </a:p>
+          <a:p>
+            <a:pPr lvl="1"/>
+            <a:r>
+              <a:rPr lang="fr-FR" dirty="0" smtClean="0">
+                <a:solidFill>
+                  <a:srgbClr val="E8750C"/>
+                </a:solidFill>
+              </a:rPr>
+              <a:t>Régulation</a:t>
+            </a:r>
+          </a:p>
+          <a:p>
+            <a:pPr lvl="2"/>
+            <a:r>
+              <a:rPr lang="fr-FR" dirty="0" smtClean="0">
+                <a:solidFill>
+                  <a:srgbClr val="E8750C"/>
+                </a:solidFill>
+              </a:rPr>
+              <a:t>réduction du score test set</a:t>
+            </a:r>
+          </a:p>
+          <a:p>
+            <a:pPr lvl="2"/>
+            <a:r>
+              <a:rPr lang="fr-FR" dirty="0" smtClean="0">
+                <a:solidFill>
+                  <a:srgbClr val="E8750C"/>
+                </a:solidFill>
+              </a:rPr>
+              <a:t>Similaire au </a:t>
+            </a:r>
+            <a:r>
+              <a:rPr lang="fr-FR" dirty="0" err="1" smtClean="0">
+                <a:solidFill>
+                  <a:srgbClr val="E8750C"/>
+                </a:solidFill>
+              </a:rPr>
+              <a:t>Dummy</a:t>
+            </a:r>
+            <a:r>
+              <a:rPr lang="fr-FR" dirty="0" smtClean="0">
+                <a:solidFill>
+                  <a:srgbClr val="E8750C"/>
+                </a:solidFill>
+              </a:rPr>
+              <a:t> Classifieur avec Reg.</a:t>
+            </a:r>
+          </a:p>
+          <a:p>
+            <a:pPr lvl="1"/>
+            <a:r>
+              <a:rPr lang="fr-FR" dirty="0" smtClean="0">
+                <a:solidFill>
+                  <a:srgbClr val="E8750C"/>
+                </a:solidFill>
+              </a:rPr>
+              <a:t>Résultats </a:t>
+            </a:r>
+          </a:p>
+          <a:p>
+            <a:pPr lvl="2"/>
+            <a:r>
+              <a:rPr lang="fr-FR" dirty="0" smtClean="0">
+                <a:solidFill>
+                  <a:srgbClr val="E8750C"/>
+                </a:solidFill>
+              </a:rPr>
+              <a:t>2 à 3 % sur full dataset (env. 3 x mieux que </a:t>
+            </a:r>
+            <a:r>
+              <a:rPr lang="fr-FR" dirty="0" err="1" smtClean="0">
+                <a:solidFill>
+                  <a:srgbClr val="E8750C"/>
+                </a:solidFill>
+              </a:rPr>
+              <a:t>naif</a:t>
+            </a:r>
+            <a:r>
+              <a:rPr lang="fr-FR" dirty="0" smtClean="0">
+                <a:solidFill>
+                  <a:srgbClr val="E8750C"/>
+                </a:solidFill>
+              </a:rPr>
+              <a:t>)</a:t>
+            </a:r>
+          </a:p>
+          <a:p>
+            <a:pPr lvl="2"/>
+            <a:r>
+              <a:rPr lang="fr-FR" dirty="0" smtClean="0">
+                <a:solidFill>
+                  <a:srgbClr val="E8750C"/>
+                </a:solidFill>
+              </a:rPr>
+              <a:t>35 à 37% </a:t>
+            </a:r>
+            <a:r>
+              <a:rPr lang="fr-FR" dirty="0">
+                <a:solidFill>
+                  <a:srgbClr val="E8750C"/>
+                </a:solidFill>
+              </a:rPr>
+              <a:t>sur full dataset (env. </a:t>
+            </a:r>
+            <a:r>
+              <a:rPr lang="fr-FR" dirty="0" smtClean="0">
+                <a:solidFill>
+                  <a:srgbClr val="E8750C"/>
+                </a:solidFill>
+              </a:rPr>
+              <a:t>1,7 </a:t>
+            </a:r>
+            <a:r>
+              <a:rPr lang="fr-FR" dirty="0">
+                <a:solidFill>
+                  <a:srgbClr val="E8750C"/>
+                </a:solidFill>
+              </a:rPr>
+              <a:t>x mieux que </a:t>
+            </a:r>
+            <a:r>
+              <a:rPr lang="fr-FR" dirty="0" err="1">
+                <a:solidFill>
+                  <a:srgbClr val="E8750C"/>
+                </a:solidFill>
+              </a:rPr>
+              <a:t>naif</a:t>
+            </a:r>
+            <a:r>
+              <a:rPr lang="fr-FR" dirty="0">
+                <a:solidFill>
+                  <a:srgbClr val="E8750C"/>
+                </a:solidFill>
+              </a:rPr>
+              <a:t>)</a:t>
+            </a:r>
+          </a:p>
+          <a:p>
+            <a:pPr lvl="2"/>
+            <a:endParaRPr lang="fr-FR" dirty="0" smtClean="0">
+              <a:solidFill>
+                <a:srgbClr val="E8750C"/>
+              </a:solidFill>
+            </a:endParaRPr>
+          </a:p>
+        </p:txBody>
+      </p:sp>
+      <p:sp>
+        <p:nvSpPr>
+          <p:cNvPr id="4" name="Espace réservé de la date 3"/>
+          <p:cNvSpPr>
+            <a:spLocks noGrp="1"/>
+          </p:cNvSpPr>
+          <p:nvPr>
+            <p:ph type="dt" sz="half" idx="10"/>
+          </p:nvPr>
+        </p:nvSpPr>
+        <p:spPr/>
+        <p:txBody>
+          <a:bodyPr/>
+          <a:lstStyle/>
+          <a:p>
+            <a:fld id="{30547005-2CCE-4AAF-810C-C33FB4661996}" type="datetime1">
+              <a:rPr lang="fr-FR" smtClean="0"/>
+              <a:t>18/01/2018</a:t>
+            </a:fld>
+            <a:endParaRPr lang="fr-FR"/>
+          </a:p>
+        </p:txBody>
+      </p:sp>
+      <p:sp>
+        <p:nvSpPr>
+          <p:cNvPr id="5" name="Espace réservé du pied de page 4"/>
+          <p:cNvSpPr>
+            <a:spLocks noGrp="1"/>
+          </p:cNvSpPr>
+          <p:nvPr>
+            <p:ph type="ftr" sz="quarter" idx="11"/>
+          </p:nvPr>
+        </p:nvSpPr>
+        <p:spPr/>
+        <p:txBody>
+          <a:bodyPr/>
+          <a:lstStyle/>
+          <a:p>
+            <a:r>
+              <a:rPr lang="fr-FR" dirty="0" smtClean="0"/>
+              <a:t>MINE Nicolas</a:t>
+            </a:r>
+            <a:endParaRPr lang="fr-FR" dirty="0"/>
+          </a:p>
+        </p:txBody>
+      </p:sp>
+    </p:spTree>
+    <p:extLst>
+      <p:ext uri="{BB962C8B-B14F-4D97-AF65-F5344CB8AC3E}">
+        <p14:creationId xmlns:p14="http://schemas.microsoft.com/office/powerpoint/2010/main" val="2232345721"/>
+      </p:ext>
+    </p:extLst>
+  </p:cSld>
+  <p:clrMapOvr>
+    <a:masterClrMapping/>
+  </p:clrMapOvr>
+  <p:timing>
+    <p:tnLst>
+      <p:par>
+        <p:cTn id="1" dur="indefinite" restart="never" nodeType="tmRoot"/>
+      </p:par>
+    </p:tnLst>
+  </p:timing>
+</p:sld>
+</file>
+
+<file path=ppt/slides/slide17.xml><?xml version="1.0" encoding="utf-8"?>
+<p:sld xmlns:a="http://schemas.openxmlformats.org/drawingml/2006/main" xmlns:r="http://schemas.openxmlformats.org/officeDocument/2006/relationships" xmlns:p="http://schemas.openxmlformats.org/presentationml/2006/main">
+  <p:cSld>
+    <p:spTree>
+      <p:nvGrpSpPr>
+        <p:cNvPr id="1" name=""/>
+        <p:cNvGrpSpPr/>
+        <p:nvPr/>
+      </p:nvGrpSpPr>
+      <p:grpSpPr>
+        <a:xfrm>
+          <a:off x="0" y="0"/>
+          <a:ext cx="0" cy="0"/>
+          <a:chOff x="0" y="0"/>
+          <a:chExt cx="0" cy="0"/>
+        </a:xfrm>
+      </p:grpSpPr>
+      <p:sp>
+        <p:nvSpPr>
+          <p:cNvPr id="2" name="Titre 1"/>
+          <p:cNvSpPr>
+            <a:spLocks noGrp="1"/>
+          </p:cNvSpPr>
+          <p:nvPr>
+            <p:ph type="title"/>
+          </p:nvPr>
+        </p:nvSpPr>
+        <p:spPr/>
+        <p:txBody>
+          <a:bodyPr>
+            <a:normAutofit/>
+          </a:bodyPr>
+          <a:lstStyle/>
+          <a:p>
+            <a:r>
+              <a:rPr lang="fr-FR" dirty="0" smtClean="0"/>
+              <a:t>Modèle Classique</a:t>
+            </a:r>
+            <a:endParaRPr lang="fr-FR" dirty="0"/>
+          </a:p>
+        </p:txBody>
+      </p:sp>
+      <p:sp>
+        <p:nvSpPr>
+          <p:cNvPr id="3" name="Espace réservé du contenu 2"/>
+          <p:cNvSpPr>
+            <a:spLocks noGrp="1"/>
+          </p:cNvSpPr>
+          <p:nvPr>
+            <p:ph idx="1"/>
+          </p:nvPr>
+        </p:nvSpPr>
+        <p:spPr/>
+        <p:txBody>
+          <a:bodyPr>
+            <a:normAutofit/>
+          </a:bodyPr>
+          <a:lstStyle/>
+          <a:p>
+            <a:r>
+              <a:rPr lang="fr-FR" dirty="0" smtClean="0">
+                <a:solidFill>
+                  <a:srgbClr val="E8750C"/>
+                </a:solidFill>
+              </a:rPr>
+              <a:t>Modèle 2 :</a:t>
+            </a:r>
+          </a:p>
+          <a:p>
+            <a:pPr lvl="1"/>
+            <a:r>
+              <a:rPr lang="fr-FR" dirty="0" smtClean="0">
+                <a:solidFill>
+                  <a:srgbClr val="E8750C"/>
+                </a:solidFill>
+              </a:rPr>
+              <a:t>1 classifieur par type de données</a:t>
+            </a:r>
+          </a:p>
+          <a:p>
+            <a:pPr lvl="2"/>
+            <a:r>
+              <a:rPr lang="fr-FR" dirty="0" smtClean="0">
+                <a:solidFill>
+                  <a:srgbClr val="E8750C"/>
+                </a:solidFill>
+              </a:rPr>
+              <a:t>HS histogramme + PCA =&gt; KNN</a:t>
+            </a:r>
+          </a:p>
+          <a:p>
+            <a:pPr lvl="2"/>
+            <a:r>
+              <a:rPr lang="fr-FR" dirty="0" smtClean="0">
+                <a:solidFill>
+                  <a:srgbClr val="E8750C"/>
+                </a:solidFill>
+              </a:rPr>
+              <a:t>Visual </a:t>
+            </a:r>
+            <a:r>
+              <a:rPr lang="fr-FR" dirty="0" err="1" smtClean="0">
+                <a:solidFill>
+                  <a:srgbClr val="E8750C"/>
+                </a:solidFill>
+              </a:rPr>
+              <a:t>BoW</a:t>
+            </a:r>
+            <a:r>
+              <a:rPr lang="fr-FR" dirty="0">
+                <a:solidFill>
+                  <a:srgbClr val="E8750C"/>
+                </a:solidFill>
+              </a:rPr>
+              <a:t> =&gt; </a:t>
+            </a:r>
+            <a:r>
+              <a:rPr lang="fr-FR" dirty="0" err="1" smtClean="0">
+                <a:solidFill>
+                  <a:srgbClr val="E8750C"/>
+                </a:solidFill>
+              </a:rPr>
+              <a:t>MultinomialNB</a:t>
+            </a:r>
+            <a:endParaRPr lang="fr-FR" dirty="0">
+              <a:solidFill>
+                <a:srgbClr val="E8750C"/>
+              </a:solidFill>
+            </a:endParaRPr>
+          </a:p>
+          <a:p>
+            <a:pPr lvl="2"/>
+            <a:r>
+              <a:rPr lang="fr-FR" dirty="0" smtClean="0">
+                <a:solidFill>
+                  <a:srgbClr val="E8750C"/>
+                </a:solidFill>
+              </a:rPr>
+              <a:t>Histogrammes fréquences =&gt; KNN custom </a:t>
+            </a:r>
+          </a:p>
+          <a:p>
+            <a:pPr lvl="3"/>
+            <a:r>
+              <a:rPr lang="fr-FR" dirty="0" err="1" smtClean="0">
+                <a:solidFill>
+                  <a:srgbClr val="E8750C"/>
+                </a:solidFill>
+              </a:rPr>
+              <a:t>Swain</a:t>
+            </a:r>
+            <a:r>
+              <a:rPr lang="fr-FR" dirty="0" smtClean="0">
+                <a:solidFill>
+                  <a:srgbClr val="E8750C"/>
+                </a:solidFill>
+              </a:rPr>
+              <a:t> </a:t>
+            </a:r>
+            <a:r>
+              <a:rPr lang="fr-FR" dirty="0">
+                <a:solidFill>
+                  <a:srgbClr val="E8750C"/>
+                </a:solidFill>
+              </a:rPr>
+              <a:t>and </a:t>
+            </a:r>
+            <a:r>
+              <a:rPr lang="fr-FR" dirty="0" smtClean="0">
+                <a:solidFill>
+                  <a:srgbClr val="E8750C"/>
+                </a:solidFill>
+              </a:rPr>
+              <a:t>Ballard, KL </a:t>
+            </a:r>
+            <a:r>
+              <a:rPr lang="fr-FR" dirty="0">
+                <a:solidFill>
+                  <a:srgbClr val="E8750C"/>
+                </a:solidFill>
+              </a:rPr>
+              <a:t>divergence ou chi2</a:t>
+            </a:r>
+          </a:p>
+          <a:p>
+            <a:pPr lvl="2"/>
+            <a:r>
+              <a:rPr lang="fr-FR" dirty="0" smtClean="0">
+                <a:solidFill>
+                  <a:srgbClr val="E8750C"/>
+                </a:solidFill>
+              </a:rPr>
+              <a:t>Moments =&gt; Normalisation et KNN</a:t>
+            </a:r>
+          </a:p>
+          <a:p>
+            <a:pPr lvl="1"/>
+            <a:r>
+              <a:rPr lang="fr-FR" dirty="0" smtClean="0">
+                <a:solidFill>
+                  <a:srgbClr val="E8750C"/>
+                </a:solidFill>
+              </a:rPr>
+              <a:t>Somme des probabilités + normalisation</a:t>
+            </a:r>
+            <a:endParaRPr lang="fr-FR" dirty="0" smtClean="0">
+              <a:solidFill>
+                <a:srgbClr val="E8750C"/>
+              </a:solidFill>
+            </a:endParaRPr>
+          </a:p>
+          <a:p>
+            <a:pPr lvl="1"/>
+            <a:r>
+              <a:rPr lang="fr-FR" dirty="0" smtClean="0">
+                <a:solidFill>
+                  <a:srgbClr val="E8750C"/>
+                </a:solidFill>
+              </a:rPr>
+              <a:t>2,73 % sur test set Vs 2,61% précédemment</a:t>
+            </a:r>
+          </a:p>
+        </p:txBody>
+      </p:sp>
+      <p:sp>
+        <p:nvSpPr>
+          <p:cNvPr id="4" name="Espace réservé de la date 3"/>
+          <p:cNvSpPr>
+            <a:spLocks noGrp="1"/>
+          </p:cNvSpPr>
+          <p:nvPr>
+            <p:ph type="dt" sz="half" idx="10"/>
+          </p:nvPr>
+        </p:nvSpPr>
+        <p:spPr/>
+        <p:txBody>
+          <a:bodyPr/>
+          <a:lstStyle/>
+          <a:p>
+            <a:fld id="{30547005-2CCE-4AAF-810C-C33FB4661996}" type="datetime1">
+              <a:rPr lang="fr-FR" smtClean="0"/>
+              <a:t>18/01/2018</a:t>
+            </a:fld>
+            <a:endParaRPr lang="fr-FR"/>
+          </a:p>
+        </p:txBody>
+      </p:sp>
+      <p:sp>
+        <p:nvSpPr>
+          <p:cNvPr id="5" name="Espace réservé du pied de page 4"/>
+          <p:cNvSpPr>
+            <a:spLocks noGrp="1"/>
+          </p:cNvSpPr>
+          <p:nvPr>
+            <p:ph type="ftr" sz="quarter" idx="11"/>
+          </p:nvPr>
+        </p:nvSpPr>
+        <p:spPr/>
+        <p:txBody>
+          <a:bodyPr/>
+          <a:lstStyle/>
+          <a:p>
+            <a:r>
+              <a:rPr lang="fr-FR" dirty="0" smtClean="0"/>
+              <a:t>MINE Nicolas</a:t>
+            </a:r>
+            <a:endParaRPr lang="fr-FR" dirty="0"/>
+          </a:p>
+        </p:txBody>
+      </p:sp>
+    </p:spTree>
+    <p:extLst>
+      <p:ext uri="{BB962C8B-B14F-4D97-AF65-F5344CB8AC3E}">
+        <p14:creationId xmlns:p14="http://schemas.microsoft.com/office/powerpoint/2010/main" val="2746249847"/>
+      </p:ext>
+    </p:extLst>
+  </p:cSld>
+  <p:clrMapOvr>
+    <a:masterClrMapping/>
+  </p:clrMapOvr>
+  <p:timing>
+    <p:tnLst>
+      <p:par>
+        <p:cTn id="1" dur="indefinite" restart="never" nodeType="tmRoot"/>
+      </p:par>
+    </p:tnLst>
+  </p:timing>
+</p:sld>
+</file>
+
+<file path=ppt/slides/slide18.xml><?xml version="1.0" encoding="utf-8"?>
+<p:sld xmlns:a="http://schemas.openxmlformats.org/drawingml/2006/main" xmlns:r="http://schemas.openxmlformats.org/officeDocument/2006/relationships" xmlns:p="http://schemas.openxmlformats.org/presentationml/2006/main">
+  <p:cSld>
+    <p:spTree>
+      <p:nvGrpSpPr>
+        <p:cNvPr id="1" name=""/>
+        <p:cNvGrpSpPr/>
+        <p:nvPr/>
+      </p:nvGrpSpPr>
+      <p:grpSpPr>
+        <a:xfrm>
+          <a:off x="0" y="0"/>
+          <a:ext cx="0" cy="0"/>
+          <a:chOff x="0" y="0"/>
+          <a:chExt cx="0" cy="0"/>
+        </a:xfrm>
+      </p:grpSpPr>
+      <p:sp>
+        <p:nvSpPr>
+          <p:cNvPr id="2" name="Titre 1"/>
+          <p:cNvSpPr>
+            <a:spLocks noGrp="1"/>
+          </p:cNvSpPr>
+          <p:nvPr>
+            <p:ph type="title"/>
+          </p:nvPr>
+        </p:nvSpPr>
+        <p:spPr/>
+        <p:txBody>
+          <a:bodyPr>
+            <a:normAutofit/>
+          </a:bodyPr>
+          <a:lstStyle/>
+          <a:p>
+            <a:r>
               <a:rPr lang="fr-FR" dirty="0"/>
               <a:t>Réseaux de Neurones</a:t>
             </a:r>
@@ -6005,7 +6776,7 @@
           <a:p>
             <a:fld id="{30547005-2CCE-4AAF-810C-C33FB4661996}" type="datetime1">
               <a:rPr lang="fr-FR" smtClean="0"/>
-              <a:t>15/01/2018</a:t>
+              <a:t>18/01/2018</a:t>
             </a:fld>
             <a:endParaRPr lang="fr-FR"/>
           </a:p>
@@ -6112,7 +6883,7 @@
 </p:sld>
 </file>
 
-<file path=ppt/slides/slide17.xml><?xml version="1.0" encoding="utf-8"?>
+<file path=ppt/slides/slide19.xml><?xml version="1.0" encoding="utf-8"?>
 <p:sld xmlns:a="http://schemas.openxmlformats.org/drawingml/2006/main" xmlns:r="http://schemas.openxmlformats.org/officeDocument/2006/relationships" xmlns:p="http://schemas.openxmlformats.org/presentationml/2006/main">
   <p:cSld>
     <p:spTree>
@@ -6230,7 +7001,7 @@
           <a:p>
             <a:fld id="{30547005-2CCE-4AAF-810C-C33FB4661996}" type="datetime1">
               <a:rPr lang="fr-FR" smtClean="0"/>
-              <a:t>15/01/2018</a:t>
+              <a:t>18/01/2018</a:t>
             </a:fld>
             <a:endParaRPr lang="fr-FR"/>
           </a:p>
@@ -6320,7 +7091,7 @@
 </p:sld>
 </file>
 
-<file path=ppt/slides/slide18.xml><?xml version="1.0" encoding="utf-8"?>
+<file path=ppt/slides/slide2.xml><?xml version="1.0" encoding="utf-8"?>
 <p:sld xmlns:a="http://schemas.openxmlformats.org/drawingml/2006/main" xmlns:r="http://schemas.openxmlformats.org/officeDocument/2006/relationships" xmlns:p="http://schemas.openxmlformats.org/presentationml/2006/main">
   <p:cSld>
     <p:spTree>
@@ -6349,6 +7120,344 @@
         </p:nvSpPr>
         <p:spPr/>
         <p:txBody>
+          <a:bodyPr/>
+          <a:lstStyle/>
+          <a:p>
+            <a:r>
+              <a:rPr lang="fr-FR" dirty="0" smtClean="0"/>
+              <a:t>Sommaire</a:t>
+            </a:r>
+            <a:endParaRPr lang="fr-FR" dirty="0"/>
+          </a:p>
+        </p:txBody>
+      </p:sp>
+      <p:sp>
+        <p:nvSpPr>
+          <p:cNvPr id="3" name="Espace réservé du contenu 2"/>
+          <p:cNvSpPr>
+            <a:spLocks noGrp="1"/>
+          </p:cNvSpPr>
+          <p:nvPr>
+            <p:ph idx="1"/>
+          </p:nvPr>
+        </p:nvSpPr>
+        <p:spPr/>
+        <p:txBody>
+          <a:bodyPr>
+            <a:normAutofit lnSpcReduction="10000"/>
+          </a:bodyPr>
+          <a:lstStyle/>
+          <a:p>
+            <a:r>
+              <a:rPr lang="fr-FR" dirty="0" smtClean="0">
+                <a:solidFill>
+                  <a:srgbClr val="E8750C"/>
+                </a:solidFill>
+              </a:rPr>
+              <a:t>Présentation et Objectifs</a:t>
+            </a:r>
+          </a:p>
+          <a:p>
+            <a:r>
+              <a:rPr lang="fr-FR" dirty="0" smtClean="0">
+                <a:solidFill>
+                  <a:srgbClr val="E8750C"/>
+                </a:solidFill>
+              </a:rPr>
+              <a:t>Exploration/Préparation</a:t>
+            </a:r>
+          </a:p>
+          <a:p>
+            <a:r>
+              <a:rPr lang="fr-FR" dirty="0" smtClean="0">
+                <a:solidFill>
+                  <a:srgbClr val="E8750C"/>
+                </a:solidFill>
+              </a:rPr>
+              <a:t>Modèles Classiques</a:t>
+            </a:r>
+          </a:p>
+          <a:p>
+            <a:r>
+              <a:rPr lang="fr-FR" dirty="0" smtClean="0">
+                <a:solidFill>
+                  <a:srgbClr val="E8750C"/>
+                </a:solidFill>
+              </a:rPr>
+              <a:t>Réseaux de Neurones</a:t>
+            </a:r>
+          </a:p>
+          <a:p>
+            <a:r>
+              <a:rPr lang="fr-FR" dirty="0" err="1" smtClean="0">
+                <a:solidFill>
+                  <a:srgbClr val="E8750C"/>
+                </a:solidFill>
+              </a:rPr>
+              <a:t>Kaggle</a:t>
+            </a:r>
+            <a:endParaRPr lang="fr-FR" dirty="0">
+              <a:solidFill>
+                <a:srgbClr val="E8750C"/>
+              </a:solidFill>
+            </a:endParaRPr>
+          </a:p>
+          <a:p>
+            <a:r>
+              <a:rPr lang="fr-FR" dirty="0" smtClean="0">
+                <a:solidFill>
+                  <a:srgbClr val="E8750C"/>
+                </a:solidFill>
+              </a:rPr>
+              <a:t>API</a:t>
+            </a:r>
+          </a:p>
+          <a:p>
+            <a:r>
+              <a:rPr lang="fr-FR" dirty="0" smtClean="0">
+                <a:solidFill>
+                  <a:srgbClr val="E8750C"/>
+                </a:solidFill>
+              </a:rPr>
+              <a:t>Pistes d’évolutions</a:t>
+            </a:r>
+          </a:p>
+          <a:p>
+            <a:r>
+              <a:rPr lang="fr-FR" dirty="0" smtClean="0">
+                <a:solidFill>
+                  <a:srgbClr val="E8750C"/>
+                </a:solidFill>
+              </a:rPr>
+              <a:t>Conclusion</a:t>
+            </a:r>
+            <a:endParaRPr lang="fr-FR" dirty="0">
+              <a:solidFill>
+                <a:srgbClr val="E8750C"/>
+              </a:solidFill>
+            </a:endParaRPr>
+          </a:p>
+        </p:txBody>
+      </p:sp>
+      <p:sp>
+        <p:nvSpPr>
+          <p:cNvPr id="4" name="Espace réservé de la date 3"/>
+          <p:cNvSpPr>
+            <a:spLocks noGrp="1"/>
+          </p:cNvSpPr>
+          <p:nvPr>
+            <p:ph type="dt" sz="half" idx="10"/>
+          </p:nvPr>
+        </p:nvSpPr>
+        <p:spPr/>
+        <p:txBody>
+          <a:bodyPr/>
+          <a:lstStyle/>
+          <a:p>
+            <a:fld id="{30547005-2CCE-4AAF-810C-C33FB4661996}" type="datetime1">
+              <a:rPr lang="fr-FR" smtClean="0"/>
+              <a:t>18/01/2018</a:t>
+            </a:fld>
+            <a:endParaRPr lang="fr-FR"/>
+          </a:p>
+        </p:txBody>
+      </p:sp>
+      <p:sp>
+        <p:nvSpPr>
+          <p:cNvPr id="5" name="Espace réservé du pied de page 4"/>
+          <p:cNvSpPr>
+            <a:spLocks noGrp="1"/>
+          </p:cNvSpPr>
+          <p:nvPr>
+            <p:ph type="ftr" sz="quarter" idx="11"/>
+          </p:nvPr>
+        </p:nvSpPr>
+        <p:spPr/>
+        <p:txBody>
+          <a:bodyPr/>
+          <a:lstStyle/>
+          <a:p>
+            <a:r>
+              <a:rPr lang="fr-FR" dirty="0" smtClean="0"/>
+              <a:t>MINE Nicolas</a:t>
+            </a:r>
+            <a:endParaRPr lang="fr-FR" dirty="0"/>
+          </a:p>
+        </p:txBody>
+      </p:sp>
+      <p:pic>
+        <p:nvPicPr>
+          <p:cNvPr id="6" name="Picture 2"/>
+          <p:cNvPicPr>
+            <a:picLocks noChangeAspect="1" noChangeArrowheads="1"/>
+          </p:cNvPicPr>
+          <p:nvPr/>
+        </p:nvPicPr>
+        <p:blipFill rotWithShape="1">
+          <a:blip r:embed="rId2">
+            <a:extLst>
+              <a:ext uri="{28A0092B-C50C-407E-A947-70E740481C1C}">
+                <a14:useLocalDpi xmlns:a14="http://schemas.microsoft.com/office/drawing/2010/main" val="0"/>
+              </a:ext>
+            </a:extLst>
+          </a:blip>
+          <a:srcRect r="50000"/>
+          <a:stretch/>
+        </p:blipFill>
+        <p:spPr bwMode="auto">
+          <a:xfrm>
+            <a:off x="5983932" y="1052736"/>
+            <a:ext cx="2835424" cy="2654735"/>
+          </a:xfrm>
+          <a:prstGeom prst="rect">
+            <a:avLst/>
+          </a:prstGeom>
+          <a:noFill/>
+          <a:ln>
+            <a:noFill/>
+          </a:ln>
+          <a:effectLst/>
+          <a:extLst>
+            <a:ext uri="{909E8E84-426E-40DD-AFC4-6F175D3DCCD1}">
+              <a14:hiddenFill xmlns:a14="http://schemas.microsoft.com/office/drawing/2010/main">
+                <a:solidFill>
+                  <a:schemeClr val="accent1"/>
+                </a:solidFill>
+              </a14:hiddenFill>
+            </a:ext>
+            <a:ext uri="{91240B29-F687-4F45-9708-019B960494DF}">
+              <a14:hiddenLine xmlns:a14="http://schemas.microsoft.com/office/drawing/2010/main" w="9525">
+                <a:solidFill>
+                  <a:schemeClr val="tx1"/>
+                </a:solidFill>
+                <a:miter lim="800000"/>
+                <a:headEnd/>
+                <a:tailEnd/>
+              </a14:hiddenLine>
+            </a:ext>
+            <a:ext uri="{AF507438-7753-43E0-B8FC-AC1667EBCBE1}">
+              <a14:hiddenEffects xmlns:a14="http://schemas.microsoft.com/office/drawing/2010/main">
+                <a:effectLst>
+                  <a:outerShdw dist="35921" dir="2700000" algn="ctr" rotWithShape="0">
+                    <a:schemeClr val="bg2"/>
+                  </a:outerShdw>
+                </a:effectLst>
+              </a14:hiddenEffects>
+            </a:ext>
+          </a:extLst>
+        </p:spPr>
+      </p:pic>
+      <p:pic>
+        <p:nvPicPr>
+          <p:cNvPr id="2051" name="Picture 3"/>
+          <p:cNvPicPr>
+            <a:picLocks noChangeAspect="1" noChangeArrowheads="1"/>
+          </p:cNvPicPr>
+          <p:nvPr/>
+        </p:nvPicPr>
+        <p:blipFill rotWithShape="1">
+          <a:blip r:embed="rId2">
+            <a:extLst>
+              <a:ext uri="{28A0092B-C50C-407E-A947-70E740481C1C}">
+                <a14:useLocalDpi xmlns:a14="http://schemas.microsoft.com/office/drawing/2010/main" val="0"/>
+              </a:ext>
+            </a:extLst>
+          </a:blip>
+          <a:srcRect l="50000" t="2427"/>
+          <a:stretch/>
+        </p:blipFill>
+        <p:spPr bwMode="auto">
+          <a:xfrm>
+            <a:off x="5983932" y="3707471"/>
+            <a:ext cx="2835424" cy="2590306"/>
+          </a:xfrm>
+          <a:prstGeom prst="rect">
+            <a:avLst/>
+          </a:prstGeom>
+          <a:noFill/>
+          <a:ln>
+            <a:noFill/>
+          </a:ln>
+          <a:effectLst/>
+          <a:extLst>
+            <a:ext uri="{909E8E84-426E-40DD-AFC4-6F175D3DCCD1}">
+              <a14:hiddenFill xmlns:a14="http://schemas.microsoft.com/office/drawing/2010/main">
+                <a:solidFill>
+                  <a:schemeClr val="accent1"/>
+                </a:solidFill>
+              </a14:hiddenFill>
+            </a:ext>
+            <a:ext uri="{91240B29-F687-4F45-9708-019B960494DF}">
+              <a14:hiddenLine xmlns:a14="http://schemas.microsoft.com/office/drawing/2010/main" w="9525">
+                <a:solidFill>
+                  <a:schemeClr val="tx1"/>
+                </a:solidFill>
+                <a:miter lim="800000"/>
+                <a:headEnd/>
+                <a:tailEnd/>
+              </a14:hiddenLine>
+            </a:ext>
+            <a:ext uri="{AF507438-7753-43E0-B8FC-AC1667EBCBE1}">
+              <a14:hiddenEffects xmlns:a14="http://schemas.microsoft.com/office/drawing/2010/main">
+                <a:effectLst>
+                  <a:outerShdw dist="35921" dir="2700000" algn="ctr" rotWithShape="0">
+                    <a:schemeClr val="bg2"/>
+                  </a:outerShdw>
+                </a:effectLst>
+              </a14:hiddenEffects>
+            </a:ext>
+          </a:extLst>
+        </p:spPr>
+      </p:pic>
+    </p:spTree>
+    <p:extLst>
+      <p:ext uri="{BB962C8B-B14F-4D97-AF65-F5344CB8AC3E}">
+        <p14:creationId xmlns:p14="http://schemas.microsoft.com/office/powerpoint/2010/main" val="3833489710"/>
+      </p:ext>
+    </p:extLst>
+  </p:cSld>
+  <p:clrMapOvr>
+    <a:masterClrMapping/>
+  </p:clrMapOvr>
+  <p:timing>
+    <p:tnLst>
+      <p:par>
+        <p:cTn id="1" dur="indefinite" restart="never" nodeType="tmRoot"/>
+      </p:par>
+    </p:tnLst>
+  </p:timing>
+</p:sld>
+</file>
+
+<file path=ppt/slides/slide20.xml><?xml version="1.0" encoding="utf-8"?>
+<p:sld xmlns:a="http://schemas.openxmlformats.org/drawingml/2006/main" xmlns:r="http://schemas.openxmlformats.org/officeDocument/2006/relationships" xmlns:p="http://schemas.openxmlformats.org/presentationml/2006/main">
+  <p:cSld>
+    <p:spTree>
+      <p:nvGrpSpPr>
+        <p:cNvPr id="1" name=""/>
+        <p:cNvGrpSpPr/>
+        <p:nvPr/>
+      </p:nvGrpSpPr>
+      <p:grpSpPr>
+        <a:xfrm>
+          <a:off x="0" y="0"/>
+          <a:ext cx="0" cy="0"/>
+          <a:chOff x="0" y="0"/>
+          <a:chExt cx="0" cy="0"/>
+        </a:xfrm>
+      </p:grpSpPr>
+      <p:sp>
+        <p:nvSpPr>
+          <p:cNvPr id="2" name="Titre 1"/>
+          <p:cNvSpPr>
+            <a:spLocks noGrp="1"/>
+          </p:cNvSpPr>
+          <p:nvPr>
+            <p:ph type="title"/>
+          </p:nvPr>
+        </p:nvSpPr>
+        <p:spPr/>
+        <p:txBody>
           <a:bodyPr>
             <a:normAutofit/>
           </a:bodyPr>
@@ -6438,7 +7547,7 @@
           <a:p>
             <a:fld id="{30547005-2CCE-4AAF-810C-C33FB4661996}" type="datetime1">
               <a:rPr lang="fr-FR" smtClean="0"/>
-              <a:t>15/01/2018</a:t>
+              <a:t>18/01/2018</a:t>
             </a:fld>
             <a:endParaRPr lang="fr-FR"/>
           </a:p>
@@ -7221,7 +8330,7 @@
 </p:sld>
 </file>
 
-<file path=ppt/slides/slide19.xml><?xml version="1.0" encoding="utf-8"?>
+<file path=ppt/slides/slide21.xml><?xml version="1.0" encoding="utf-8"?>
 <p:sld xmlns:a="http://schemas.openxmlformats.org/drawingml/2006/main" xmlns:r="http://schemas.openxmlformats.org/officeDocument/2006/relationships" xmlns:p="http://schemas.openxmlformats.org/presentationml/2006/main">
   <p:cSld>
     <p:spTree>
@@ -7329,7 +8438,7 @@
           <a:p>
             <a:fld id="{30547005-2CCE-4AAF-810C-C33FB4661996}" type="datetime1">
               <a:rPr lang="fr-FR" smtClean="0"/>
-              <a:t>15/01/2018</a:t>
+              <a:t>18/01/2018</a:t>
             </a:fld>
             <a:endParaRPr lang="fr-FR"/>
           </a:p>
@@ -7427,7 +8536,7 @@
 </p:sld>
 </file>
 
-<file path=ppt/slides/slide2.xml><?xml version="1.0" encoding="utf-8"?>
+<file path=ppt/slides/slide22.xml><?xml version="1.0" encoding="utf-8"?>
 <p:sld xmlns:a="http://schemas.openxmlformats.org/drawingml/2006/main" xmlns:r="http://schemas.openxmlformats.org/officeDocument/2006/relationships" xmlns:p="http://schemas.openxmlformats.org/presentationml/2006/main">
   <p:cSld>
     <p:spTree>
@@ -7456,14 +8565,15 @@
         </p:nvSpPr>
         <p:spPr/>
         <p:txBody>
-          <a:bodyPr/>
-          <a:lstStyle/>
-          <a:p>
-            <a:r>
-              <a:rPr lang="fr-FR" dirty="0" smtClean="0"/>
-              <a:t>Sommaire</a:t>
-            </a:r>
-            <a:endParaRPr lang="fr-FR" dirty="0"/>
+          <a:bodyPr>
+            <a:normAutofit/>
+          </a:bodyPr>
+          <a:lstStyle/>
+          <a:p>
+            <a:r>
+              <a:rPr lang="fr-FR" dirty="0"/>
+              <a:t>Réseaux de Neurones</a:t>
+            </a:r>
           </a:p>
         </p:txBody>
       </p:sp>
@@ -7480,57 +8590,71 @@
         <p:spPr/>
         <p:txBody>
           <a:bodyPr>
-            <a:normAutofit lnSpcReduction="10000"/>
+            <a:normAutofit/>
           </a:bodyPr>
           <a:lstStyle/>
           <a:p>
             <a:r>
-              <a:rPr lang="fr-FR" dirty="0" smtClean="0">
-                <a:solidFill>
-                  <a:srgbClr val="E8750C"/>
-                </a:solidFill>
-              </a:rPr>
-              <a:t>Présentation et Objectifs</a:t>
-            </a:r>
-          </a:p>
-          <a:p>
-            <a:r>
-              <a:rPr lang="fr-FR" dirty="0" smtClean="0">
-                <a:solidFill>
-                  <a:srgbClr val="E8750C"/>
-                </a:solidFill>
-              </a:rPr>
-              <a:t>Exploration/Préparation</a:t>
-            </a:r>
-          </a:p>
-          <a:p>
-            <a:r>
-              <a:rPr lang="fr-FR" dirty="0" smtClean="0">
-                <a:solidFill>
-                  <a:srgbClr val="E8750C"/>
-                </a:solidFill>
-              </a:rPr>
-              <a:t>Modèles Classiques</a:t>
-            </a:r>
-          </a:p>
-          <a:p>
-            <a:r>
-              <a:rPr lang="fr-FR" dirty="0" smtClean="0">
-                <a:solidFill>
-                  <a:srgbClr val="E8750C"/>
-                </a:solidFill>
-              </a:rPr>
-              <a:t>Réseaux de Neurones</a:t>
-            </a:r>
-          </a:p>
-          <a:p>
+              <a:rPr lang="fr-FR" dirty="0">
+                <a:solidFill>
+                  <a:srgbClr val="E8750C"/>
+                </a:solidFill>
+              </a:rPr>
+              <a:t>Test de </a:t>
+            </a:r>
+            <a:r>
+              <a:rPr lang="fr-FR" dirty="0" smtClean="0">
+                <a:solidFill>
+                  <a:srgbClr val="E8750C"/>
+                </a:solidFill>
+              </a:rPr>
+              <a:t>Classifieur</a:t>
+            </a:r>
+          </a:p>
+          <a:p>
+            <a:pPr lvl="1"/>
+            <a:r>
+              <a:rPr lang="fr-FR" dirty="0" smtClean="0">
+                <a:solidFill>
+                  <a:srgbClr val="E8750C"/>
+                </a:solidFill>
+              </a:rPr>
+              <a:t>SGDC : Reg. =&gt; Chute du %</a:t>
+            </a:r>
+          </a:p>
+          <a:p>
+            <a:pPr lvl="1"/>
+            <a:r>
+              <a:rPr lang="fr-FR" dirty="0" smtClean="0">
+                <a:solidFill>
+                  <a:srgbClr val="E8750C"/>
+                </a:solidFill>
+              </a:rPr>
+              <a:t>SVC : Top % - Mauvais </a:t>
+            </a:r>
             <a:r>
               <a:rPr lang="fr-FR" dirty="0" err="1" smtClean="0">
                 <a:solidFill>
                   <a:srgbClr val="E8750C"/>
                 </a:solidFill>
               </a:rPr>
-              <a:t>Kaggle</a:t>
+              <a:t>Loss</a:t>
+            </a:r>
+            <a:endParaRPr lang="fr-FR" dirty="0" smtClean="0">
+              <a:solidFill>
+                <a:srgbClr val="E8750C"/>
+              </a:solidFill>
+            </a:endParaRPr>
+          </a:p>
+          <a:p>
+            <a:pPr lvl="1"/>
+            <a:r>
+              <a:rPr lang="fr-FR" dirty="0" smtClean="0">
+                <a:solidFill>
+                  <a:srgbClr val="E8750C"/>
+                </a:solidFill>
+              </a:rPr>
+              <a:t>NN : D200+swish –D0,5 – D120+softmax</a:t>
             </a:r>
             <a:endParaRPr lang="fr-FR" dirty="0">
               <a:solidFill>
@@ -7538,41 +8662,6 @@
               </a:solidFill>
             </a:endParaRPr>
           </a:p>
-          <a:p>
-            <a:r>
-              <a:rPr lang="fr-FR" dirty="0" smtClean="0">
-                <a:solidFill>
-                  <a:srgbClr val="E8750C"/>
-                </a:solidFill>
-              </a:rPr>
-              <a:t>API</a:t>
-            </a:r>
-          </a:p>
-          <a:p>
-            <a:r>
-              <a:rPr lang="fr-FR" dirty="0" smtClean="0">
-                <a:solidFill>
-                  <a:srgbClr val="E8750C"/>
-                </a:solidFill>
-              </a:rPr>
-              <a:t>Pistes d’évolutions</a:t>
-            </a:r>
-          </a:p>
-          <a:p>
-            <a:r>
-              <a:rPr lang="fr-FR" dirty="0" smtClean="0">
-                <a:solidFill>
-                  <a:srgbClr val="E8750C"/>
-                </a:solidFill>
-              </a:rPr>
-              <a:t>Conclusion</a:t>
-            </a:r>
-            <a:endParaRPr lang="fr-FR" dirty="0">
-              <a:solidFill>
-                <a:srgbClr val="E8750C"/>
-              </a:solidFill>
-            </a:endParaRPr>
-          </a:p>
         </p:txBody>
       </p:sp>
       <p:sp>
@@ -7592,325 +8681,7 @@
           <a:p>
             <a:fld id="{30547005-2CCE-4AAF-810C-C33FB4661996}" type="datetime1">
               <a:rPr lang="fr-FR" smtClean="0"/>
-              <a:t>15/01/2018</a:t>
-            </a:fld>
-            <a:endParaRPr lang="fr-FR"/>
-          </a:p>
-        </p:txBody>
-      </p:sp>
-      <p:sp>
-        <p:nvSpPr>
-          <p:cNvPr id="5" name="Espace réservé du pied de page 4"/>
-          <p:cNvSpPr>
-            <a:spLocks noGrp="1"/>
-          </p:cNvSpPr>
-          <p:nvPr>
-            <p:ph type="ftr" sz="quarter" idx="11"/>
-          </p:nvPr>
-        </p:nvSpPr>
-        <p:spPr/>
-        <p:txBody>
-          <a:bodyPr/>
-          <a:lstStyle/>
-          <a:p>
-            <a:r>
-              <a:rPr lang="fr-FR" dirty="0" smtClean="0"/>
-              <a:t>MINE Nicolas</a:t>
-            </a:r>
-            <a:endParaRPr lang="fr-FR" dirty="0"/>
-          </a:p>
-        </p:txBody>
-      </p:sp>
-      <p:pic>
-        <p:nvPicPr>
-          <p:cNvPr id="6" name="Picture 2"/>
-          <p:cNvPicPr>
-            <a:picLocks noChangeAspect="1" noChangeArrowheads="1"/>
-          </p:cNvPicPr>
-          <p:nvPr/>
-        </p:nvPicPr>
-        <p:blipFill rotWithShape="1">
-          <a:blip r:embed="rId2">
-            <a:extLst>
-              <a:ext uri="{28A0092B-C50C-407E-A947-70E740481C1C}">
-                <a14:useLocalDpi xmlns:a14="http://schemas.microsoft.com/office/drawing/2010/main" val="0"/>
-              </a:ext>
-            </a:extLst>
-          </a:blip>
-          <a:srcRect r="50000"/>
-          <a:stretch/>
-        </p:blipFill>
-        <p:spPr bwMode="auto">
-          <a:xfrm>
-            <a:off x="5983932" y="1052736"/>
-            <a:ext cx="2835424" cy="2654735"/>
-          </a:xfrm>
-          <a:prstGeom prst="rect">
-            <a:avLst/>
-          </a:prstGeom>
-          <a:noFill/>
-          <a:ln>
-            <a:noFill/>
-          </a:ln>
-          <a:effectLst/>
-          <a:extLst>
-            <a:ext uri="{909E8E84-426E-40DD-AFC4-6F175D3DCCD1}">
-              <a14:hiddenFill xmlns:a14="http://schemas.microsoft.com/office/drawing/2010/main">
-                <a:solidFill>
-                  <a:schemeClr val="accent1"/>
-                </a:solidFill>
-              </a14:hiddenFill>
-            </a:ext>
-            <a:ext uri="{91240B29-F687-4F45-9708-019B960494DF}">
-              <a14:hiddenLine xmlns:a14="http://schemas.microsoft.com/office/drawing/2010/main" w="9525">
-                <a:solidFill>
-                  <a:schemeClr val="tx1"/>
-                </a:solidFill>
-                <a:miter lim="800000"/>
-                <a:headEnd/>
-                <a:tailEnd/>
-              </a14:hiddenLine>
-            </a:ext>
-            <a:ext uri="{AF507438-7753-43E0-B8FC-AC1667EBCBE1}">
-              <a14:hiddenEffects xmlns:a14="http://schemas.microsoft.com/office/drawing/2010/main">
-                <a:effectLst>
-                  <a:outerShdw dist="35921" dir="2700000" algn="ctr" rotWithShape="0">
-                    <a:schemeClr val="bg2"/>
-                  </a:outerShdw>
-                </a:effectLst>
-              </a14:hiddenEffects>
-            </a:ext>
-          </a:extLst>
-        </p:spPr>
-      </p:pic>
-      <p:pic>
-        <p:nvPicPr>
-          <p:cNvPr id="2051" name="Picture 3"/>
-          <p:cNvPicPr>
-            <a:picLocks noChangeAspect="1" noChangeArrowheads="1"/>
-          </p:cNvPicPr>
-          <p:nvPr/>
-        </p:nvPicPr>
-        <p:blipFill rotWithShape="1">
-          <a:blip r:embed="rId2">
-            <a:extLst>
-              <a:ext uri="{28A0092B-C50C-407E-A947-70E740481C1C}">
-                <a14:useLocalDpi xmlns:a14="http://schemas.microsoft.com/office/drawing/2010/main" val="0"/>
-              </a:ext>
-            </a:extLst>
-          </a:blip>
-          <a:srcRect l="50000" t="2427"/>
-          <a:stretch/>
-        </p:blipFill>
-        <p:spPr bwMode="auto">
-          <a:xfrm>
-            <a:off x="5983932" y="3707471"/>
-            <a:ext cx="2835424" cy="2590306"/>
-          </a:xfrm>
-          <a:prstGeom prst="rect">
-            <a:avLst/>
-          </a:prstGeom>
-          <a:noFill/>
-          <a:ln>
-            <a:noFill/>
-          </a:ln>
-          <a:effectLst/>
-          <a:extLst>
-            <a:ext uri="{909E8E84-426E-40DD-AFC4-6F175D3DCCD1}">
-              <a14:hiddenFill xmlns:a14="http://schemas.microsoft.com/office/drawing/2010/main">
-                <a:solidFill>
-                  <a:schemeClr val="accent1"/>
-                </a:solidFill>
-              </a14:hiddenFill>
-            </a:ext>
-            <a:ext uri="{91240B29-F687-4F45-9708-019B960494DF}">
-              <a14:hiddenLine xmlns:a14="http://schemas.microsoft.com/office/drawing/2010/main" w="9525">
-                <a:solidFill>
-                  <a:schemeClr val="tx1"/>
-                </a:solidFill>
-                <a:miter lim="800000"/>
-                <a:headEnd/>
-                <a:tailEnd/>
-              </a14:hiddenLine>
-            </a:ext>
-            <a:ext uri="{AF507438-7753-43E0-B8FC-AC1667EBCBE1}">
-              <a14:hiddenEffects xmlns:a14="http://schemas.microsoft.com/office/drawing/2010/main">
-                <a:effectLst>
-                  <a:outerShdw dist="35921" dir="2700000" algn="ctr" rotWithShape="0">
-                    <a:schemeClr val="bg2"/>
-                  </a:outerShdw>
-                </a:effectLst>
-              </a14:hiddenEffects>
-            </a:ext>
-          </a:extLst>
-        </p:spPr>
-      </p:pic>
-    </p:spTree>
-    <p:extLst>
-      <p:ext uri="{BB962C8B-B14F-4D97-AF65-F5344CB8AC3E}">
-        <p14:creationId xmlns:p14="http://schemas.microsoft.com/office/powerpoint/2010/main" val="3833489710"/>
-      </p:ext>
-    </p:extLst>
-  </p:cSld>
-  <p:clrMapOvr>
-    <a:masterClrMapping/>
-  </p:clrMapOvr>
-  <p:timing>
-    <p:tnLst>
-      <p:par>
-        <p:cTn id="1" dur="indefinite" restart="never" nodeType="tmRoot"/>
-      </p:par>
-    </p:tnLst>
-  </p:timing>
-</p:sld>
-</file>
-
-<file path=ppt/slides/slide20.xml><?xml version="1.0" encoding="utf-8"?>
-<p:sld xmlns:a="http://schemas.openxmlformats.org/drawingml/2006/main" xmlns:r="http://schemas.openxmlformats.org/officeDocument/2006/relationships" xmlns:p="http://schemas.openxmlformats.org/presentationml/2006/main">
-  <p:cSld>
-    <p:spTree>
-      <p:nvGrpSpPr>
-        <p:cNvPr id="1" name=""/>
-        <p:cNvGrpSpPr/>
-        <p:nvPr/>
-      </p:nvGrpSpPr>
-      <p:grpSpPr>
-        <a:xfrm>
-          <a:off x="0" y="0"/>
-          <a:ext cx="0" cy="0"/>
-          <a:chOff x="0" y="0"/>
-          <a:chExt cx="0" cy="0"/>
-        </a:xfrm>
-      </p:grpSpPr>
-      <p:sp>
-        <p:nvSpPr>
-          <p:cNvPr id="2" name="Titre 1"/>
-          <p:cNvSpPr>
-            <a:spLocks noGrp="1"/>
-          </p:cNvSpPr>
-          <p:nvPr>
-            <p:ph type="title"/>
-          </p:nvPr>
-        </p:nvSpPr>
-        <p:spPr/>
-        <p:txBody>
-          <a:bodyPr>
-            <a:normAutofit/>
-          </a:bodyPr>
-          <a:lstStyle/>
-          <a:p>
-            <a:r>
-              <a:rPr lang="fr-FR" dirty="0"/>
-              <a:t>Réseaux de Neurones</a:t>
-            </a:r>
-          </a:p>
-        </p:txBody>
-      </p:sp>
-      <p:sp>
-        <p:nvSpPr>
-          <p:cNvPr id="3" name="Espace réservé du contenu 2"/>
-          <p:cNvSpPr>
-            <a:spLocks noGrp="1"/>
-          </p:cNvSpPr>
-          <p:nvPr>
-            <p:ph idx="1"/>
-          </p:nvPr>
-        </p:nvSpPr>
-        <p:spPr/>
-        <p:txBody>
-          <a:bodyPr>
-            <a:normAutofit/>
-          </a:bodyPr>
-          <a:lstStyle/>
-          <a:p>
-            <a:r>
-              <a:rPr lang="fr-FR" dirty="0">
-                <a:solidFill>
-                  <a:srgbClr val="E8750C"/>
-                </a:solidFill>
-              </a:rPr>
-              <a:t>Test de </a:t>
-            </a:r>
-            <a:r>
-              <a:rPr lang="fr-FR" dirty="0" smtClean="0">
-                <a:solidFill>
-                  <a:srgbClr val="E8750C"/>
-                </a:solidFill>
-              </a:rPr>
-              <a:t>Classifieur</a:t>
-            </a:r>
-          </a:p>
-          <a:p>
-            <a:pPr lvl="1"/>
-            <a:r>
-              <a:rPr lang="fr-FR" dirty="0" smtClean="0">
-                <a:solidFill>
-                  <a:srgbClr val="E8750C"/>
-                </a:solidFill>
-              </a:rPr>
-              <a:t>SGDC : Reg. =&gt; Chute du %</a:t>
-            </a:r>
-          </a:p>
-          <a:p>
-            <a:pPr lvl="1"/>
-            <a:r>
-              <a:rPr lang="fr-FR" dirty="0" smtClean="0">
-                <a:solidFill>
-                  <a:srgbClr val="E8750C"/>
-                </a:solidFill>
-              </a:rPr>
-              <a:t>SVC : Top % - Mauvais </a:t>
-            </a:r>
-            <a:r>
-              <a:rPr lang="fr-FR" dirty="0" err="1" smtClean="0">
-                <a:solidFill>
-                  <a:srgbClr val="E8750C"/>
-                </a:solidFill>
-              </a:rPr>
-              <a:t>Loss</a:t>
-            </a:r>
-            <a:endParaRPr lang="fr-FR" dirty="0" smtClean="0">
-              <a:solidFill>
-                <a:srgbClr val="E8750C"/>
-              </a:solidFill>
-            </a:endParaRPr>
-          </a:p>
-          <a:p>
-            <a:pPr lvl="1"/>
-            <a:r>
-              <a:rPr lang="fr-FR" dirty="0" smtClean="0">
-                <a:solidFill>
-                  <a:srgbClr val="E8750C"/>
-                </a:solidFill>
-              </a:rPr>
-              <a:t>NN : D200+swish –D0,5 – D120+softmax</a:t>
-            </a:r>
-            <a:endParaRPr lang="fr-FR" dirty="0">
-              <a:solidFill>
-                <a:srgbClr val="E8750C"/>
-              </a:solidFill>
-            </a:endParaRPr>
-          </a:p>
-        </p:txBody>
-      </p:sp>
-      <p:sp>
-        <p:nvSpPr>
-          <p:cNvPr id="4" name="Espace réservé de la date 3"/>
-          <p:cNvSpPr>
-            <a:spLocks noGrp="1"/>
-          </p:cNvSpPr>
-          <p:nvPr>
-            <p:ph type="dt" sz="half" idx="10"/>
-          </p:nvPr>
-        </p:nvSpPr>
-        <p:spPr/>
-        <p:txBody>
-          <a:bodyPr/>
-          <a:lstStyle/>
-          <a:p>
-            <a:fld id="{30547005-2CCE-4AAF-810C-C33FB4661996}" type="datetime1">
-              <a:rPr lang="fr-FR" smtClean="0"/>
-              <a:t>15/01/2018</a:t>
+              <a:t>18/01/2018</a:t>
             </a:fld>
             <a:endParaRPr lang="fr-FR"/>
           </a:p>
@@ -8569,7 +9340,7 @@
 </p:sld>
 </file>
 
-<file path=ppt/slides/slide21.xml><?xml version="1.0" encoding="utf-8"?>
+<file path=ppt/slides/slide23.xml><?xml version="1.0" encoding="utf-8"?>
 <p:sld xmlns:a="http://schemas.openxmlformats.org/drawingml/2006/main" xmlns:r="http://schemas.openxmlformats.org/officeDocument/2006/relationships" xmlns:p="http://schemas.openxmlformats.org/presentationml/2006/main">
   <p:cSld>
     <p:spTree>
@@ -8667,7 +9438,7 @@
           <a:p>
             <a:fld id="{30547005-2CCE-4AAF-810C-C33FB4661996}" type="datetime1">
               <a:rPr lang="fr-FR" smtClean="0"/>
-              <a:t>15/01/2018</a:t>
+              <a:t>18/01/2018</a:t>
             </a:fld>
             <a:endParaRPr lang="fr-FR"/>
           </a:p>
@@ -8855,7 +9626,7 @@
 </p:sld>
 </file>
 
-<file path=ppt/slides/slide22.xml><?xml version="1.0" encoding="utf-8"?>
+<file path=ppt/slides/slide24.xml><?xml version="1.0" encoding="utf-8"?>
 <p:sld xmlns:a="http://schemas.openxmlformats.org/drawingml/2006/main" xmlns:r="http://schemas.openxmlformats.org/officeDocument/2006/relationships" xmlns:p="http://schemas.openxmlformats.org/presentationml/2006/main">
   <p:cSld>
     <p:spTree>
@@ -9400,7 +10171,7 @@
           <a:p>
             <a:fld id="{30547005-2CCE-4AAF-810C-C33FB4661996}" type="datetime1">
               <a:rPr lang="fr-FR" smtClean="0"/>
-              <a:t>15/01/2018</a:t>
+              <a:t>18/01/2018</a:t>
             </a:fld>
             <a:endParaRPr lang="fr-FR"/>
           </a:p>
@@ -9449,7 +10220,7 @@
 </p:sld>
 </file>
 
-<file path=ppt/slides/slide23.xml><?xml version="1.0" encoding="utf-8"?>
+<file path=ppt/slides/slide25.xml><?xml version="1.0" encoding="utf-8"?>
 <p:sld xmlns:a="http://schemas.openxmlformats.org/drawingml/2006/main" xmlns:r="http://schemas.openxmlformats.org/officeDocument/2006/relationships" xmlns:p="http://schemas.openxmlformats.org/presentationml/2006/main">
   <p:cSld>
     <p:spTree>
@@ -9621,7 +10392,7 @@
                   <a:srgbClr val="95023C"/>
                 </a:solidFill>
               </a:rPr>
-              <a:t>imgn</a:t>
+              <a:t>imgN</a:t>
             </a:r>
             <a:endParaRPr lang="fr-FR" sz="2800" dirty="0" smtClean="0">
               <a:solidFill>
@@ -9648,7 +10419,7 @@
           <a:p>
             <a:fld id="{30547005-2CCE-4AAF-810C-C33FB4661996}" type="datetime1">
               <a:rPr lang="fr-FR" smtClean="0"/>
-              <a:t>15/01/2018</a:t>
+              <a:t>18/01/2018</a:t>
             </a:fld>
             <a:endParaRPr lang="fr-FR"/>
           </a:p>
@@ -9697,7 +10468,7 @@
 </p:sld>
 </file>
 
-<file path=ppt/slides/slide24.xml><?xml version="1.0" encoding="utf-8"?>
+<file path=ppt/slides/slide26.xml><?xml version="1.0" encoding="utf-8"?>
 <p:sld xmlns:a="http://schemas.openxmlformats.org/drawingml/2006/main" xmlns:r="http://schemas.openxmlformats.org/officeDocument/2006/relationships" xmlns:p="http://schemas.openxmlformats.org/presentationml/2006/main">
   <p:cSld>
     <p:spTree>
@@ -9756,7 +10527,7 @@
           <a:p>
             <a:fld id="{30547005-2CCE-4AAF-810C-C33FB4661996}" type="datetime1">
               <a:rPr lang="fr-FR" smtClean="0"/>
-              <a:t>15/01/2018</a:t>
+              <a:t>18/01/2018</a:t>
             </a:fld>
             <a:endParaRPr lang="fr-FR"/>
           </a:p>
@@ -9949,7 +10720,7 @@
 </p:sld>
 </file>
 
-<file path=ppt/slides/slide25.xml><?xml version="1.0" encoding="utf-8"?>
+<file path=ppt/slides/slide27.xml><?xml version="1.0" encoding="utf-8"?>
 <p:sld xmlns:a="http://schemas.openxmlformats.org/drawingml/2006/main" xmlns:r="http://schemas.openxmlformats.org/officeDocument/2006/relationships" xmlns:p="http://schemas.openxmlformats.org/presentationml/2006/main">
   <p:cSld>
     <p:spTree>
@@ -10018,8 +10789,65 @@
                   <a:srgbClr val="E8750C"/>
                 </a:solidFill>
               </a:rPr>
-              <a:t>Modèle Classique</a:t>
-            </a:r>
+              <a:t>Modèle </a:t>
+            </a:r>
+            <a:r>
+              <a:rPr lang="fr-FR" dirty="0" smtClean="0">
+                <a:solidFill>
+                  <a:srgbClr val="E8750C"/>
+                </a:solidFill>
+              </a:rPr>
+              <a:t>Classique</a:t>
+            </a:r>
+          </a:p>
+          <a:p>
+            <a:pPr lvl="1"/>
+            <a:r>
+              <a:rPr lang="fr-FR" dirty="0" smtClean="0">
+                <a:solidFill>
+                  <a:srgbClr val="E8750C"/>
+                </a:solidFill>
+              </a:rPr>
+              <a:t>Fréquences sur image non réduites</a:t>
+            </a:r>
+          </a:p>
+          <a:p>
+            <a:pPr lvl="1"/>
+            <a:r>
+              <a:rPr lang="fr-FR" dirty="0" smtClean="0">
+                <a:solidFill>
+                  <a:srgbClr val="E8750C"/>
+                </a:solidFill>
+              </a:rPr>
+              <a:t>Autre descripteurs au lieu de SIFT (SURF / ORB)</a:t>
+            </a:r>
+          </a:p>
+          <a:p>
+            <a:pPr lvl="1"/>
+            <a:r>
+              <a:rPr lang="fr-FR" dirty="0" smtClean="0">
+                <a:solidFill>
+                  <a:srgbClr val="E8750C"/>
+                </a:solidFill>
+              </a:rPr>
+              <a:t>Contours ?</a:t>
+            </a:r>
+          </a:p>
+          <a:p>
+            <a:pPr lvl="2"/>
+            <a:r>
+              <a:rPr lang="fr-FR" dirty="0" smtClean="0">
+                <a:solidFill>
+                  <a:srgbClr val="E8750C"/>
+                </a:solidFill>
+              </a:rPr>
+              <a:t>Différentes focales</a:t>
+            </a:r>
+            <a:endParaRPr lang="fr-FR" dirty="0" smtClean="0">
+              <a:solidFill>
+                <a:srgbClr val="E8750C"/>
+              </a:solidFill>
+            </a:endParaRPr>
           </a:p>
           <a:p>
             <a:endParaRPr lang="fr-FR" sz="2800" dirty="0">
@@ -10055,7 +10883,7 @@
           <a:p>
             <a:fld id="{30547005-2CCE-4AAF-810C-C33FB4661996}" type="datetime1">
               <a:rPr lang="fr-FR" smtClean="0"/>
-              <a:t>15/01/2018</a:t>
+              <a:t>18/01/2018</a:t>
             </a:fld>
             <a:endParaRPr lang="fr-FR"/>
           </a:p>
@@ -10104,7 +10932,7 @@
 </p:sld>
 </file>
 
-<file path=ppt/slides/slide26.xml><?xml version="1.0" encoding="utf-8"?>
+<file path=ppt/slides/slide28.xml><?xml version="1.0" encoding="utf-8"?>
 <p:sld xmlns:a="http://schemas.openxmlformats.org/drawingml/2006/main" xmlns:r="http://schemas.openxmlformats.org/officeDocument/2006/relationships" xmlns:p="http://schemas.openxmlformats.org/presentationml/2006/main">
   <p:cSld>
     <p:spTree>
@@ -10407,7 +11235,7 @@
           <a:p>
             <a:fld id="{30547005-2CCE-4AAF-810C-C33FB4661996}" type="datetime1">
               <a:rPr lang="fr-FR" smtClean="0"/>
-              <a:t>15/01/2018</a:t>
+              <a:t>18/01/2018</a:t>
             </a:fld>
             <a:endParaRPr lang="fr-FR"/>
           </a:p>
@@ -10456,7 +11284,7 @@
 </p:sld>
 </file>
 
-<file path=ppt/slides/slide27.xml><?xml version="1.0" encoding="utf-8"?>
+<file path=ppt/slides/slide29.xml><?xml version="1.0" encoding="utf-8"?>
 <p:sld xmlns:a="http://schemas.openxmlformats.org/drawingml/2006/main" xmlns:r="http://schemas.openxmlformats.org/officeDocument/2006/relationships" xmlns:p="http://schemas.openxmlformats.org/presentationml/2006/main">
   <p:cSld>
     <p:spTree>
@@ -10643,7 +11471,7 @@
           <a:p>
             <a:fld id="{30547005-2CCE-4AAF-810C-C33FB4661996}" type="datetime1">
               <a:rPr lang="fr-FR" smtClean="0"/>
-              <a:t>15/01/2018</a:t>
+              <a:t>18/01/2018</a:t>
             </a:fld>
             <a:endParaRPr lang="fr-FR"/>
           </a:p>
@@ -10743,367 +11571,6 @@
 </p:sld>
 </file>
 
-<file path=ppt/slides/slide28.xml><?xml version="1.0" encoding="utf-8"?>
-<p:sld xmlns:a="http://schemas.openxmlformats.org/drawingml/2006/main" xmlns:r="http://schemas.openxmlformats.org/officeDocument/2006/relationships" xmlns:p="http://schemas.openxmlformats.org/presentationml/2006/main">
-  <p:cSld>
-    <p:spTree>
-      <p:nvGrpSpPr>
-        <p:cNvPr id="1" name=""/>
-        <p:cNvGrpSpPr/>
-        <p:nvPr/>
-      </p:nvGrpSpPr>
-      <p:grpSpPr>
-        <a:xfrm>
-          <a:off x="0" y="0"/>
-          <a:ext cx="0" cy="0"/>
-          <a:chOff x="0" y="0"/>
-          <a:chExt cx="0" cy="0"/>
-        </a:xfrm>
-      </p:grpSpPr>
-      <p:sp>
-        <p:nvSpPr>
-          <p:cNvPr id="2" name="Titre 1"/>
-          <p:cNvSpPr>
-            <a:spLocks noGrp="1"/>
-          </p:cNvSpPr>
-          <p:nvPr>
-            <p:ph type="title"/>
-          </p:nvPr>
-        </p:nvSpPr>
-        <p:spPr/>
-        <p:txBody>
-          <a:bodyPr>
-            <a:normAutofit/>
-          </a:bodyPr>
-          <a:lstStyle/>
-          <a:p>
-            <a:r>
-              <a:rPr lang="fr-FR" dirty="0"/>
-              <a:t>Pistes d’évolutions</a:t>
-            </a:r>
-          </a:p>
-        </p:txBody>
-      </p:sp>
-      <p:sp>
-        <p:nvSpPr>
-          <p:cNvPr id="4" name="Espace réservé de la date 3"/>
-          <p:cNvSpPr>
-            <a:spLocks noGrp="1"/>
-          </p:cNvSpPr>
-          <p:nvPr>
-            <p:ph type="dt" sz="half" idx="10"/>
-          </p:nvPr>
-        </p:nvSpPr>
-        <p:spPr/>
-        <p:txBody>
-          <a:bodyPr/>
-          <a:lstStyle/>
-          <a:p>
-            <a:fld id="{30547005-2CCE-4AAF-810C-C33FB4661996}" type="datetime1">
-              <a:rPr lang="fr-FR" smtClean="0"/>
-              <a:t>15/01/2018</a:t>
-            </a:fld>
-            <a:endParaRPr lang="fr-FR"/>
-          </a:p>
-        </p:txBody>
-      </p:sp>
-      <p:sp>
-        <p:nvSpPr>
-          <p:cNvPr id="5" name="Espace réservé du pied de page 4"/>
-          <p:cNvSpPr>
-            <a:spLocks noGrp="1"/>
-          </p:cNvSpPr>
-          <p:nvPr>
-            <p:ph type="ftr" sz="quarter" idx="11"/>
-          </p:nvPr>
-        </p:nvSpPr>
-        <p:spPr/>
-        <p:txBody>
-          <a:bodyPr/>
-          <a:lstStyle/>
-          <a:p>
-            <a:r>
-              <a:rPr lang="fr-FR" dirty="0" smtClean="0"/>
-              <a:t>MINE Nicolas</a:t>
-            </a:r>
-            <a:endParaRPr lang="fr-FR" dirty="0"/>
-          </a:p>
-        </p:txBody>
-      </p:sp>
-      <p:pic>
-        <p:nvPicPr>
-          <p:cNvPr id="9218" name="Picture 2" descr="Résultat de recherche d'images pour &quot;VGG CAM&quot;"/>
-          <p:cNvPicPr>
-            <a:picLocks noChangeAspect="1" noChangeArrowheads="1"/>
-          </p:cNvPicPr>
-          <p:nvPr/>
-        </p:nvPicPr>
-        <p:blipFill>
-          <a:blip r:embed="rId2">
-            <a:extLst>
-              <a:ext uri="{28A0092B-C50C-407E-A947-70E740481C1C}">
-                <a14:useLocalDpi xmlns:a14="http://schemas.microsoft.com/office/drawing/2010/main" val="0"/>
-              </a:ext>
-            </a:extLst>
-          </a:blip>
-          <a:srcRect/>
-          <a:stretch>
-            <a:fillRect/>
-          </a:stretch>
-        </p:blipFill>
-        <p:spPr bwMode="auto">
-          <a:xfrm>
-            <a:off x="411148" y="1546880"/>
-            <a:ext cx="8192909" cy="4608512"/>
-          </a:xfrm>
-          <a:prstGeom prst="rect">
-            <a:avLst/>
-          </a:prstGeom>
-          <a:noFill/>
-          <a:extLst>
-            <a:ext uri="{909E8E84-426E-40DD-AFC4-6F175D3DCCD1}">
-              <a14:hiddenFill xmlns:a14="http://schemas.microsoft.com/office/drawing/2010/main">
-                <a:solidFill>
-                  <a:srgbClr val="FFFFFF"/>
-                </a:solidFill>
-              </a14:hiddenFill>
-            </a:ext>
-          </a:extLst>
-        </p:spPr>
-      </p:pic>
-    </p:spTree>
-    <p:extLst>
-      <p:ext uri="{BB962C8B-B14F-4D97-AF65-F5344CB8AC3E}">
-        <p14:creationId xmlns:p14="http://schemas.microsoft.com/office/powerpoint/2010/main" val="3576099075"/>
-      </p:ext>
-    </p:extLst>
-  </p:cSld>
-  <p:clrMapOvr>
-    <a:masterClrMapping/>
-  </p:clrMapOvr>
-  <p:timing>
-    <p:tnLst>
-      <p:par>
-        <p:cTn id="1" dur="indefinite" restart="never" nodeType="tmRoot"/>
-      </p:par>
-    </p:tnLst>
-  </p:timing>
-</p:sld>
-</file>
-
-<file path=ppt/slides/slide29.xml><?xml version="1.0" encoding="utf-8"?>
-<p:sld xmlns:a="http://schemas.openxmlformats.org/drawingml/2006/main" xmlns:r="http://schemas.openxmlformats.org/officeDocument/2006/relationships" xmlns:p="http://schemas.openxmlformats.org/presentationml/2006/main">
-  <p:cSld>
-    <p:spTree>
-      <p:nvGrpSpPr>
-        <p:cNvPr id="1" name=""/>
-        <p:cNvGrpSpPr/>
-        <p:nvPr/>
-      </p:nvGrpSpPr>
-      <p:grpSpPr>
-        <a:xfrm>
-          <a:off x="0" y="0"/>
-          <a:ext cx="0" cy="0"/>
-          <a:chOff x="0" y="0"/>
-          <a:chExt cx="0" cy="0"/>
-        </a:xfrm>
-      </p:grpSpPr>
-      <p:sp>
-        <p:nvSpPr>
-          <p:cNvPr id="2" name="Titre 1"/>
-          <p:cNvSpPr>
-            <a:spLocks noGrp="1"/>
-          </p:cNvSpPr>
-          <p:nvPr>
-            <p:ph type="title"/>
-          </p:nvPr>
-        </p:nvSpPr>
-        <p:spPr/>
-        <p:txBody>
-          <a:bodyPr>
-            <a:normAutofit/>
-          </a:bodyPr>
-          <a:lstStyle/>
-          <a:p>
-            <a:r>
-              <a:rPr lang="fr-FR" dirty="0" smtClean="0"/>
-              <a:t>Conclusion</a:t>
-            </a:r>
-            <a:endParaRPr lang="fr-FR" dirty="0"/>
-          </a:p>
-        </p:txBody>
-      </p:sp>
-      <p:sp>
-        <p:nvSpPr>
-          <p:cNvPr id="3" name="Espace réservé du contenu 2"/>
-          <p:cNvSpPr>
-            <a:spLocks noGrp="1"/>
-          </p:cNvSpPr>
-          <p:nvPr>
-            <p:ph idx="1"/>
-          </p:nvPr>
-        </p:nvSpPr>
-        <p:spPr>
-          <a:xfrm>
-            <a:off x="457200" y="1600200"/>
-            <a:ext cx="8229600" cy="4709120"/>
-          </a:xfrm>
-        </p:spPr>
-        <p:txBody>
-          <a:bodyPr>
-            <a:normAutofit/>
-          </a:bodyPr>
-          <a:lstStyle/>
-          <a:p>
-            <a:r>
-              <a:rPr lang="fr-FR" sz="2800" dirty="0" smtClean="0">
-                <a:solidFill>
-                  <a:srgbClr val="E8750C"/>
-                </a:solidFill>
-              </a:rPr>
-              <a:t>Découverte de l’Analyse de Texte</a:t>
-            </a:r>
-          </a:p>
-          <a:p>
-            <a:r>
-              <a:rPr lang="fr-FR" sz="2800" dirty="0" smtClean="0">
-                <a:solidFill>
-                  <a:srgbClr val="E8750C"/>
-                </a:solidFill>
-              </a:rPr>
-              <a:t>Pas d’analyse de contexte</a:t>
-            </a:r>
-          </a:p>
-          <a:p>
-            <a:r>
-              <a:rPr lang="fr-FR" sz="2800" dirty="0" smtClean="0">
-                <a:solidFill>
-                  <a:srgbClr val="E8750C"/>
-                </a:solidFill>
-              </a:rPr>
-              <a:t>Résultats corrects en supervisé</a:t>
-            </a:r>
-          </a:p>
-          <a:p>
-            <a:r>
-              <a:rPr lang="fr-FR" sz="2800" dirty="0" smtClean="0">
-                <a:solidFill>
-                  <a:srgbClr val="E8750C"/>
-                </a:solidFill>
-              </a:rPr>
-              <a:t>Résultats moyen en non supervisé (parfois incohérents)</a:t>
-            </a:r>
-          </a:p>
-          <a:p>
-            <a:r>
-              <a:rPr lang="fr-FR" sz="2800" dirty="0" smtClean="0">
-                <a:solidFill>
-                  <a:srgbClr val="E8750C"/>
-                </a:solidFill>
-              </a:rPr>
-              <a:t>Diverses difficultés:</a:t>
-            </a:r>
-          </a:p>
-          <a:p>
-            <a:pPr lvl="1"/>
-            <a:r>
-              <a:rPr lang="fr-FR" sz="2400" dirty="0" smtClean="0">
-                <a:solidFill>
-                  <a:srgbClr val="E8750C"/>
-                </a:solidFill>
-              </a:rPr>
-              <a:t>Taille des textes (petit comparé à des livres/articles)</a:t>
-            </a:r>
-            <a:endParaRPr lang="fr-FR" sz="2400" dirty="0">
-              <a:solidFill>
-                <a:srgbClr val="E8750C"/>
-              </a:solidFill>
-            </a:endParaRPr>
-          </a:p>
-          <a:p>
-            <a:pPr lvl="1"/>
-            <a:r>
-              <a:rPr lang="fr-FR" sz="2400" dirty="0" smtClean="0">
-                <a:solidFill>
-                  <a:srgbClr val="E8750C"/>
-                </a:solidFill>
-              </a:rPr>
-              <a:t>Topics tous très proches (programmation)</a:t>
-            </a:r>
-            <a:endParaRPr lang="fr-FR" sz="2400" dirty="0">
-              <a:solidFill>
-                <a:srgbClr val="E8750C"/>
-              </a:solidFill>
-            </a:endParaRPr>
-          </a:p>
-        </p:txBody>
-      </p:sp>
-      <p:sp>
-        <p:nvSpPr>
-          <p:cNvPr id="4" name="Espace réservé de la date 3"/>
-          <p:cNvSpPr>
-            <a:spLocks noGrp="1"/>
-          </p:cNvSpPr>
-          <p:nvPr>
-            <p:ph type="dt" sz="half" idx="10"/>
-          </p:nvPr>
-        </p:nvSpPr>
-        <p:spPr/>
-        <p:txBody>
-          <a:bodyPr/>
-          <a:lstStyle/>
-          <a:p>
-            <a:fld id="{30547005-2CCE-4AAF-810C-C33FB4661996}" type="datetime1">
-              <a:rPr lang="fr-FR" smtClean="0"/>
-              <a:t>15/01/2018</a:t>
-            </a:fld>
-            <a:endParaRPr lang="fr-FR"/>
-          </a:p>
-        </p:txBody>
-      </p:sp>
-      <p:sp>
-        <p:nvSpPr>
-          <p:cNvPr id="5" name="Espace réservé du pied de page 4"/>
-          <p:cNvSpPr>
-            <a:spLocks noGrp="1"/>
-          </p:cNvSpPr>
-          <p:nvPr>
-            <p:ph type="ftr" sz="quarter" idx="11"/>
-          </p:nvPr>
-        </p:nvSpPr>
-        <p:spPr/>
-        <p:txBody>
-          <a:bodyPr/>
-          <a:lstStyle/>
-          <a:p>
-            <a:r>
-              <a:rPr lang="fr-FR" dirty="0" smtClean="0"/>
-              <a:t>MINE Nicolas</a:t>
-            </a:r>
-            <a:endParaRPr lang="fr-FR" dirty="0"/>
-          </a:p>
-        </p:txBody>
-      </p:sp>
-    </p:spTree>
-    <p:extLst>
-      <p:ext uri="{BB962C8B-B14F-4D97-AF65-F5344CB8AC3E}">
-        <p14:creationId xmlns:p14="http://schemas.microsoft.com/office/powerpoint/2010/main" val="1492226381"/>
-      </p:ext>
-    </p:extLst>
-  </p:cSld>
-  <p:clrMapOvr>
-    <a:masterClrMapping/>
-  </p:clrMapOvr>
-  <p:timing>
-    <p:tnLst>
-      <p:par>
-        <p:cTn id="1" dur="indefinite" restart="never" nodeType="tmRoot"/>
-      </p:par>
-    </p:tnLst>
-  </p:timing>
-</p:sld>
-</file>
-
 <file path=ppt/slides/slide3.xml><?xml version="1.0" encoding="utf-8"?>
 <p:sld xmlns:a="http://schemas.openxmlformats.org/drawingml/2006/main" xmlns:r="http://schemas.openxmlformats.org/officeDocument/2006/relationships" xmlns:p="http://schemas.openxmlformats.org/presentationml/2006/main">
   <p:cSld>
@@ -11340,7 +11807,7 @@
           <a:p>
             <a:fld id="{30547005-2CCE-4AAF-810C-C33FB4661996}" type="datetime1">
               <a:rPr lang="fr-FR" smtClean="0"/>
-              <a:t>15/01/2018</a:t>
+              <a:t>18/01/2018</a:t>
             </a:fld>
             <a:endParaRPr lang="fr-FR"/>
           </a:p>
@@ -11408,6 +11875,30 @@
       </p:grpSpPr>
       <p:sp>
         <p:nvSpPr>
+          <p:cNvPr id="2" name="Titre 1"/>
+          <p:cNvSpPr>
+            <a:spLocks noGrp="1"/>
+          </p:cNvSpPr>
+          <p:nvPr>
+            <p:ph type="title"/>
+          </p:nvPr>
+        </p:nvSpPr>
+        <p:spPr/>
+        <p:txBody>
+          <a:bodyPr>
+            <a:normAutofit/>
+          </a:bodyPr>
+          <a:lstStyle/>
+          <a:p>
+            <a:r>
+              <a:rPr lang="fr-FR" dirty="0"/>
+              <a:t>Pistes d’évolutions</a:t>
+            </a:r>
+          </a:p>
+        </p:txBody>
+      </p:sp>
+      <p:sp>
+        <p:nvSpPr>
           <p:cNvPr id="4" name="Espace réservé de la date 3"/>
           <p:cNvSpPr>
             <a:spLocks noGrp="1"/>
@@ -11423,7 +11914,350 @@
           <a:p>
             <a:fld id="{30547005-2CCE-4AAF-810C-C33FB4661996}" type="datetime1">
               <a:rPr lang="fr-FR" smtClean="0"/>
-              <a:t>15/01/2018</a:t>
+              <a:t>18/01/2018</a:t>
+            </a:fld>
+            <a:endParaRPr lang="fr-FR"/>
+          </a:p>
+        </p:txBody>
+      </p:sp>
+      <p:sp>
+        <p:nvSpPr>
+          <p:cNvPr id="5" name="Espace réservé du pied de page 4"/>
+          <p:cNvSpPr>
+            <a:spLocks noGrp="1"/>
+          </p:cNvSpPr>
+          <p:nvPr>
+            <p:ph type="ftr" sz="quarter" idx="11"/>
+          </p:nvPr>
+        </p:nvSpPr>
+        <p:spPr/>
+        <p:txBody>
+          <a:bodyPr/>
+          <a:lstStyle/>
+          <a:p>
+            <a:r>
+              <a:rPr lang="fr-FR" dirty="0" smtClean="0"/>
+              <a:t>MINE Nicolas</a:t>
+            </a:r>
+            <a:endParaRPr lang="fr-FR" dirty="0"/>
+          </a:p>
+        </p:txBody>
+      </p:sp>
+      <p:pic>
+        <p:nvPicPr>
+          <p:cNvPr id="9218" name="Picture 2" descr="Résultat de recherche d'images pour &quot;VGG CAM&quot;"/>
+          <p:cNvPicPr>
+            <a:picLocks noChangeAspect="1" noChangeArrowheads="1"/>
+          </p:cNvPicPr>
+          <p:nvPr/>
+        </p:nvPicPr>
+        <p:blipFill>
+          <a:blip r:embed="rId2">
+            <a:extLst>
+              <a:ext uri="{28A0092B-C50C-407E-A947-70E740481C1C}">
+                <a14:useLocalDpi xmlns:a14="http://schemas.microsoft.com/office/drawing/2010/main" val="0"/>
+              </a:ext>
+            </a:extLst>
+          </a:blip>
+          <a:srcRect/>
+          <a:stretch>
+            <a:fillRect/>
+          </a:stretch>
+        </p:blipFill>
+        <p:spPr bwMode="auto">
+          <a:xfrm>
+            <a:off x="411148" y="1546880"/>
+            <a:ext cx="8192909" cy="4608512"/>
+          </a:xfrm>
+          <a:prstGeom prst="rect">
+            <a:avLst/>
+          </a:prstGeom>
+          <a:noFill/>
+          <a:extLst>
+            <a:ext uri="{909E8E84-426E-40DD-AFC4-6F175D3DCCD1}">
+              <a14:hiddenFill xmlns:a14="http://schemas.microsoft.com/office/drawing/2010/main">
+                <a:solidFill>
+                  <a:srgbClr val="FFFFFF"/>
+                </a:solidFill>
+              </a14:hiddenFill>
+            </a:ext>
+          </a:extLst>
+        </p:spPr>
+      </p:pic>
+    </p:spTree>
+    <p:extLst>
+      <p:ext uri="{BB962C8B-B14F-4D97-AF65-F5344CB8AC3E}">
+        <p14:creationId xmlns:p14="http://schemas.microsoft.com/office/powerpoint/2010/main" val="3576099075"/>
+      </p:ext>
+    </p:extLst>
+  </p:cSld>
+  <p:clrMapOvr>
+    <a:masterClrMapping/>
+  </p:clrMapOvr>
+  <p:timing>
+    <p:tnLst>
+      <p:par>
+        <p:cTn id="1" dur="indefinite" restart="never" nodeType="tmRoot"/>
+      </p:par>
+    </p:tnLst>
+  </p:timing>
+</p:sld>
+</file>
+
+<file path=ppt/slides/slide31.xml><?xml version="1.0" encoding="utf-8"?>
+<p:sld xmlns:a="http://schemas.openxmlformats.org/drawingml/2006/main" xmlns:r="http://schemas.openxmlformats.org/officeDocument/2006/relationships" xmlns:p="http://schemas.openxmlformats.org/presentationml/2006/main">
+  <p:cSld>
+    <p:spTree>
+      <p:nvGrpSpPr>
+        <p:cNvPr id="1" name=""/>
+        <p:cNvGrpSpPr/>
+        <p:nvPr/>
+      </p:nvGrpSpPr>
+      <p:grpSpPr>
+        <a:xfrm>
+          <a:off x="0" y="0"/>
+          <a:ext cx="0" cy="0"/>
+          <a:chOff x="0" y="0"/>
+          <a:chExt cx="0" cy="0"/>
+        </a:xfrm>
+      </p:grpSpPr>
+      <p:sp>
+        <p:nvSpPr>
+          <p:cNvPr id="2" name="Titre 1"/>
+          <p:cNvSpPr>
+            <a:spLocks noGrp="1"/>
+          </p:cNvSpPr>
+          <p:nvPr>
+            <p:ph type="title"/>
+          </p:nvPr>
+        </p:nvSpPr>
+        <p:spPr/>
+        <p:txBody>
+          <a:bodyPr>
+            <a:normAutofit/>
+          </a:bodyPr>
+          <a:lstStyle/>
+          <a:p>
+            <a:r>
+              <a:rPr lang="fr-FR" dirty="0" smtClean="0"/>
+              <a:t>Conclusion</a:t>
+            </a:r>
+            <a:endParaRPr lang="fr-FR" dirty="0"/>
+          </a:p>
+        </p:txBody>
+      </p:sp>
+      <p:sp>
+        <p:nvSpPr>
+          <p:cNvPr id="3" name="Espace réservé du contenu 2"/>
+          <p:cNvSpPr>
+            <a:spLocks noGrp="1"/>
+          </p:cNvSpPr>
+          <p:nvPr>
+            <p:ph idx="1"/>
+          </p:nvPr>
+        </p:nvSpPr>
+        <p:spPr>
+          <a:xfrm>
+            <a:off x="457200" y="1600200"/>
+            <a:ext cx="8229600" cy="4709120"/>
+          </a:xfrm>
+        </p:spPr>
+        <p:txBody>
+          <a:bodyPr>
+            <a:normAutofit/>
+          </a:bodyPr>
+          <a:lstStyle/>
+          <a:p>
+            <a:r>
+              <a:rPr lang="fr-FR" sz="2800" dirty="0" smtClean="0">
+                <a:solidFill>
+                  <a:srgbClr val="E8750C"/>
+                </a:solidFill>
+              </a:rPr>
+              <a:t>Dataset complexe (classification pointue)</a:t>
+            </a:r>
+          </a:p>
+          <a:p>
+            <a:pPr lvl="1"/>
+            <a:r>
+              <a:rPr lang="fr-FR" sz="2400" dirty="0" smtClean="0">
+                <a:solidFill>
+                  <a:srgbClr val="E8750C"/>
+                </a:solidFill>
+              </a:rPr>
+              <a:t>Uniquement des chiens</a:t>
+            </a:r>
+          </a:p>
+          <a:p>
+            <a:pPr lvl="1"/>
+            <a:r>
+              <a:rPr lang="fr-FR" sz="2400" dirty="0" smtClean="0">
+                <a:solidFill>
+                  <a:srgbClr val="E8750C"/>
+                </a:solidFill>
+              </a:rPr>
+              <a:t>Beaucoup de races vs taille du dataset</a:t>
+            </a:r>
+          </a:p>
+          <a:p>
+            <a:r>
+              <a:rPr lang="fr-FR" sz="2800" dirty="0" smtClean="0">
+                <a:solidFill>
+                  <a:srgbClr val="E8750C"/>
+                </a:solidFill>
+              </a:rPr>
+              <a:t>Modèle classique très peu performant</a:t>
+            </a:r>
+          </a:p>
+          <a:p>
+            <a:r>
+              <a:rPr lang="fr-FR" sz="2800" dirty="0" smtClean="0">
+                <a:solidFill>
+                  <a:srgbClr val="E8750C"/>
+                </a:solidFill>
+              </a:rPr>
+              <a:t>CNN très performants (Transfer Learning)</a:t>
+            </a:r>
+          </a:p>
+          <a:p>
+            <a:r>
+              <a:rPr lang="fr-FR" sz="2800" dirty="0" smtClean="0">
+                <a:solidFill>
+                  <a:srgbClr val="E8750C"/>
+                </a:solidFill>
+              </a:rPr>
+              <a:t>Performances réduite « en partant de zéro »</a:t>
+            </a:r>
+          </a:p>
+          <a:p>
+            <a:r>
+              <a:rPr lang="fr-FR" sz="2800" dirty="0" smtClean="0">
+                <a:solidFill>
+                  <a:srgbClr val="E8750C"/>
+                </a:solidFill>
+              </a:rPr>
+              <a:t>Pas encore de moyen de contrôle sur les CNN</a:t>
+            </a:r>
+            <a:endParaRPr lang="fr-FR" sz="2400" dirty="0">
+              <a:solidFill>
+                <a:srgbClr val="E8750C"/>
+              </a:solidFill>
+            </a:endParaRPr>
+          </a:p>
+          <a:p>
+            <a:pPr lvl="1"/>
+            <a:r>
+              <a:rPr lang="fr-FR" sz="2400" dirty="0" smtClean="0">
+                <a:solidFill>
+                  <a:srgbClr val="E8750C"/>
+                </a:solidFill>
+              </a:rPr>
+              <a:t>Hormis CAM sur quelques modèles précis</a:t>
+            </a:r>
+          </a:p>
+        </p:txBody>
+      </p:sp>
+      <p:sp>
+        <p:nvSpPr>
+          <p:cNvPr id="4" name="Espace réservé de la date 3"/>
+          <p:cNvSpPr>
+            <a:spLocks noGrp="1"/>
+          </p:cNvSpPr>
+          <p:nvPr>
+            <p:ph type="dt" sz="half" idx="10"/>
+          </p:nvPr>
+        </p:nvSpPr>
+        <p:spPr/>
+        <p:txBody>
+          <a:bodyPr/>
+          <a:lstStyle/>
+          <a:p>
+            <a:fld id="{30547005-2CCE-4AAF-810C-C33FB4661996}" type="datetime1">
+              <a:rPr lang="fr-FR" smtClean="0"/>
+              <a:t>18/01/2018</a:t>
+            </a:fld>
+            <a:endParaRPr lang="fr-FR"/>
+          </a:p>
+        </p:txBody>
+      </p:sp>
+      <p:sp>
+        <p:nvSpPr>
+          <p:cNvPr id="5" name="Espace réservé du pied de page 4"/>
+          <p:cNvSpPr>
+            <a:spLocks noGrp="1"/>
+          </p:cNvSpPr>
+          <p:nvPr>
+            <p:ph type="ftr" sz="quarter" idx="11"/>
+          </p:nvPr>
+        </p:nvSpPr>
+        <p:spPr/>
+        <p:txBody>
+          <a:bodyPr/>
+          <a:lstStyle/>
+          <a:p>
+            <a:r>
+              <a:rPr lang="fr-FR" dirty="0" smtClean="0"/>
+              <a:t>MINE Nicolas</a:t>
+            </a:r>
+            <a:endParaRPr lang="fr-FR" dirty="0"/>
+          </a:p>
+        </p:txBody>
+      </p:sp>
+    </p:spTree>
+    <p:extLst>
+      <p:ext uri="{BB962C8B-B14F-4D97-AF65-F5344CB8AC3E}">
+        <p14:creationId xmlns:p14="http://schemas.microsoft.com/office/powerpoint/2010/main" val="1492226381"/>
+      </p:ext>
+    </p:extLst>
+  </p:cSld>
+  <p:clrMapOvr>
+    <a:masterClrMapping/>
+  </p:clrMapOvr>
+  <p:timing>
+    <p:tnLst>
+      <p:par>
+        <p:cTn id="1" dur="indefinite" restart="never" nodeType="tmRoot"/>
+      </p:par>
+    </p:tnLst>
+  </p:timing>
+</p:sld>
+</file>
+
+<file path=ppt/slides/slide32.xml><?xml version="1.0" encoding="utf-8"?>
+<p:sld xmlns:a="http://schemas.openxmlformats.org/drawingml/2006/main" xmlns:r="http://schemas.openxmlformats.org/officeDocument/2006/relationships" xmlns:p="http://schemas.openxmlformats.org/presentationml/2006/main">
+  <p:cSld>
+    <p:spTree>
+      <p:nvGrpSpPr>
+        <p:cNvPr id="1" name=""/>
+        <p:cNvGrpSpPr/>
+        <p:nvPr/>
+      </p:nvGrpSpPr>
+      <p:grpSpPr>
+        <a:xfrm>
+          <a:off x="0" y="0"/>
+          <a:ext cx="0" cy="0"/>
+          <a:chOff x="0" y="0"/>
+          <a:chExt cx="0" cy="0"/>
+        </a:xfrm>
+      </p:grpSpPr>
+      <p:sp>
+        <p:nvSpPr>
+          <p:cNvPr id="4" name="Espace réservé de la date 3"/>
+          <p:cNvSpPr>
+            <a:spLocks noGrp="1"/>
+          </p:cNvSpPr>
+          <p:nvPr>
+            <p:ph type="dt" sz="half" idx="10"/>
+          </p:nvPr>
+        </p:nvSpPr>
+        <p:spPr/>
+        <p:txBody>
+          <a:bodyPr/>
+          <a:lstStyle/>
+          <a:p>
+            <a:fld id="{30547005-2CCE-4AAF-810C-C33FB4661996}" type="datetime1">
+              <a:rPr lang="fr-FR" smtClean="0"/>
+              <a:t>18/01/2018</a:t>
             </a:fld>
             <a:endParaRPr lang="fr-FR"/>
           </a:p>
@@ -11753,7 +12587,7 @@
           <a:p>
             <a:fld id="{30547005-2CCE-4AAF-810C-C33FB4661996}" type="datetime1">
               <a:rPr lang="fr-FR" smtClean="0"/>
-              <a:t>15/01/2018</a:t>
+              <a:t>18/01/2018</a:t>
             </a:fld>
             <a:endParaRPr lang="fr-FR"/>
           </a:p>
@@ -11930,7 +12764,7 @@
           <a:p>
             <a:fld id="{30547005-2CCE-4AAF-810C-C33FB4661996}" type="datetime1">
               <a:rPr lang="fr-FR" smtClean="0"/>
-              <a:t>15/01/2018</a:t>
+              <a:t>18/01/2018</a:t>
             </a:fld>
             <a:endParaRPr lang="fr-FR"/>
           </a:p>
@@ -12197,7 +13031,7 @@
           <a:p>
             <a:fld id="{30547005-2CCE-4AAF-810C-C33FB4661996}" type="datetime1">
               <a:rPr lang="fr-FR" smtClean="0"/>
-              <a:t>15/01/2018</a:t>
+              <a:t>18/01/2018</a:t>
             </a:fld>
             <a:endParaRPr lang="fr-FR"/>
           </a:p>
@@ -12439,11 +13273,6 @@
               </a:rPr>
               <a:t>Moments</a:t>
             </a:r>
-            <a:endParaRPr lang="fr-FR" dirty="0" smtClean="0">
-              <a:solidFill>
-                <a:srgbClr val="E8750C"/>
-              </a:solidFill>
-            </a:endParaRPr>
           </a:p>
         </p:txBody>
       </p:sp>
@@ -12464,7 +13293,7 @@
           <a:p>
             <a:fld id="{30547005-2CCE-4AAF-810C-C33FB4661996}" type="datetime1">
               <a:rPr lang="fr-FR" smtClean="0"/>
-              <a:t>15/01/2018</a:t>
+              <a:t>18/01/2018</a:t>
             </a:fld>
             <a:endParaRPr lang="fr-FR"/>
           </a:p>
@@ -12665,12 +13494,12 @@
           <a:lstStyle/>
           <a:p>
             <a:r>
-              <a:rPr lang="fr-FR" dirty="0">
-                <a:solidFill>
-                  <a:srgbClr val="E8750C"/>
-                </a:solidFill>
-              </a:rPr>
-              <a:t>Visual </a:t>
+              <a:rPr lang="fr-FR" dirty="0" smtClean="0">
+                <a:solidFill>
+                  <a:srgbClr val="E8750C"/>
+                </a:solidFill>
+              </a:rPr>
+              <a:t>Feature SIFT + Visual </a:t>
             </a:r>
             <a:r>
               <a:rPr lang="fr-FR" dirty="0" err="1">
@@ -12761,7 +13590,7 @@
           <a:p>
             <a:fld id="{30547005-2CCE-4AAF-810C-C33FB4661996}" type="datetime1">
               <a:rPr lang="fr-FR" smtClean="0"/>
-              <a:t>15/01/2018</a:t>
+              <a:t>18/01/2018</a:t>
             </a:fld>
             <a:endParaRPr lang="fr-FR"/>
           </a:p>
@@ -12972,36 +13801,28 @@
           <a:lstStyle/>
           <a:p>
             <a:r>
-              <a:rPr lang="fr-FR" dirty="0" err="1" smtClean="0">
-                <a:solidFill>
-                  <a:srgbClr val="E8750C"/>
-                </a:solidFill>
-              </a:rPr>
-              <a:t>Clustering</a:t>
-            </a:r>
-            <a:r>
-              <a:rPr lang="fr-FR" dirty="0" smtClean="0">
-                <a:solidFill>
-                  <a:srgbClr val="E8750C"/>
-                </a:solidFill>
-              </a:rPr>
-              <a:t> (pas de </a:t>
-            </a:r>
-            <a:r>
-              <a:rPr lang="fr-FR" dirty="0" err="1" smtClean="0">
-                <a:solidFill>
-                  <a:srgbClr val="E8750C"/>
-                </a:solidFill>
-              </a:rPr>
-              <a:t>scaling</a:t>
-            </a:r>
-            <a:r>
-              <a:rPr lang="fr-FR" dirty="0" smtClean="0">
-                <a:solidFill>
-                  <a:srgbClr val="E8750C"/>
-                </a:solidFill>
-              </a:rPr>
-              <a:t>)</a:t>
+              <a:rPr lang="fr-FR" dirty="0" smtClean="0">
+                <a:solidFill>
+                  <a:srgbClr val="E8750C"/>
+                </a:solidFill>
+              </a:rPr>
+              <a:t>SIFT</a:t>
+            </a:r>
+            <a:endParaRPr lang="fr-FR" dirty="0">
+              <a:solidFill>
+                <a:srgbClr val="E8750C"/>
+              </a:solidFill>
+            </a:endParaRPr>
+          </a:p>
+          <a:p>
+            <a:pPr lvl="1"/>
+            <a:r>
+              <a:rPr lang="fr-FR" dirty="0" smtClean="0">
+                <a:solidFill>
+                  <a:srgbClr val="E8750C"/>
+                </a:solidFill>
+              </a:rPr>
+              <a:t>Extraire les points facilement « détectables »</a:t>
             </a:r>
             <a:endParaRPr lang="fr-FR" dirty="0" smtClean="0">
               <a:solidFill>
@@ -13009,60 +13830,6 @@
               </a:solidFill>
             </a:endParaRPr>
           </a:p>
-          <a:p>
-            <a:pPr lvl="1"/>
-            <a:r>
-              <a:rPr lang="fr-FR" dirty="0" err="1" smtClean="0">
-                <a:solidFill>
-                  <a:srgbClr val="E8750C"/>
-                </a:solidFill>
-              </a:rPr>
-              <a:t>Env</a:t>
-            </a:r>
-            <a:r>
-              <a:rPr lang="fr-FR" dirty="0" smtClean="0">
-                <a:solidFill>
-                  <a:srgbClr val="E8750C"/>
-                </a:solidFill>
-              </a:rPr>
-              <a:t> 1k features / images</a:t>
-            </a:r>
-          </a:p>
-          <a:p>
-            <a:pPr lvl="1"/>
-            <a:r>
-              <a:rPr lang="fr-FR" dirty="0" smtClean="0">
-                <a:solidFill>
-                  <a:srgbClr val="E8750C"/>
-                </a:solidFill>
-              </a:rPr>
-              <a:t>Sélection :100 </a:t>
-            </a:r>
-            <a:r>
-              <a:rPr lang="fr-FR" dirty="0" smtClean="0">
-                <a:solidFill>
-                  <a:srgbClr val="E8750C"/>
-                </a:solidFill>
-              </a:rPr>
-              <a:t>Clusters</a:t>
-            </a:r>
-            <a:endParaRPr lang="fr-FR" dirty="0" smtClean="0">
-              <a:solidFill>
-                <a:srgbClr val="E8750C"/>
-              </a:solidFill>
-            </a:endParaRPr>
-          </a:p>
-          <a:p>
-            <a:pPr lvl="1"/>
-            <a:r>
-              <a:rPr lang="fr-FR" dirty="0" smtClean="0">
-                <a:solidFill>
-                  <a:srgbClr val="E8750C"/>
-                </a:solidFill>
-              </a:rPr>
-              <a:t>Optimal : 27 Clusters</a:t>
-            </a:r>
-          </a:p>
         </p:txBody>
       </p:sp>
       <p:sp>
@@ -13082,7 +13849,7 @@
           <a:p>
             <a:fld id="{30547005-2CCE-4AAF-810C-C33FB4661996}" type="datetime1">
               <a:rPr lang="fr-FR" smtClean="0"/>
-              <a:t>15/01/2018</a:t>
+              <a:t>18/01/2018</a:t>
             </a:fld>
             <a:endParaRPr lang="fr-FR"/>
           </a:p>
@@ -13113,14 +13880,55 @@
       </p:sp>
       <p:pic>
         <p:nvPicPr>
-          <p:cNvPr id="3074" name="Picture 2" descr="F:\Nicolas\Documents\OpenClassRoom\P7\img\silhouette.png"/>
+          <p:cNvPr id="1026" name="Picture 2" descr="Résultat de recherche d'images pour &quot;SIFT&quot;"/>
           <p:cNvPicPr>
             <a:picLocks noChangeAspect="1" noChangeArrowheads="1"/>
           </p:cNvPicPr>
           <p:nvPr/>
         </p:nvPicPr>
         <p:blipFill>
-          <a:blip r:embed="rId2" cstate="print">
+          <a:blip r:embed="rId2">
+            <a:extLst>
+              <a:ext uri="{28A0092B-C50C-407E-A947-70E740481C1C}">
+                <a14:useLocalDpi xmlns:a14="http://schemas.microsoft.com/office/drawing/2010/main" val="0"/>
+              </a:ext>
+            </a:extLst>
+          </a:blip>
+          <a:srcRect/>
+          <a:stretch>
+            <a:fillRect/>
+          </a:stretch>
+        </p:blipFill>
+        <p:spPr bwMode="auto">
+          <a:xfrm>
+            <a:off x="4067944" y="3068960"/>
+            <a:ext cx="4857750" cy="2752725"/>
+          </a:xfrm>
+          <a:prstGeom prst="rect">
+            <a:avLst/>
+          </a:prstGeom>
+          <a:noFill/>
+          <a:extLst>
+            <a:ext uri="{909E8E84-426E-40DD-AFC4-6F175D3DCCD1}">
+              <a14:hiddenFill xmlns:a14="http://schemas.microsoft.com/office/drawing/2010/main">
+                <a:solidFill>
+                  <a:srgbClr val="FFFFFF"/>
+                </a:solidFill>
+              </a14:hiddenFill>
+            </a:ext>
+          </a:extLst>
+        </p:spPr>
+      </p:pic>
+      <p:pic>
+        <p:nvPicPr>
+          <p:cNvPr id="1027" name="Picture 3" descr="F:\Nicolas\Documents\OpenClassRoom\P7\img\Untitled Diagram.png"/>
+          <p:cNvPicPr>
+            <a:picLocks noChangeAspect="1" noChangeArrowheads="1"/>
+          </p:cNvPicPr>
+          <p:nvPr/>
+        </p:nvPicPr>
+        <p:blipFill>
+          <a:blip r:embed="rId3">
             <a:clrChange>
               <a:clrFrom>
                 <a:srgbClr val="FFFFFF"/>
@@ -13144,8 +13952,8 @@
         </p:blipFill>
         <p:spPr bwMode="auto">
           <a:xfrm>
-            <a:off x="-324543" y="3472205"/>
-            <a:ext cx="5328592" cy="3197155"/>
+            <a:off x="395536" y="2996952"/>
+            <a:ext cx="3501081" cy="3112071"/>
           </a:xfrm>
           <a:prstGeom prst="rect">
             <a:avLst/>
@@ -13162,61 +13970,10 @@
           </a:extLst>
         </p:spPr>
       </p:pic>
-      <p:pic>
-        <p:nvPicPr>
-          <p:cNvPr id="3075" name="Picture 3" descr="F:\Nicolas\Documents\OpenClassRoom\P7\img\elbow.png"/>
-          <p:cNvPicPr>
-            <a:picLocks noChangeAspect="1" noChangeArrowheads="1"/>
-          </p:cNvPicPr>
-          <p:nvPr/>
-        </p:nvPicPr>
-        <p:blipFill>
-          <a:blip r:embed="rId3" cstate="print">
-            <a:clrChange>
-              <a:clrFrom>
-                <a:srgbClr val="FFFFFF"/>
-              </a:clrFrom>
-              <a:clrTo>
-                <a:srgbClr val="FFFFFF">
-                  <a:alpha val="0"/>
-                </a:srgbClr>
-              </a:clrTo>
-            </a:clrChange>
-            <a:extLst>
-              <a:ext uri="{28A0092B-C50C-407E-A947-70E740481C1C}">
-                <a14:useLocalDpi xmlns:a14="http://schemas.microsoft.com/office/drawing/2010/main" val="0"/>
-              </a:ext>
-            </a:extLst>
-          </a:blip>
-          <a:srcRect/>
-          <a:stretch>
-            <a:fillRect/>
-          </a:stretch>
-        </p:blipFill>
-        <p:spPr bwMode="auto">
-          <a:xfrm>
-            <a:off x="4139952" y="3472205"/>
-            <a:ext cx="5328592" cy="3197155"/>
-          </a:xfrm>
-          <a:prstGeom prst="rect">
-            <a:avLst/>
-          </a:prstGeom>
-          <a:noFill/>
-          <a:extLst>
-            <a:ext uri="{909E8E84-426E-40DD-AFC4-6F175D3DCCD1}">
-              <a14:hiddenFill xmlns:a14="http://schemas.microsoft.com/office/drawing/2010/main">
-                <a:solidFill>
-                  <a:srgbClr val="FFFFFF"/>
-                </a:solidFill>
-              </a14:hiddenFill>
-            </a:ext>
-          </a:extLst>
-        </p:spPr>
-      </p:pic>
     </p:spTree>
     <p:extLst>
       <p:ext uri="{BB962C8B-B14F-4D97-AF65-F5344CB8AC3E}">
-        <p14:creationId xmlns:p14="http://schemas.microsoft.com/office/powerpoint/2010/main" val="3609989512"/>
+        <p14:creationId xmlns:p14="http://schemas.microsoft.com/office/powerpoint/2010/main" val="3649243775"/>
       </p:ext>
     </p:extLst>
   </p:cSld>

</xml_diff>

<commit_message>
ajout du Custom_CNN et mise en place de la fiche de Synthèse
</commit_message>
<xml_diff>
--- a/P7/Presentation_p7.pptx
+++ b/P7/Presentation_p7.pptx
@@ -5,7 +5,7 @@
     <p:sldMasterId id="2147483648" r:id="rId1"/>
   </p:sldMasterIdLst>
   <p:notesMasterIdLst>
-    <p:notesMasterId r:id="rId34"/>
+    <p:notesMasterId r:id="rId35"/>
   </p:notesMasterIdLst>
   <p:sldIdLst>
     <p:sldId id="256" r:id="rId2"/>
@@ -32,14 +32,15 @@
     <p:sldId id="292" r:id="rId23"/>
     <p:sldId id="296" r:id="rId24"/>
     <p:sldId id="297" r:id="rId25"/>
-    <p:sldId id="307" r:id="rId26"/>
-    <p:sldId id="281" r:id="rId27"/>
-    <p:sldId id="282" r:id="rId28"/>
-    <p:sldId id="293" r:id="rId29"/>
-    <p:sldId id="294" r:id="rId30"/>
-    <p:sldId id="295" r:id="rId31"/>
-    <p:sldId id="283" r:id="rId32"/>
-    <p:sldId id="263" r:id="rId33"/>
+    <p:sldId id="310" r:id="rId26"/>
+    <p:sldId id="307" r:id="rId27"/>
+    <p:sldId id="281" r:id="rId28"/>
+    <p:sldId id="282" r:id="rId29"/>
+    <p:sldId id="293" r:id="rId30"/>
+    <p:sldId id="294" r:id="rId31"/>
+    <p:sldId id="295" r:id="rId32"/>
+    <p:sldId id="283" r:id="rId33"/>
+    <p:sldId id="263" r:id="rId34"/>
   </p:sldIdLst>
   <p:sldSz cx="9144000" cy="6858000" type="screen4x3"/>
   <p:notesSz cx="6858000" cy="9144000"/>
@@ -223,7 +224,7 @@
           <a:p>
             <a:fld id="{E66492E5-39EF-4EC5-9E99-7F0DBC26806B}" type="datetimeFigureOut">
               <a:rPr lang="fr-FR" smtClean="0"/>
-              <a:t>18/01/2018</a:t>
+              <a:t>21/01/2018</a:t>
             </a:fld>
             <a:endParaRPr lang="fr-FR"/>
           </a:p>
@@ -756,7 +757,7 @@
           <a:p>
             <a:fld id="{2A35F02A-33DF-42A4-9F54-2DFA5B84052E}" type="datetime1">
               <a:rPr lang="fr-FR" smtClean="0"/>
-              <a:t>18/01/2018</a:t>
+              <a:t>21/01/2018</a:t>
             </a:fld>
             <a:endParaRPr lang="fr-FR"/>
           </a:p>
@@ -930,7 +931,7 @@
           <a:p>
             <a:fld id="{AA7084F6-C923-4306-BC74-6AA1A26D5992}" type="datetime1">
               <a:rPr lang="fr-FR" smtClean="0"/>
-              <a:t>18/01/2018</a:t>
+              <a:t>21/01/2018</a:t>
             </a:fld>
             <a:endParaRPr lang="fr-FR"/>
           </a:p>
@@ -1114,7 +1115,7 @@
           <a:p>
             <a:fld id="{6B9DA1C8-56AA-40E0-92DC-CCF13B41CFF7}" type="datetime1">
               <a:rPr lang="fr-FR" smtClean="0"/>
-              <a:t>18/01/2018</a:t>
+              <a:t>21/01/2018</a:t>
             </a:fld>
             <a:endParaRPr lang="fr-FR"/>
           </a:p>
@@ -1288,7 +1289,7 @@
           <a:p>
             <a:fld id="{30547005-2CCE-4AAF-810C-C33FB4661996}" type="datetime1">
               <a:rPr lang="fr-FR" smtClean="0"/>
-              <a:t>18/01/2018</a:t>
+              <a:t>21/01/2018</a:t>
             </a:fld>
             <a:endParaRPr lang="fr-FR"/>
           </a:p>
@@ -1538,7 +1539,7 @@
           <a:p>
             <a:fld id="{3EBD0647-CE4F-4B82-BC14-997434234D2E}" type="datetime1">
               <a:rPr lang="fr-FR" smtClean="0"/>
-              <a:t>18/01/2018</a:t>
+              <a:t>21/01/2018</a:t>
             </a:fld>
             <a:endParaRPr lang="fr-FR"/>
           </a:p>
@@ -1830,7 +1831,7 @@
           <a:p>
             <a:fld id="{263CA1C6-1D15-44B1-8495-DE2EC5425D2F}" type="datetime1">
               <a:rPr lang="fr-FR" smtClean="0"/>
-              <a:t>18/01/2018</a:t>
+              <a:t>21/01/2018</a:t>
             </a:fld>
             <a:endParaRPr lang="fr-FR"/>
           </a:p>
@@ -2256,7 +2257,7 @@
           <a:p>
             <a:fld id="{5F86B07A-1301-4558-A6E0-D7A436826ECB}" type="datetime1">
               <a:rPr lang="fr-FR" smtClean="0"/>
-              <a:t>18/01/2018</a:t>
+              <a:t>21/01/2018</a:t>
             </a:fld>
             <a:endParaRPr lang="fr-FR"/>
           </a:p>
@@ -2378,7 +2379,7 @@
           <a:p>
             <a:fld id="{10CD6315-9A1E-41E9-BC28-33D394163B67}" type="datetime1">
               <a:rPr lang="fr-FR" smtClean="0"/>
-              <a:t>18/01/2018</a:t>
+              <a:t>21/01/2018</a:t>
             </a:fld>
             <a:endParaRPr lang="fr-FR"/>
           </a:p>
@@ -2477,7 +2478,7 @@
           <a:p>
             <a:fld id="{8EA7A85C-1960-4CA0-B72B-A39E81C20158}" type="datetime1">
               <a:rPr lang="fr-FR" smtClean="0"/>
-              <a:t>18/01/2018</a:t>
+              <a:t>21/01/2018</a:t>
             </a:fld>
             <a:endParaRPr lang="fr-FR"/>
           </a:p>
@@ -2758,7 +2759,7 @@
           <a:p>
             <a:fld id="{885A14C0-C539-4FC5-A6ED-ABABD975303B}" type="datetime1">
               <a:rPr lang="fr-FR" smtClean="0"/>
-              <a:t>18/01/2018</a:t>
+              <a:t>21/01/2018</a:t>
             </a:fld>
             <a:endParaRPr lang="fr-FR"/>
           </a:p>
@@ -3015,7 +3016,7 @@
           <a:p>
             <a:fld id="{D772F3C9-8121-4DF6-9420-FBC4A08EF57A}" type="datetime1">
               <a:rPr lang="fr-FR" smtClean="0"/>
-              <a:t>18/01/2018</a:t>
+              <a:t>21/01/2018</a:t>
             </a:fld>
             <a:endParaRPr lang="fr-FR"/>
           </a:p>
@@ -3253,7 +3254,7 @@
           <a:p>
             <a:fld id="{C13329EF-B01B-4D4B-83A1-AFBB7696C373}" type="datetime1">
               <a:rPr lang="fr-FR" smtClean="0"/>
-              <a:t>18/01/2018</a:t>
+              <a:t>21/01/2018</a:t>
             </a:fld>
             <a:endParaRPr lang="fr-FR"/>
           </a:p>
@@ -3750,7 +3751,7 @@
                   <a:srgbClr val="95023C"/>
                 </a:solidFill>
               </a:rPr>
-              <a:t>18/01/2018</a:t>
+              <a:t>21/01/2018</a:t>
             </a:fld>
             <a:endParaRPr lang="fr-FR" dirty="0">
               <a:solidFill>
@@ -4044,15 +4045,7 @@
                   <a:srgbClr val="E8750C"/>
                 </a:solidFill>
               </a:rPr>
-              <a:t>Env. </a:t>
-            </a:r>
-            <a:r>
-              <a:rPr lang="fr-FR" dirty="0" smtClean="0">
-                <a:solidFill>
-                  <a:srgbClr val="E8750C"/>
-                </a:solidFill>
-              </a:rPr>
-              <a:t>1k features / images</a:t>
+              <a:t>Env. 1k features / images</a:t>
             </a:r>
           </a:p>
           <a:p>
@@ -4096,7 +4089,7 @@
           <a:p>
             <a:fld id="{30547005-2CCE-4AAF-810C-C33FB4661996}" type="datetime1">
               <a:rPr lang="fr-FR" smtClean="0"/>
-              <a:t>18/01/2018</a:t>
+              <a:t>21/01/2018</a:t>
             </a:fld>
             <a:endParaRPr lang="fr-FR"/>
           </a:p>
@@ -4409,7 +4402,7 @@
           <a:p>
             <a:fld id="{30547005-2CCE-4AAF-810C-C33FB4661996}" type="datetime1">
               <a:rPr lang="fr-FR" smtClean="0"/>
-              <a:t>18/01/2018</a:t>
+              <a:t>21/01/2018</a:t>
             </a:fld>
             <a:endParaRPr lang="fr-FR"/>
           </a:p>
@@ -4769,7 +4762,7 @@
           <a:p>
             <a:fld id="{30547005-2CCE-4AAF-810C-C33FB4661996}" type="datetime1">
               <a:rPr lang="fr-FR" smtClean="0"/>
-              <a:t>18/01/2018</a:t>
+              <a:t>21/01/2018</a:t>
             </a:fld>
             <a:endParaRPr lang="fr-FR"/>
           </a:p>
@@ -5231,7 +5224,7 @@
           <a:p>
             <a:fld id="{30547005-2CCE-4AAF-810C-C33FB4661996}" type="datetime1">
               <a:rPr lang="fr-FR" smtClean="0"/>
-              <a:t>18/01/2018</a:t>
+              <a:t>21/01/2018</a:t>
             </a:fld>
             <a:endParaRPr lang="fr-FR"/>
           </a:p>
@@ -5647,7 +5640,7 @@
           <a:p>
             <a:fld id="{30547005-2CCE-4AAF-810C-C33FB4661996}" type="datetime1">
               <a:rPr lang="fr-FR" smtClean="0"/>
-              <a:t>18/01/2018</a:t>
+              <a:t>21/01/2018</a:t>
             </a:fld>
             <a:endParaRPr lang="fr-FR"/>
           </a:p>
@@ -5788,7 +5781,39 @@
                   <a:srgbClr val="E8750C"/>
                 </a:solidFill>
               </a:rPr>
-              <a:t>X = 10222 x 523 (100+151+100+100+3*24)</a:t>
+              <a:t>X = 10222 x </a:t>
+            </a:r>
+            <a:r>
+              <a:rPr lang="fr-FR" dirty="0" smtClean="0">
+                <a:solidFill>
+                  <a:srgbClr val="E8750C"/>
+                </a:solidFill>
+              </a:rPr>
+              <a:t>423 </a:t>
+            </a:r>
+            <a:r>
+              <a:rPr lang="fr-FR" dirty="0" smtClean="0">
+                <a:solidFill>
+                  <a:srgbClr val="E8750C"/>
+                </a:solidFill>
+              </a:rPr>
+              <a:t>(</a:t>
+            </a:r>
+            <a:r>
+              <a:rPr lang="fr-FR" dirty="0" smtClean="0">
+                <a:solidFill>
+                  <a:srgbClr val="E8750C"/>
+                </a:solidFill>
+              </a:rPr>
+              <a:t>100+151+100+3*24</a:t>
+            </a:r>
+            <a:r>
+              <a:rPr lang="fr-FR" dirty="0" smtClean="0">
+                <a:solidFill>
+                  <a:srgbClr val="E8750C"/>
+                </a:solidFill>
+              </a:rPr>
+              <a:t>)</a:t>
             </a:r>
           </a:p>
           <a:p>
@@ -5943,7 +5968,7 @@
           <a:p>
             <a:fld id="{30547005-2CCE-4AAF-810C-C33FB4661996}" type="datetime1">
               <a:rPr lang="fr-FR" smtClean="0"/>
-              <a:t>18/01/2018</a:t>
+              <a:t>21/01/2018</a:t>
             </a:fld>
             <a:endParaRPr lang="fr-FR"/>
           </a:p>
@@ -6089,6 +6114,25 @@
               </a:rPr>
               <a:t>, Ensemble, KNN, Modèle Linéaire (SGDC), Modèle Non linéaire (SVC) </a:t>
             </a:r>
+          </a:p>
+          <a:p>
+            <a:pPr lvl="1"/>
+            <a:r>
+              <a:rPr lang="fr-FR" dirty="0" smtClean="0">
+                <a:solidFill>
+                  <a:srgbClr val="E8750C"/>
+                </a:solidFill>
+              </a:rPr>
+              <a:t>Très gros </a:t>
+            </a:r>
+            <a:r>
+              <a:rPr lang="fr-FR" dirty="0" err="1" smtClean="0">
+                <a:solidFill>
+                  <a:srgbClr val="E8750C"/>
+                </a:solidFill>
+              </a:rPr>
+              <a:t>overtiffing</a:t>
+            </a:r>
             <a:endParaRPr lang="fr-FR" dirty="0" smtClean="0">
               <a:solidFill>
                 <a:srgbClr val="E8750C"/>
@@ -6103,7 +6147,29 @@
                   <a:srgbClr val="E8750C"/>
                 </a:solidFill>
               </a:rPr>
-              <a:t>Très gros </a:t>
+              <a:t>Régulation</a:t>
+            </a:r>
+          </a:p>
+          <a:p>
+            <a:pPr lvl="2"/>
+            <a:r>
+              <a:rPr lang="fr-FR" dirty="0" smtClean="0">
+                <a:solidFill>
+                  <a:srgbClr val="E8750C"/>
+                </a:solidFill>
+              </a:rPr>
+              <a:t>réduction du score test set</a:t>
+            </a:r>
+          </a:p>
+          <a:p>
+            <a:pPr lvl="2"/>
+            <a:r>
+              <a:rPr lang="fr-FR" dirty="0" smtClean="0">
+                <a:solidFill>
+                  <a:srgbClr val="E8750C"/>
+                </a:solidFill>
+              </a:rPr>
+              <a:t>Similaire au </a:t>
             </a:r>
             <a:r>
               <a:rPr lang="fr-FR" dirty="0" err="1" smtClean="0">
@@ -6111,13 +6177,16 @@
                   <a:srgbClr val="E8750C"/>
                 </a:solidFill>
               </a:rPr>
-              <a:t>overtiffing</a:t>
-            </a:r>
-            <a:endParaRPr lang="fr-FR" dirty="0" smtClean="0">
-              <a:solidFill>
-                <a:srgbClr val="E8750C"/>
-              </a:solidFill>
-            </a:endParaRPr>
+              <a:t>Dummy</a:t>
+            </a:r>
+            <a:r>
+              <a:rPr lang="fr-FR" dirty="0" smtClean="0">
+                <a:solidFill>
+                  <a:srgbClr val="E8750C"/>
+                </a:solidFill>
+              </a:rPr>
+              <a:t> Classifieur avec Reg.</a:t>
+            </a:r>
           </a:p>
           <a:p>
             <a:pPr lvl="1"/>
@@ -6127,7 +6196,7 @@
                   <a:srgbClr val="E8750C"/>
                 </a:solidFill>
               </a:rPr>
-              <a:t>Régulation</a:t>
+              <a:t>Résultats </a:t>
             </a:r>
           </a:p>
           <a:p>
@@ -6138,7 +6207,23 @@
                   <a:srgbClr val="E8750C"/>
                 </a:solidFill>
               </a:rPr>
-              <a:t>réduction du score test set</a:t>
+              <a:t>2 à 3 % sur full dataset (env. 3 x mieux que </a:t>
+            </a:r>
+            <a:r>
+              <a:rPr lang="fr-FR" dirty="0" err="1" smtClean="0">
+                <a:solidFill>
+                  <a:srgbClr val="E8750C"/>
+                </a:solidFill>
+              </a:rPr>
+              <a:t>naif</a:t>
+            </a:r>
+            <a:r>
+              <a:rPr lang="fr-FR" dirty="0" smtClean="0">
+                <a:solidFill>
+                  <a:srgbClr val="E8750C"/>
+                </a:solidFill>
+              </a:rPr>
+              <a:t>)</a:t>
             </a:r>
           </a:p>
           <a:p>
@@ -6149,71 +6234,6 @@
                   <a:srgbClr val="E8750C"/>
                 </a:solidFill>
               </a:rPr>
-              <a:t>Similaire au </a:t>
-            </a:r>
-            <a:r>
-              <a:rPr lang="fr-FR" dirty="0" err="1" smtClean="0">
-                <a:solidFill>
-                  <a:srgbClr val="E8750C"/>
-                </a:solidFill>
-              </a:rPr>
-              <a:t>Dummy</a:t>
-            </a:r>
-            <a:r>
-              <a:rPr lang="fr-FR" dirty="0" smtClean="0">
-                <a:solidFill>
-                  <a:srgbClr val="E8750C"/>
-                </a:solidFill>
-              </a:rPr>
-              <a:t> Classifieur avec Reg.</a:t>
-            </a:r>
-          </a:p>
-          <a:p>
-            <a:pPr lvl="1"/>
-            <a:r>
-              <a:rPr lang="fr-FR" dirty="0" smtClean="0">
-                <a:solidFill>
-                  <a:srgbClr val="E8750C"/>
-                </a:solidFill>
-              </a:rPr>
-              <a:t>Résultats </a:t>
-            </a:r>
-          </a:p>
-          <a:p>
-            <a:pPr lvl="2"/>
-            <a:r>
-              <a:rPr lang="fr-FR" dirty="0" smtClean="0">
-                <a:solidFill>
-                  <a:srgbClr val="E8750C"/>
-                </a:solidFill>
-              </a:rPr>
-              <a:t>2 à 3 % sur full dataset (env. 3 x mieux que </a:t>
-            </a:r>
-            <a:r>
-              <a:rPr lang="fr-FR" dirty="0" err="1" smtClean="0">
-                <a:solidFill>
-                  <a:srgbClr val="E8750C"/>
-                </a:solidFill>
-              </a:rPr>
-              <a:t>naif</a:t>
-            </a:r>
-            <a:r>
-              <a:rPr lang="fr-FR" dirty="0" smtClean="0">
-                <a:solidFill>
-                  <a:srgbClr val="E8750C"/>
-                </a:solidFill>
-              </a:rPr>
-              <a:t>)</a:t>
-            </a:r>
-          </a:p>
-          <a:p>
-            <a:pPr lvl="2"/>
-            <a:r>
-              <a:rPr lang="fr-FR" dirty="0" smtClean="0">
-                <a:solidFill>
-                  <a:srgbClr val="E8750C"/>
-                </a:solidFill>
-              </a:rPr>
               <a:t>35 à 37% </a:t>
             </a:r>
             <a:r>
@@ -6222,7 +6242,23 @@
                   <a:srgbClr val="E8750C"/>
                 </a:solidFill>
               </a:rPr>
-              <a:t>sur full dataset (env. </a:t>
+              <a:t>sur </a:t>
+            </a:r>
+            <a:r>
+              <a:rPr lang="fr-FR" dirty="0" smtClean="0">
+                <a:solidFill>
+                  <a:srgbClr val="E8750C"/>
+                </a:solidFill>
+              </a:rPr>
+              <a:t>5 classes </a:t>
+            </a:r>
+            <a:r>
+              <a:rPr lang="fr-FR" dirty="0">
+                <a:solidFill>
+                  <a:srgbClr val="E8750C"/>
+                </a:solidFill>
+              </a:rPr>
+              <a:t>(env. </a:t>
             </a:r>
             <a:r>
               <a:rPr lang="fr-FR" dirty="0" smtClean="0">
@@ -6284,7 +6320,7 @@
           <a:p>
             <a:fld id="{30547005-2CCE-4AAF-810C-C33FB4661996}" type="datetime1">
               <a:rPr lang="fr-FR" smtClean="0"/>
-              <a:t>18/01/2018</a:t>
+              <a:t>21/01/2018</a:t>
             </a:fld>
             <a:endParaRPr lang="fr-FR"/>
           </a:p>
@@ -6538,11 +6574,6 @@
               </a:rPr>
               <a:t>Somme des probabilités + normalisation</a:t>
             </a:r>
-            <a:endParaRPr lang="fr-FR" dirty="0" smtClean="0">
-              <a:solidFill>
-                <a:srgbClr val="E8750C"/>
-              </a:solidFill>
-            </a:endParaRPr>
           </a:p>
           <a:p>
             <a:pPr lvl="1"/>
@@ -6574,7 +6605,7 @@
           <a:p>
             <a:fld id="{30547005-2CCE-4AAF-810C-C33FB4661996}" type="datetime1">
               <a:rPr lang="fr-FR" smtClean="0"/>
-              <a:t>18/01/2018</a:t>
+              <a:t>21/01/2018</a:t>
             </a:fld>
             <a:endParaRPr lang="fr-FR"/>
           </a:p>
@@ -6687,8 +6718,21 @@
                   <a:srgbClr val="E8750C"/>
                 </a:solidFill>
               </a:rPr>
-              <a:t>3 parties</a:t>
-            </a:r>
+              <a:t>3 </a:t>
+            </a:r>
+            <a:r>
+              <a:rPr lang="fr-FR" dirty="0" smtClean="0">
+                <a:solidFill>
+                  <a:srgbClr val="E8750C"/>
+                </a:solidFill>
+              </a:rPr>
+              <a:t>parties (Transfer Learning)</a:t>
+            </a:r>
+            <a:endParaRPr lang="fr-FR" dirty="0" smtClean="0">
+              <a:solidFill>
+                <a:srgbClr val="E8750C"/>
+              </a:solidFill>
+            </a:endParaRPr>
           </a:p>
           <a:p>
             <a:pPr lvl="1"/>
@@ -6776,7 +6820,7 @@
           <a:p>
             <a:fld id="{30547005-2CCE-4AAF-810C-C33FB4661996}" type="datetime1">
               <a:rPr lang="fr-FR" smtClean="0"/>
-              <a:t>18/01/2018</a:t>
+              <a:t>21/01/2018</a:t>
             </a:fld>
             <a:endParaRPr lang="fr-FR"/>
           </a:p>
@@ -7001,7 +7045,7 @@
           <a:p>
             <a:fld id="{30547005-2CCE-4AAF-810C-C33FB4661996}" type="datetime1">
               <a:rPr lang="fr-FR" smtClean="0"/>
-              <a:t>18/01/2018</a:t>
+              <a:t>21/01/2018</a:t>
             </a:fld>
             <a:endParaRPr lang="fr-FR"/>
           </a:p>
@@ -7141,10 +7185,15 @@
             <p:ph idx="1"/>
           </p:nvPr>
         </p:nvSpPr>
-        <p:spPr/>
+        <p:spPr>
+          <a:xfrm>
+            <a:off x="457200" y="1600200"/>
+            <a:ext cx="8229600" cy="4697577"/>
+          </a:xfrm>
+        </p:spPr>
         <p:txBody>
           <a:bodyPr>
-            <a:normAutofit lnSpcReduction="10000"/>
+            <a:normAutofit fontScale="92500" lnSpcReduction="10000"/>
           </a:bodyPr>
           <a:lstStyle/>
           <a:p>
@@ -7195,6 +7244,21 @@
                 </a:solidFill>
               </a:rPr>
               <a:t>Kaggle</a:t>
+            </a:r>
+            <a:endParaRPr lang="fr-FR" dirty="0" smtClean="0">
+              <a:solidFill>
+                <a:srgbClr val="E8750C"/>
+              </a:solidFill>
+            </a:endParaRPr>
+          </a:p>
+          <a:p>
+            <a:r>
+              <a:rPr lang="fr-FR" dirty="0" smtClean="0">
+                <a:solidFill>
+                  <a:srgbClr val="E8750C"/>
+                </a:solidFill>
+              </a:rPr>
+              <a:t>Custom CNN</a:t>
             </a:r>
             <a:endParaRPr lang="fr-FR" dirty="0">
               <a:solidFill>
@@ -7256,7 +7320,7 @@
           <a:p>
             <a:fld id="{30547005-2CCE-4AAF-810C-C33FB4661996}" type="datetime1">
               <a:rPr lang="fr-FR" smtClean="0"/>
-              <a:t>18/01/2018</a:t>
+              <a:t>21/01/2018</a:t>
             </a:fld>
             <a:endParaRPr lang="fr-FR"/>
           </a:p>
@@ -7547,7 +7611,7 @@
           <a:p>
             <a:fld id="{30547005-2CCE-4AAF-810C-C33FB4661996}" type="datetime1">
               <a:rPr lang="fr-FR" smtClean="0"/>
-              <a:t>18/01/2018</a:t>
+              <a:t>21/01/2018</a:t>
             </a:fld>
             <a:endParaRPr lang="fr-FR"/>
           </a:p>
@@ -8438,7 +8502,7 @@
           <a:p>
             <a:fld id="{30547005-2CCE-4AAF-810C-C33FB4661996}" type="datetime1">
               <a:rPr lang="fr-FR" smtClean="0"/>
-              <a:t>18/01/2018</a:t>
+              <a:t>21/01/2018</a:t>
             </a:fld>
             <a:endParaRPr lang="fr-FR"/>
           </a:p>
@@ -8681,7 +8745,7 @@
           <a:p>
             <a:fld id="{30547005-2CCE-4AAF-810C-C33FB4661996}" type="datetime1">
               <a:rPr lang="fr-FR" smtClean="0"/>
-              <a:t>18/01/2018</a:t>
+              <a:t>21/01/2018</a:t>
             </a:fld>
             <a:endParaRPr lang="fr-FR"/>
           </a:p>
@@ -9438,7 +9502,7 @@
           <a:p>
             <a:fld id="{30547005-2CCE-4AAF-810C-C33FB4661996}" type="datetime1">
               <a:rPr lang="fr-FR" smtClean="0"/>
-              <a:t>18/01/2018</a:t>
+              <a:t>21/01/2018</a:t>
             </a:fld>
             <a:endParaRPr lang="fr-FR"/>
           </a:p>
@@ -9662,7 +9726,7 @@
           <a:p>
             <a:r>
               <a:rPr lang="fr-FR" dirty="0" smtClean="0"/>
-              <a:t>MNIST</a:t>
+              <a:t>Custom CNN</a:t>
             </a:r>
             <a:endParaRPr lang="fr-FR" dirty="0"/>
           </a:p>
@@ -9681,7 +9745,7 @@
         <p:spPr/>
         <p:txBody>
           <a:bodyPr>
-            <a:normAutofit fontScale="70000" lnSpcReduction="20000"/>
+            <a:normAutofit fontScale="92500" lnSpcReduction="10000"/>
           </a:bodyPr>
           <a:lstStyle/>
           <a:p>
@@ -9691,27 +9755,7 @@
                   <a:srgbClr val="E8750C"/>
                 </a:solidFill>
               </a:rPr>
-              <a:t>50k images train + 10k test</a:t>
-            </a:r>
-          </a:p>
-          <a:p>
-            <a:r>
-              <a:rPr lang="fr-FR" dirty="0" smtClean="0">
-                <a:solidFill>
-                  <a:srgbClr val="E8750C"/>
-                </a:solidFill>
-              </a:rPr>
-              <a:t>28x28 pixels</a:t>
-            </a:r>
-          </a:p>
-          <a:p>
-            <a:r>
-              <a:rPr lang="fr-FR" dirty="0" smtClean="0">
-                <a:solidFill>
-                  <a:srgbClr val="E8750C"/>
-                </a:solidFill>
-              </a:rPr>
-              <a:t>Model:</a:t>
+              <a:t>3 modèles testés</a:t>
             </a:r>
           </a:p>
           <a:p>
@@ -9722,7 +9766,34 @@
                   <a:srgbClr val="E8750C"/>
                 </a:solidFill>
               </a:rPr>
-              <a:t>Conv2D + relu =&gt; 32 </a:t>
+              <a:t>1 </a:t>
+            </a:r>
+            <a:r>
+              <a:rPr lang="fr-FR" dirty="0">
+                <a:solidFill>
+                  <a:srgbClr val="E8750C"/>
+                </a:solidFill>
+              </a:rPr>
+              <a:t>léger </a:t>
+            </a:r>
+            <a:r>
+              <a:rPr lang="fr-FR" dirty="0" smtClean="0">
+                <a:solidFill>
+                  <a:srgbClr val="E8750C"/>
+                </a:solidFill>
+              </a:rPr>
+              <a:t>(atteint 6-7%)</a:t>
+            </a:r>
+          </a:p>
+          <a:p>
+            <a:pPr lvl="2"/>
+            <a:r>
+              <a:rPr lang="fr-FR" dirty="0" smtClean="0">
+                <a:solidFill>
+                  <a:srgbClr val="E8750C"/>
+                </a:solidFill>
+              </a:rPr>
+              <a:t>4x (Conv2D + relu – </a:t>
             </a:r>
             <a:r>
               <a:rPr lang="fr-FR" dirty="0" err="1" smtClean="0">
@@ -9730,15 +9801,15 @@
                   <a:srgbClr val="E8750C"/>
                 </a:solidFill>
               </a:rPr>
-              <a:t>layers</a:t>
-            </a:r>
-            <a:r>
-              <a:rPr lang="fr-FR" dirty="0" smtClean="0">
-                <a:solidFill>
-                  <a:srgbClr val="E8750C"/>
-                </a:solidFill>
-              </a:rPr>
-              <a:t> de 26x26</a:t>
+              <a:t>MaxPooling</a:t>
+            </a:r>
+            <a:r>
+              <a:rPr lang="fr-FR" dirty="0" smtClean="0">
+                <a:solidFill>
+                  <a:srgbClr val="E8750C"/>
+                </a:solidFill>
+              </a:rPr>
+              <a:t>)</a:t>
             </a:r>
           </a:p>
           <a:p>
@@ -9749,7 +9820,18 @@
                   <a:srgbClr val="E8750C"/>
                 </a:solidFill>
               </a:rPr>
-              <a:t>32 filtres – </a:t>
+              <a:t>1600 features</a:t>
+            </a:r>
+          </a:p>
+          <a:p>
+            <a:pPr lvl="2"/>
+            <a:r>
+              <a:rPr lang="fr-FR" dirty="0" smtClean="0">
+                <a:solidFill>
+                  <a:srgbClr val="E8750C"/>
+                </a:solidFill>
+              </a:rPr>
+              <a:t>Classifieur simple (D200 + relu + D120 + </a:t>
             </a:r>
             <a:r>
               <a:rPr lang="fr-FR" dirty="0" err="1" smtClean="0">
@@ -9757,15 +9839,26 @@
                   <a:srgbClr val="E8750C"/>
                 </a:solidFill>
               </a:rPr>
-              <a:t>kernel</a:t>
-            </a:r>
-            <a:r>
-              <a:rPr lang="fr-FR" dirty="0" smtClean="0">
-                <a:solidFill>
-                  <a:srgbClr val="E8750C"/>
-                </a:solidFill>
-              </a:rPr>
-              <a:t> 3 – </a:t>
+              <a:t>softmax</a:t>
+            </a:r>
+            <a:r>
+              <a:rPr lang="fr-FR" dirty="0" smtClean="0">
+                <a:solidFill>
+                  <a:srgbClr val="E8750C"/>
+                </a:solidFill>
+              </a:rPr>
+              <a:t>)</a:t>
+            </a:r>
+          </a:p>
+          <a:p>
+            <a:pPr lvl="1"/>
+            <a:r>
+              <a:rPr lang="fr-FR" dirty="0" smtClean="0">
+                <a:solidFill>
+                  <a:srgbClr val="E8750C"/>
+                </a:solidFill>
+              </a:rPr>
+              <a:t>1 medium (1,3% stable – </a:t>
             </a:r>
             <a:r>
               <a:rPr lang="fr-FR" dirty="0" err="1" smtClean="0">
@@ -9773,15 +9866,26 @@
                   <a:srgbClr val="E8750C"/>
                 </a:solidFill>
               </a:rPr>
-              <a:t>strides</a:t>
-            </a:r>
-            <a:r>
-              <a:rPr lang="fr-FR" dirty="0" smtClean="0">
-                <a:solidFill>
-                  <a:srgbClr val="E8750C"/>
-                </a:solidFill>
-              </a:rPr>
-              <a:t> 1 – </a:t>
+              <a:t>Vanishing</a:t>
+            </a:r>
+            <a:r>
+              <a:rPr lang="fr-FR" dirty="0" smtClean="0">
+                <a:solidFill>
+                  <a:srgbClr val="E8750C"/>
+                </a:solidFill>
+              </a:rPr>
+              <a:t> gradient ?)</a:t>
+            </a:r>
+          </a:p>
+          <a:p>
+            <a:pPr lvl="2"/>
+            <a:r>
+              <a:rPr lang="fr-FR" dirty="0" smtClean="0">
+                <a:solidFill>
+                  <a:srgbClr val="E8750C"/>
+                </a:solidFill>
+              </a:rPr>
+              <a:t>4x (2 Conv2D + relu – Max </a:t>
             </a:r>
             <a:r>
               <a:rPr lang="fr-FR" dirty="0" err="1" smtClean="0">
@@ -9789,88 +9893,16 @@
                   <a:srgbClr val="E8750C"/>
                 </a:solidFill>
               </a:rPr>
-              <a:t>padding</a:t>
-            </a:r>
-            <a:r>
-              <a:rPr lang="fr-FR" dirty="0" smtClean="0">
-                <a:solidFill>
-                  <a:srgbClr val="E8750C"/>
-                </a:solidFill>
-              </a:rPr>
-              <a:t> SAME</a:t>
-            </a:r>
-          </a:p>
-          <a:p>
-            <a:pPr lvl="1"/>
-            <a:r>
-              <a:rPr lang="fr-FR" dirty="0" smtClean="0">
-                <a:solidFill>
-                  <a:srgbClr val="E8750C"/>
-                </a:solidFill>
-              </a:rPr>
-              <a:t>Conv2D</a:t>
-            </a:r>
-            <a:r>
-              <a:rPr lang="fr-FR" dirty="0">
-                <a:solidFill>
-                  <a:srgbClr val="E8750C"/>
-                </a:solidFill>
-              </a:rPr>
-              <a:t>+ </a:t>
-            </a:r>
-            <a:r>
-              <a:rPr lang="fr-FR" dirty="0" smtClean="0">
-                <a:solidFill>
-                  <a:srgbClr val="E8750C"/>
-                </a:solidFill>
-              </a:rPr>
-              <a:t>relu</a:t>
-            </a:r>
-            <a:r>
-              <a:rPr lang="fr-FR" dirty="0">
-                <a:solidFill>
-                  <a:srgbClr val="E8750C"/>
-                </a:solidFill>
-              </a:rPr>
-              <a:t> =&gt; </a:t>
-            </a:r>
-            <a:r>
-              <a:rPr lang="fr-FR" dirty="0" smtClean="0">
-                <a:solidFill>
-                  <a:srgbClr val="E8750C"/>
-                </a:solidFill>
-              </a:rPr>
-              <a:t>64 </a:t>
-            </a:r>
-            <a:r>
-              <a:rPr lang="fr-FR" dirty="0" err="1">
-                <a:solidFill>
-                  <a:srgbClr val="E8750C"/>
-                </a:solidFill>
-              </a:rPr>
-              <a:t>layers</a:t>
-            </a:r>
-            <a:r>
-              <a:rPr lang="fr-FR" dirty="0">
-                <a:solidFill>
-                  <a:srgbClr val="E8750C"/>
-                </a:solidFill>
-              </a:rPr>
-              <a:t> de </a:t>
-            </a:r>
-            <a:r>
-              <a:rPr lang="fr-FR" dirty="0" smtClean="0">
-                <a:solidFill>
-                  <a:srgbClr val="E8750C"/>
-                </a:solidFill>
-              </a:rPr>
-              <a:t>24x24</a:t>
-            </a:r>
-            <a:endParaRPr lang="fr-FR" dirty="0">
-              <a:solidFill>
-                <a:srgbClr val="E8750C"/>
-              </a:solidFill>
-            </a:endParaRPr>
+              <a:t>Pooling</a:t>
+            </a:r>
+            <a:r>
+              <a:rPr lang="fr-FR" dirty="0" smtClean="0">
+                <a:solidFill>
+                  <a:srgbClr val="E8750C"/>
+                </a:solidFill>
+              </a:rPr>
+              <a:t>)</a:t>
+            </a:r>
           </a:p>
           <a:p>
             <a:pPr lvl="2"/>
@@ -9880,235 +9912,7 @@
                   <a:srgbClr val="E8750C"/>
                 </a:solidFill>
               </a:rPr>
-              <a:t>64 </a:t>
-            </a:r>
-            <a:r>
-              <a:rPr lang="fr-FR" dirty="0">
-                <a:solidFill>
-                  <a:srgbClr val="E8750C"/>
-                </a:solidFill>
-              </a:rPr>
-              <a:t>filtres – </a:t>
-            </a:r>
-            <a:r>
-              <a:rPr lang="fr-FR" dirty="0" err="1">
-                <a:solidFill>
-                  <a:srgbClr val="E8750C"/>
-                </a:solidFill>
-              </a:rPr>
-              <a:t>kernel</a:t>
-            </a:r>
-            <a:r>
-              <a:rPr lang="fr-FR" dirty="0">
-                <a:solidFill>
-                  <a:srgbClr val="E8750C"/>
-                </a:solidFill>
-              </a:rPr>
-              <a:t> 3 – </a:t>
-            </a:r>
-            <a:r>
-              <a:rPr lang="fr-FR" dirty="0" err="1">
-                <a:solidFill>
-                  <a:srgbClr val="E8750C"/>
-                </a:solidFill>
-              </a:rPr>
-              <a:t>strides</a:t>
-            </a:r>
-            <a:r>
-              <a:rPr lang="fr-FR" dirty="0">
-                <a:solidFill>
-                  <a:srgbClr val="E8750C"/>
-                </a:solidFill>
-              </a:rPr>
-              <a:t> 1 – </a:t>
-            </a:r>
-            <a:r>
-              <a:rPr lang="fr-FR" dirty="0" err="1">
-                <a:solidFill>
-                  <a:srgbClr val="E8750C"/>
-                </a:solidFill>
-              </a:rPr>
-              <a:t>padding</a:t>
-            </a:r>
-            <a:r>
-              <a:rPr lang="fr-FR" dirty="0">
-                <a:solidFill>
-                  <a:srgbClr val="E8750C"/>
-                </a:solidFill>
-              </a:rPr>
-              <a:t> </a:t>
-            </a:r>
-            <a:r>
-              <a:rPr lang="fr-FR" dirty="0" smtClean="0">
-                <a:solidFill>
-                  <a:srgbClr val="E8750C"/>
-                </a:solidFill>
-              </a:rPr>
-              <a:t>SAME</a:t>
-            </a:r>
-            <a:endParaRPr lang="fr-FR" dirty="0">
-              <a:solidFill>
-                <a:srgbClr val="E8750C"/>
-              </a:solidFill>
-            </a:endParaRPr>
-          </a:p>
-          <a:p>
-            <a:pPr lvl="1"/>
-            <a:r>
-              <a:rPr lang="fr-FR" dirty="0" smtClean="0">
-                <a:solidFill>
-                  <a:srgbClr val="E8750C"/>
-                </a:solidFill>
-              </a:rPr>
-              <a:t>Max </a:t>
-            </a:r>
-            <a:r>
-              <a:rPr lang="fr-FR" dirty="0" err="1" smtClean="0">
-                <a:solidFill>
-                  <a:srgbClr val="E8750C"/>
-                </a:solidFill>
-              </a:rPr>
-              <a:t>Pooling</a:t>
-            </a:r>
-            <a:r>
-              <a:rPr lang="fr-FR" dirty="0" smtClean="0">
-                <a:solidFill>
-                  <a:srgbClr val="E8750C"/>
-                </a:solidFill>
-              </a:rPr>
-              <a:t> =&gt; 64 </a:t>
-            </a:r>
-            <a:r>
-              <a:rPr lang="fr-FR" dirty="0" err="1" smtClean="0">
-                <a:solidFill>
-                  <a:srgbClr val="E8750C"/>
-                </a:solidFill>
-              </a:rPr>
-              <a:t>layers</a:t>
-            </a:r>
-            <a:r>
-              <a:rPr lang="fr-FR" dirty="0" smtClean="0">
-                <a:solidFill>
-                  <a:srgbClr val="E8750C"/>
-                </a:solidFill>
-              </a:rPr>
-              <a:t> de 14x14 (à cause du </a:t>
-            </a:r>
-            <a:r>
-              <a:rPr lang="fr-FR" dirty="0" err="1" smtClean="0">
-                <a:solidFill>
-                  <a:srgbClr val="E8750C"/>
-                </a:solidFill>
-              </a:rPr>
-              <a:t>padding</a:t>
-            </a:r>
-            <a:r>
-              <a:rPr lang="fr-FR" dirty="0" smtClean="0">
-                <a:solidFill>
-                  <a:srgbClr val="E8750C"/>
-                </a:solidFill>
-              </a:rPr>
-              <a:t> VALID)</a:t>
-            </a:r>
-          </a:p>
-          <a:p>
-            <a:pPr lvl="2"/>
-            <a:r>
-              <a:rPr lang="fr-FR" dirty="0" err="1" smtClean="0">
-                <a:solidFill>
-                  <a:srgbClr val="E8750C"/>
-                </a:solidFill>
-              </a:rPr>
-              <a:t>Kernel</a:t>
-            </a:r>
-            <a:r>
-              <a:rPr lang="fr-FR" dirty="0" smtClean="0">
-                <a:solidFill>
-                  <a:srgbClr val="E8750C"/>
-                </a:solidFill>
-              </a:rPr>
-              <a:t> 1-2-2-1 – </a:t>
-            </a:r>
-            <a:r>
-              <a:rPr lang="fr-FR" dirty="0" err="1" smtClean="0">
-                <a:solidFill>
-                  <a:srgbClr val="E8750C"/>
-                </a:solidFill>
-              </a:rPr>
-              <a:t>Strides</a:t>
-            </a:r>
-            <a:r>
-              <a:rPr lang="fr-FR" dirty="0" smtClean="0">
-                <a:solidFill>
-                  <a:srgbClr val="E8750C"/>
-                </a:solidFill>
-              </a:rPr>
-              <a:t> 1-2-2-1 – </a:t>
-            </a:r>
-            <a:r>
-              <a:rPr lang="fr-FR" dirty="0" err="1" smtClean="0">
-                <a:solidFill>
-                  <a:srgbClr val="E8750C"/>
-                </a:solidFill>
-              </a:rPr>
-              <a:t>Padding</a:t>
-            </a:r>
-            <a:r>
-              <a:rPr lang="fr-FR" dirty="0" smtClean="0">
-                <a:solidFill>
-                  <a:srgbClr val="E8750C"/>
-                </a:solidFill>
-              </a:rPr>
-              <a:t> VALID</a:t>
-            </a:r>
-          </a:p>
-          <a:p>
-            <a:pPr lvl="1"/>
-            <a:r>
-              <a:rPr lang="fr-FR" dirty="0" err="1" smtClean="0">
-                <a:solidFill>
-                  <a:srgbClr val="E8750C"/>
-                </a:solidFill>
-              </a:rPr>
-              <a:t>Flattening</a:t>
-            </a:r>
-            <a:r>
-              <a:rPr lang="fr-FR" dirty="0" smtClean="0">
-                <a:solidFill>
-                  <a:srgbClr val="E8750C"/>
-                </a:solidFill>
-              </a:rPr>
-              <a:t> </a:t>
-            </a:r>
-          </a:p>
-          <a:p>
-            <a:pPr lvl="1"/>
-            <a:r>
-              <a:rPr lang="fr-FR" dirty="0" smtClean="0">
-                <a:solidFill>
-                  <a:srgbClr val="E8750C"/>
-                </a:solidFill>
-              </a:rPr>
-              <a:t>Dense 128 + relu</a:t>
-            </a:r>
-          </a:p>
-          <a:p>
-            <a:pPr lvl="1"/>
-            <a:r>
-              <a:rPr lang="fr-FR" dirty="0" smtClean="0">
-                <a:solidFill>
-                  <a:srgbClr val="E8750C"/>
-                </a:solidFill>
-              </a:rPr>
-              <a:t>Dense 10 + </a:t>
-            </a:r>
-            <a:r>
-              <a:rPr lang="fr-FR" dirty="0" err="1" smtClean="0">
-                <a:solidFill>
-                  <a:srgbClr val="E8750C"/>
-                </a:solidFill>
-              </a:rPr>
-              <a:t>softmax</a:t>
+              <a:t>1536 features</a:t>
             </a:r>
             <a:endParaRPr lang="fr-FR" dirty="0" smtClean="0">
               <a:solidFill>
@@ -10117,23 +9921,30 @@
             </a:endParaRPr>
           </a:p>
           <a:p>
-            <a:r>
-              <a:rPr lang="fr-FR" dirty="0" smtClean="0">
-                <a:solidFill>
-                  <a:srgbClr val="E8750C"/>
-                </a:solidFill>
-              </a:rPr>
-              <a:t>99.08% sur le test set</a:t>
-            </a:r>
-          </a:p>
-          <a:p>
-            <a:r>
-              <a:rPr lang="fr-FR" dirty="0" smtClean="0">
-                <a:solidFill>
-                  <a:srgbClr val="E8750C"/>
-                </a:solidFill>
-              </a:rPr>
-              <a:t>99.585% sur </a:t>
+            <a:pPr lvl="2"/>
+            <a:r>
+              <a:rPr lang="fr-FR" dirty="0">
+                <a:solidFill>
+                  <a:srgbClr val="E8750C"/>
+                </a:solidFill>
+              </a:rPr>
+              <a:t>Classifieur simple</a:t>
+            </a:r>
+            <a:endParaRPr lang="fr-FR" dirty="0" smtClean="0">
+              <a:solidFill>
+                <a:srgbClr val="E8750C"/>
+              </a:solidFill>
+            </a:endParaRPr>
+          </a:p>
+          <a:p>
+            <a:pPr lvl="1"/>
+            <a:r>
+              <a:rPr lang="fr-FR" dirty="0" smtClean="0">
+                <a:solidFill>
+                  <a:srgbClr val="E8750C"/>
+                </a:solidFill>
+              </a:rPr>
+              <a:t>Ré-entrainer </a:t>
             </a:r>
             <a:r>
               <a:rPr lang="fr-FR" dirty="0" err="1" smtClean="0">
@@ -10141,16 +9952,32 @@
                   <a:srgbClr val="E8750C"/>
                 </a:solidFill>
               </a:rPr>
-              <a:t>Kaggle</a:t>
-            </a:r>
-            <a:r>
-              <a:rPr lang="fr-FR" dirty="0" smtClean="0">
-                <a:solidFill>
-                  <a:srgbClr val="E8750C"/>
-                </a:solidFill>
-              </a:rPr>
-              <a:t> (Classement entre 193 et 207/1943)</a:t>
-            </a:r>
+              <a:t>MobileNet</a:t>
+            </a:r>
+            <a:r>
+              <a:rPr lang="fr-FR" dirty="0" smtClean="0">
+                <a:solidFill>
+                  <a:srgbClr val="E8750C"/>
+                </a:solidFill>
+              </a:rPr>
+              <a:t> (2% stable ?)</a:t>
+            </a:r>
+          </a:p>
+          <a:p>
+            <a:pPr lvl="2"/>
+            <a:r>
+              <a:rPr lang="fr-FR" dirty="0">
+                <a:solidFill>
+                  <a:srgbClr val="E8750C"/>
+                </a:solidFill>
+              </a:rPr>
+              <a:t>Classifieur simple</a:t>
+            </a:r>
+            <a:endParaRPr lang="fr-FR" dirty="0" smtClean="0">
+              <a:solidFill>
+                <a:srgbClr val="E8750C"/>
+              </a:solidFill>
+            </a:endParaRPr>
           </a:p>
         </p:txBody>
       </p:sp>
@@ -10171,7 +9998,7 @@
           <a:p>
             <a:fld id="{30547005-2CCE-4AAF-810C-C33FB4661996}" type="datetime1">
               <a:rPr lang="fr-FR" smtClean="0"/>
-              <a:t>18/01/2018</a:t>
+              <a:t>21/01/2018</a:t>
             </a:fld>
             <a:endParaRPr lang="fr-FR"/>
           </a:p>
@@ -10256,149 +10083,9 @@
           <a:p>
             <a:r>
               <a:rPr lang="fr-FR" dirty="0" smtClean="0"/>
-              <a:t>API</a:t>
+              <a:t>Custom CNN</a:t>
             </a:r>
             <a:endParaRPr lang="fr-FR" dirty="0"/>
-          </a:p>
-        </p:txBody>
-      </p:sp>
-      <p:sp>
-        <p:nvSpPr>
-          <p:cNvPr id="3" name="Espace réservé du contenu 2"/>
-          <p:cNvSpPr>
-            <a:spLocks noGrp="1"/>
-          </p:cNvSpPr>
-          <p:nvPr>
-            <p:ph idx="1"/>
-          </p:nvPr>
-        </p:nvSpPr>
-        <p:spPr/>
-        <p:txBody>
-          <a:bodyPr>
-            <a:normAutofit/>
-          </a:bodyPr>
-          <a:lstStyle/>
-          <a:p>
-            <a:r>
-              <a:rPr lang="fr-FR" dirty="0" smtClean="0">
-                <a:solidFill>
-                  <a:srgbClr val="E8750C"/>
-                </a:solidFill>
-              </a:rPr>
-              <a:t>Modèle CNN</a:t>
-            </a:r>
-          </a:p>
-          <a:p>
-            <a:r>
-              <a:rPr lang="fr-FR" dirty="0" smtClean="0">
-                <a:solidFill>
-                  <a:srgbClr val="E8750C"/>
-                </a:solidFill>
-              </a:rPr>
-              <a:t>1 à N images</a:t>
-            </a:r>
-          </a:p>
-          <a:p>
-            <a:pPr lvl="1"/>
-            <a:r>
-              <a:rPr lang="fr-FR" dirty="0" err="1" smtClean="0">
-                <a:solidFill>
-                  <a:srgbClr val="E8750C"/>
-                </a:solidFill>
-              </a:rPr>
-              <a:t>Pre-process</a:t>
-            </a:r>
-            <a:r>
-              <a:rPr lang="fr-FR" dirty="0" smtClean="0">
-                <a:solidFill>
-                  <a:srgbClr val="E8750C"/>
-                </a:solidFill>
-              </a:rPr>
-              <a:t> 1 par 1</a:t>
-            </a:r>
-          </a:p>
-          <a:p>
-            <a:pPr lvl="1"/>
-            <a:r>
-              <a:rPr lang="fr-FR" dirty="0" err="1" smtClean="0">
-                <a:solidFill>
-                  <a:srgbClr val="E8750C"/>
-                </a:solidFill>
-              </a:rPr>
-              <a:t>Merge</a:t>
-            </a:r>
-            <a:r>
-              <a:rPr lang="fr-FR" dirty="0" smtClean="0">
-                <a:solidFill>
-                  <a:srgbClr val="E8750C"/>
-                </a:solidFill>
-              </a:rPr>
-              <a:t> (n, 299, 299, 3)</a:t>
-            </a:r>
-          </a:p>
-          <a:p>
-            <a:pPr lvl="1"/>
-            <a:r>
-              <a:rPr lang="fr-FR" dirty="0" smtClean="0">
-                <a:solidFill>
-                  <a:srgbClr val="E8750C"/>
-                </a:solidFill>
-              </a:rPr>
-              <a:t>Extraction features (n, 1536)</a:t>
-            </a:r>
-          </a:p>
-          <a:p>
-            <a:pPr lvl="1"/>
-            <a:r>
-              <a:rPr lang="fr-FR" dirty="0" err="1" smtClean="0">
-                <a:solidFill>
-                  <a:srgbClr val="E8750C"/>
-                </a:solidFill>
-              </a:rPr>
-              <a:t>Prediction</a:t>
-            </a:r>
-            <a:r>
-              <a:rPr lang="fr-FR" dirty="0" smtClean="0">
-                <a:solidFill>
-                  <a:srgbClr val="E8750C"/>
-                </a:solidFill>
-              </a:rPr>
-              <a:t> (n, 120)</a:t>
-            </a:r>
-          </a:p>
-          <a:p>
-            <a:pPr lvl="1"/>
-            <a:r>
-              <a:rPr lang="fr-FR" dirty="0" smtClean="0">
-                <a:solidFill>
-                  <a:srgbClr val="E8750C"/>
-                </a:solidFill>
-              </a:rPr>
-              <a:t>Affichage par image du top 5 avec %</a:t>
-            </a:r>
-          </a:p>
-          <a:p>
-            <a:r>
-              <a:rPr lang="fr-FR" sz="2800" dirty="0" smtClean="0">
-                <a:solidFill>
-                  <a:srgbClr val="95023C"/>
-                </a:solidFill>
-              </a:rPr>
-              <a:t>python classifieur.py img1 img2 … </a:t>
-            </a:r>
-            <a:r>
-              <a:rPr lang="fr-FR" sz="2800" dirty="0" err="1" smtClean="0">
-                <a:solidFill>
-                  <a:srgbClr val="95023C"/>
-                </a:solidFill>
-              </a:rPr>
-              <a:t>imgN</a:t>
-            </a:r>
-            <a:endParaRPr lang="fr-FR" sz="2800" dirty="0" smtClean="0">
-              <a:solidFill>
-                <a:srgbClr val="95023C"/>
-              </a:solidFill>
-            </a:endParaRPr>
           </a:p>
         </p:txBody>
       </p:sp>
@@ -10419,7 +10106,7 @@
           <a:p>
             <a:fld id="{30547005-2CCE-4AAF-810C-C33FB4661996}" type="datetime1">
               <a:rPr lang="fr-FR" smtClean="0"/>
-              <a:t>18/01/2018</a:t>
+              <a:t>21/01/2018</a:t>
             </a:fld>
             <a:endParaRPr lang="fr-FR"/>
           </a:p>
@@ -10448,10 +10135,59 @@
           </a:p>
         </p:txBody>
       </p:sp>
+      <p:pic>
+        <p:nvPicPr>
+          <p:cNvPr id="3" name="Picture 2" descr="F:\Nicolas\Documents\OpenClassRoom\P7\img\custom_CNN.png"/>
+          <p:cNvPicPr>
+            <a:picLocks noChangeAspect="1" noChangeArrowheads="1"/>
+          </p:cNvPicPr>
+          <p:nvPr/>
+        </p:nvPicPr>
+        <p:blipFill rotWithShape="1">
+          <a:blip r:embed="rId2">
+            <a:clrChange>
+              <a:clrFrom>
+                <a:srgbClr val="FFFFFF"/>
+              </a:clrFrom>
+              <a:clrTo>
+                <a:srgbClr val="FFFFFF">
+                  <a:alpha val="0"/>
+                </a:srgbClr>
+              </a:clrTo>
+            </a:clrChange>
+            <a:extLst>
+              <a:ext uri="{28A0092B-C50C-407E-A947-70E740481C1C}">
+                <a14:useLocalDpi xmlns:a14="http://schemas.microsoft.com/office/drawing/2010/main" val="0"/>
+              </a:ext>
+            </a:extLst>
+          </a:blip>
+          <a:srcRect l="8254" t="9863" r="8995" b="9149"/>
+          <a:stretch/>
+        </p:blipFill>
+        <p:spPr bwMode="auto">
+          <a:xfrm>
+            <a:off x="1043608" y="1158446"/>
+            <a:ext cx="7204908" cy="5288513"/>
+          </a:xfrm>
+          <a:prstGeom prst="rect">
+            <a:avLst/>
+          </a:prstGeom>
+          <a:noFill/>
+          <a:extLst>
+            <a:ext uri="{909E8E84-426E-40DD-AFC4-6F175D3DCCD1}">
+              <a14:hiddenFill xmlns:a14="http://schemas.microsoft.com/office/drawing/2010/main">
+                <a:solidFill>
+                  <a:srgbClr val="FFFFFF"/>
+                </a:solidFill>
+              </a14:hiddenFill>
+            </a:ext>
+          </a:extLst>
+        </p:spPr>
+      </p:pic>
     </p:spTree>
     <p:extLst>
       <p:ext uri="{BB962C8B-B14F-4D97-AF65-F5344CB8AC3E}">
-        <p14:creationId xmlns:p14="http://schemas.microsoft.com/office/powerpoint/2010/main" val="1108826090"/>
+        <p14:creationId xmlns:p14="http://schemas.microsoft.com/office/powerpoint/2010/main" val="4073787232"/>
       </p:ext>
     </p:extLst>
   </p:cSld>
@@ -10512,6 +10248,159 @@
       </p:sp>
       <p:sp>
         <p:nvSpPr>
+          <p:cNvPr id="3" name="Espace réservé du contenu 2"/>
+          <p:cNvSpPr>
+            <a:spLocks noGrp="1"/>
+          </p:cNvSpPr>
+          <p:nvPr>
+            <p:ph idx="1"/>
+          </p:nvPr>
+        </p:nvSpPr>
+        <p:spPr/>
+        <p:txBody>
+          <a:bodyPr>
+            <a:normAutofit/>
+          </a:bodyPr>
+          <a:lstStyle/>
+          <a:p>
+            <a:r>
+              <a:rPr lang="fr-FR" dirty="0" smtClean="0">
+                <a:solidFill>
+                  <a:srgbClr val="E8750C"/>
+                </a:solidFill>
+              </a:rPr>
+              <a:t>Modèle </a:t>
+            </a:r>
+            <a:r>
+              <a:rPr lang="fr-FR" dirty="0" smtClean="0">
+                <a:solidFill>
+                  <a:srgbClr val="E8750C"/>
+                </a:solidFill>
+              </a:rPr>
+              <a:t>CNN avec Transfer Learning</a:t>
+            </a:r>
+            <a:endParaRPr lang="fr-FR" dirty="0" smtClean="0">
+              <a:solidFill>
+                <a:srgbClr val="E8750C"/>
+              </a:solidFill>
+            </a:endParaRPr>
+          </a:p>
+          <a:p>
+            <a:r>
+              <a:rPr lang="fr-FR" dirty="0" smtClean="0">
+                <a:solidFill>
+                  <a:srgbClr val="E8750C"/>
+                </a:solidFill>
+              </a:rPr>
+              <a:t>1 à N images</a:t>
+            </a:r>
+          </a:p>
+          <a:p>
+            <a:pPr lvl="1"/>
+            <a:r>
+              <a:rPr lang="fr-FR" dirty="0" err="1" smtClean="0">
+                <a:solidFill>
+                  <a:srgbClr val="E8750C"/>
+                </a:solidFill>
+              </a:rPr>
+              <a:t>Pre-process</a:t>
+            </a:r>
+            <a:r>
+              <a:rPr lang="fr-FR" dirty="0" smtClean="0">
+                <a:solidFill>
+                  <a:srgbClr val="E8750C"/>
+                </a:solidFill>
+              </a:rPr>
+              <a:t> 1 par 1</a:t>
+            </a:r>
+          </a:p>
+          <a:p>
+            <a:pPr lvl="1"/>
+            <a:r>
+              <a:rPr lang="fr-FR" dirty="0" err="1" smtClean="0">
+                <a:solidFill>
+                  <a:srgbClr val="E8750C"/>
+                </a:solidFill>
+              </a:rPr>
+              <a:t>Merge</a:t>
+            </a:r>
+            <a:r>
+              <a:rPr lang="fr-FR" dirty="0" smtClean="0">
+                <a:solidFill>
+                  <a:srgbClr val="E8750C"/>
+                </a:solidFill>
+              </a:rPr>
+              <a:t> (n, 299, 299, 3)</a:t>
+            </a:r>
+          </a:p>
+          <a:p>
+            <a:pPr lvl="1"/>
+            <a:r>
+              <a:rPr lang="fr-FR" dirty="0" smtClean="0">
+                <a:solidFill>
+                  <a:srgbClr val="E8750C"/>
+                </a:solidFill>
+              </a:rPr>
+              <a:t>Extraction features (n, 1536)</a:t>
+            </a:r>
+          </a:p>
+          <a:p>
+            <a:pPr lvl="1"/>
+            <a:r>
+              <a:rPr lang="fr-FR" dirty="0" err="1" smtClean="0">
+                <a:solidFill>
+                  <a:srgbClr val="E8750C"/>
+                </a:solidFill>
+              </a:rPr>
+              <a:t>Prediction</a:t>
+            </a:r>
+            <a:r>
+              <a:rPr lang="fr-FR" dirty="0" smtClean="0">
+                <a:solidFill>
+                  <a:srgbClr val="E8750C"/>
+                </a:solidFill>
+              </a:rPr>
+              <a:t> (n, 120)</a:t>
+            </a:r>
+          </a:p>
+          <a:p>
+            <a:pPr lvl="1"/>
+            <a:r>
+              <a:rPr lang="fr-FR" dirty="0" smtClean="0">
+                <a:solidFill>
+                  <a:srgbClr val="E8750C"/>
+                </a:solidFill>
+              </a:rPr>
+              <a:t>Affichage par image du top 5 avec %</a:t>
+            </a:r>
+          </a:p>
+          <a:p>
+            <a:r>
+              <a:rPr lang="fr-FR" sz="2800" dirty="0" smtClean="0">
+                <a:solidFill>
+                  <a:srgbClr val="95023C"/>
+                </a:solidFill>
+              </a:rPr>
+              <a:t>python classifieur.py img1 img2 … </a:t>
+            </a:r>
+            <a:r>
+              <a:rPr lang="fr-FR" sz="2800" dirty="0" err="1" smtClean="0">
+                <a:solidFill>
+                  <a:srgbClr val="95023C"/>
+                </a:solidFill>
+              </a:rPr>
+              <a:t>imgN</a:t>
+            </a:r>
+            <a:endParaRPr lang="fr-FR" sz="2800" dirty="0" smtClean="0">
+              <a:solidFill>
+                <a:srgbClr val="95023C"/>
+              </a:solidFill>
+            </a:endParaRPr>
+          </a:p>
+        </p:txBody>
+      </p:sp>
+      <p:sp>
+        <p:nvSpPr>
           <p:cNvPr id="4" name="Espace réservé de la date 3"/>
           <p:cNvSpPr>
             <a:spLocks noGrp="1"/>
@@ -10527,7 +10416,115 @@
           <a:p>
             <a:fld id="{30547005-2CCE-4AAF-810C-C33FB4661996}" type="datetime1">
               <a:rPr lang="fr-FR" smtClean="0"/>
-              <a:t>18/01/2018</a:t>
+              <a:t>21/01/2018</a:t>
+            </a:fld>
+            <a:endParaRPr lang="fr-FR"/>
+          </a:p>
+        </p:txBody>
+      </p:sp>
+      <p:sp>
+        <p:nvSpPr>
+          <p:cNvPr id="5" name="Espace réservé du pied de page 4"/>
+          <p:cNvSpPr>
+            <a:spLocks noGrp="1"/>
+          </p:cNvSpPr>
+          <p:nvPr>
+            <p:ph type="ftr" sz="quarter" idx="11"/>
+          </p:nvPr>
+        </p:nvSpPr>
+        <p:spPr/>
+        <p:txBody>
+          <a:bodyPr/>
+          <a:lstStyle/>
+          <a:p>
+            <a:r>
+              <a:rPr lang="fr-FR" dirty="0" smtClean="0"/>
+              <a:t>MINE Nicolas</a:t>
+            </a:r>
+            <a:endParaRPr lang="fr-FR" dirty="0"/>
+          </a:p>
+        </p:txBody>
+      </p:sp>
+    </p:spTree>
+    <p:extLst>
+      <p:ext uri="{BB962C8B-B14F-4D97-AF65-F5344CB8AC3E}">
+        <p14:creationId xmlns:p14="http://schemas.microsoft.com/office/powerpoint/2010/main" val="1108826090"/>
+      </p:ext>
+    </p:extLst>
+  </p:cSld>
+  <p:clrMapOvr>
+    <a:masterClrMapping/>
+  </p:clrMapOvr>
+  <p:timing>
+    <p:tnLst>
+      <p:par>
+        <p:cTn id="1" dur="indefinite" restart="never" nodeType="tmRoot"/>
+      </p:par>
+    </p:tnLst>
+  </p:timing>
+</p:sld>
+</file>
+
+<file path=ppt/slides/slide27.xml><?xml version="1.0" encoding="utf-8"?>
+<p:sld xmlns:a="http://schemas.openxmlformats.org/drawingml/2006/main" xmlns:r="http://schemas.openxmlformats.org/officeDocument/2006/relationships" xmlns:p="http://schemas.openxmlformats.org/presentationml/2006/main">
+  <p:cSld>
+    <p:spTree>
+      <p:nvGrpSpPr>
+        <p:cNvPr id="1" name=""/>
+        <p:cNvGrpSpPr/>
+        <p:nvPr/>
+      </p:nvGrpSpPr>
+      <p:grpSpPr>
+        <a:xfrm>
+          <a:off x="0" y="0"/>
+          <a:ext cx="0" cy="0"/>
+          <a:chOff x="0" y="0"/>
+          <a:chExt cx="0" cy="0"/>
+        </a:xfrm>
+      </p:grpSpPr>
+      <p:sp>
+        <p:nvSpPr>
+          <p:cNvPr id="2" name="Titre 1"/>
+          <p:cNvSpPr>
+            <a:spLocks noGrp="1"/>
+          </p:cNvSpPr>
+          <p:nvPr>
+            <p:ph type="title"/>
+          </p:nvPr>
+        </p:nvSpPr>
+        <p:spPr/>
+        <p:txBody>
+          <a:bodyPr>
+            <a:normAutofit/>
+          </a:bodyPr>
+          <a:lstStyle/>
+          <a:p>
+            <a:r>
+              <a:rPr lang="fr-FR" dirty="0" smtClean="0"/>
+              <a:t>API</a:t>
+            </a:r>
+            <a:endParaRPr lang="fr-FR" dirty="0"/>
+          </a:p>
+        </p:txBody>
+      </p:sp>
+      <p:sp>
+        <p:nvSpPr>
+          <p:cNvPr id="4" name="Espace réservé de la date 3"/>
+          <p:cNvSpPr>
+            <a:spLocks noGrp="1"/>
+          </p:cNvSpPr>
+          <p:nvPr>
+            <p:ph type="dt" sz="half" idx="10"/>
+          </p:nvPr>
+        </p:nvSpPr>
+        <p:spPr/>
+        <p:txBody>
+          <a:bodyPr/>
+          <a:lstStyle/>
+          <a:p>
+            <a:fld id="{30547005-2CCE-4AAF-810C-C33FB4661996}" type="datetime1">
+              <a:rPr lang="fr-FR" smtClean="0"/>
+              <a:t>21/01/2018</a:t>
             </a:fld>
             <a:endParaRPr lang="fr-FR"/>
           </a:p>
@@ -10720,218 +10717,6 @@
 </p:sld>
 </file>
 
-<file path=ppt/slides/slide27.xml><?xml version="1.0" encoding="utf-8"?>
-<p:sld xmlns:a="http://schemas.openxmlformats.org/drawingml/2006/main" xmlns:r="http://schemas.openxmlformats.org/officeDocument/2006/relationships" xmlns:p="http://schemas.openxmlformats.org/presentationml/2006/main">
-  <p:cSld>
-    <p:spTree>
-      <p:nvGrpSpPr>
-        <p:cNvPr id="1" name=""/>
-        <p:cNvGrpSpPr/>
-        <p:nvPr/>
-      </p:nvGrpSpPr>
-      <p:grpSpPr>
-        <a:xfrm>
-          <a:off x="0" y="0"/>
-          <a:ext cx="0" cy="0"/>
-          <a:chOff x="0" y="0"/>
-          <a:chExt cx="0" cy="0"/>
-        </a:xfrm>
-      </p:grpSpPr>
-      <p:sp>
-        <p:nvSpPr>
-          <p:cNvPr id="2" name="Titre 1"/>
-          <p:cNvSpPr>
-            <a:spLocks noGrp="1"/>
-          </p:cNvSpPr>
-          <p:nvPr>
-            <p:ph type="title"/>
-          </p:nvPr>
-        </p:nvSpPr>
-        <p:spPr/>
-        <p:txBody>
-          <a:bodyPr>
-            <a:normAutofit/>
-          </a:bodyPr>
-          <a:lstStyle/>
-          <a:p>
-            <a:r>
-              <a:rPr lang="fr-FR" dirty="0"/>
-              <a:t>Pistes d’évolutions</a:t>
-            </a:r>
-          </a:p>
-        </p:txBody>
-      </p:sp>
-      <p:sp>
-        <p:nvSpPr>
-          <p:cNvPr id="3" name="Espace réservé du contenu 2"/>
-          <p:cNvSpPr>
-            <a:spLocks noGrp="1"/>
-          </p:cNvSpPr>
-          <p:nvPr>
-            <p:ph idx="1"/>
-          </p:nvPr>
-        </p:nvSpPr>
-        <p:spPr>
-          <a:xfrm>
-            <a:off x="457200" y="1600200"/>
-            <a:ext cx="8229600" cy="4709120"/>
-          </a:xfrm>
-        </p:spPr>
-        <p:txBody>
-          <a:bodyPr>
-            <a:normAutofit/>
-          </a:bodyPr>
-          <a:lstStyle/>
-          <a:p>
-            <a:r>
-              <a:rPr lang="fr-FR" dirty="0" smtClean="0">
-                <a:solidFill>
-                  <a:srgbClr val="E8750C"/>
-                </a:solidFill>
-              </a:rPr>
-              <a:t>Modèle </a:t>
-            </a:r>
-            <a:r>
-              <a:rPr lang="fr-FR" dirty="0" smtClean="0">
-                <a:solidFill>
-                  <a:srgbClr val="E8750C"/>
-                </a:solidFill>
-              </a:rPr>
-              <a:t>Classique</a:t>
-            </a:r>
-          </a:p>
-          <a:p>
-            <a:pPr lvl="1"/>
-            <a:r>
-              <a:rPr lang="fr-FR" dirty="0" smtClean="0">
-                <a:solidFill>
-                  <a:srgbClr val="E8750C"/>
-                </a:solidFill>
-              </a:rPr>
-              <a:t>Fréquences sur image non réduites</a:t>
-            </a:r>
-          </a:p>
-          <a:p>
-            <a:pPr lvl="1"/>
-            <a:r>
-              <a:rPr lang="fr-FR" dirty="0" smtClean="0">
-                <a:solidFill>
-                  <a:srgbClr val="E8750C"/>
-                </a:solidFill>
-              </a:rPr>
-              <a:t>Autre descripteurs au lieu de SIFT (SURF / ORB)</a:t>
-            </a:r>
-          </a:p>
-          <a:p>
-            <a:pPr lvl="1"/>
-            <a:r>
-              <a:rPr lang="fr-FR" dirty="0" smtClean="0">
-                <a:solidFill>
-                  <a:srgbClr val="E8750C"/>
-                </a:solidFill>
-              </a:rPr>
-              <a:t>Contours ?</a:t>
-            </a:r>
-          </a:p>
-          <a:p>
-            <a:pPr lvl="2"/>
-            <a:r>
-              <a:rPr lang="fr-FR" dirty="0" smtClean="0">
-                <a:solidFill>
-                  <a:srgbClr val="E8750C"/>
-                </a:solidFill>
-              </a:rPr>
-              <a:t>Différentes focales</a:t>
-            </a:r>
-            <a:endParaRPr lang="fr-FR" dirty="0" smtClean="0">
-              <a:solidFill>
-                <a:srgbClr val="E8750C"/>
-              </a:solidFill>
-            </a:endParaRPr>
-          </a:p>
-          <a:p>
-            <a:endParaRPr lang="fr-FR" sz="2800" dirty="0">
-              <a:solidFill>
-                <a:srgbClr val="E8750C"/>
-              </a:solidFill>
-            </a:endParaRPr>
-          </a:p>
-          <a:p>
-            <a:pPr lvl="1"/>
-            <a:endParaRPr lang="fr-FR" sz="2400" dirty="0">
-              <a:solidFill>
-                <a:srgbClr val="E8750C"/>
-              </a:solidFill>
-            </a:endParaRPr>
-          </a:p>
-        </p:txBody>
-      </p:sp>
-      <p:sp>
-        <p:nvSpPr>
-          <p:cNvPr id="4" name="Espace réservé de la date 3"/>
-          <p:cNvSpPr>
-            <a:spLocks noGrp="1"/>
-          </p:cNvSpPr>
-          <p:nvPr>
-            <p:ph type="dt" sz="half" idx="10"/>
-          </p:nvPr>
-        </p:nvSpPr>
-        <p:spPr/>
-        <p:txBody>
-          <a:bodyPr/>
-          <a:lstStyle/>
-          <a:p>
-            <a:fld id="{30547005-2CCE-4AAF-810C-C33FB4661996}" type="datetime1">
-              <a:rPr lang="fr-FR" smtClean="0"/>
-              <a:t>18/01/2018</a:t>
-            </a:fld>
-            <a:endParaRPr lang="fr-FR"/>
-          </a:p>
-        </p:txBody>
-      </p:sp>
-      <p:sp>
-        <p:nvSpPr>
-          <p:cNvPr id="5" name="Espace réservé du pied de page 4"/>
-          <p:cNvSpPr>
-            <a:spLocks noGrp="1"/>
-          </p:cNvSpPr>
-          <p:nvPr>
-            <p:ph type="ftr" sz="quarter" idx="11"/>
-          </p:nvPr>
-        </p:nvSpPr>
-        <p:spPr/>
-        <p:txBody>
-          <a:bodyPr/>
-          <a:lstStyle/>
-          <a:p>
-            <a:r>
-              <a:rPr lang="fr-FR" dirty="0" smtClean="0"/>
-              <a:t>MINE Nicolas</a:t>
-            </a:r>
-            <a:endParaRPr lang="fr-FR" dirty="0"/>
-          </a:p>
-        </p:txBody>
-      </p:sp>
-    </p:spTree>
-    <p:extLst>
-      <p:ext uri="{BB962C8B-B14F-4D97-AF65-F5344CB8AC3E}">
-        <p14:creationId xmlns:p14="http://schemas.microsoft.com/office/powerpoint/2010/main" val="3586137321"/>
-      </p:ext>
-    </p:extLst>
-  </p:cSld>
-  <p:clrMapOvr>
-    <a:masterClrMapping/>
-  </p:clrMapOvr>
-  <p:timing>
-    <p:tnLst>
-      <p:par>
-        <p:cTn id="1" dur="indefinite" restart="never" nodeType="tmRoot"/>
-      </p:par>
-    </p:tnLst>
-  </p:timing>
-</p:sld>
-</file>
-
 <file path=ppt/slides/slide28.xml><?xml version="1.0" encoding="utf-8"?>
 <p:sld xmlns:a="http://schemas.openxmlformats.org/drawingml/2006/main" xmlns:r="http://schemas.openxmlformats.org/officeDocument/2006/relationships" xmlns:p="http://schemas.openxmlformats.org/presentationml/2006/main">
   <p:cSld>
@@ -11001,7 +10786,7 @@
                   <a:srgbClr val="E8750C"/>
                 </a:solidFill>
               </a:rPr>
-              <a:t>CNN</a:t>
+              <a:t>Modèle Classique</a:t>
             </a:r>
           </a:p>
           <a:p>
@@ -11012,23 +10797,29 @@
                   <a:srgbClr val="E8750C"/>
                 </a:solidFill>
               </a:rPr>
-              <a:t>Nettoyage images : </a:t>
-            </a:r>
-            <a:r>
-              <a:rPr lang="fr-FR" dirty="0" err="1" smtClean="0">
-                <a:solidFill>
-                  <a:srgbClr val="E8750C"/>
-                </a:solidFill>
-              </a:rPr>
-              <a:t>Regression</a:t>
-            </a:r>
-            <a:r>
-              <a:rPr lang="fr-FR" dirty="0" smtClean="0">
-                <a:solidFill>
-                  <a:srgbClr val="E8750C"/>
-                </a:solidFill>
-              </a:rPr>
-              <a:t> (YOLO)</a:t>
+              <a:t>Fréquences sur image non réduites</a:t>
+            </a:r>
+          </a:p>
+          <a:p>
+            <a:pPr lvl="1"/>
+            <a:r>
+              <a:rPr lang="fr-FR" dirty="0" smtClean="0">
+                <a:solidFill>
+                  <a:srgbClr val="E8750C"/>
+                </a:solidFill>
+              </a:rPr>
+              <a:t>Autre descripteurs au lieu de SIFT (SURF / ORB)</a:t>
+            </a:r>
+          </a:p>
+          <a:p>
+            <a:pPr lvl="1"/>
+            <a:r>
+              <a:rPr lang="fr-FR" dirty="0" smtClean="0">
+                <a:solidFill>
+                  <a:srgbClr val="E8750C"/>
+                </a:solidFill>
+              </a:rPr>
+              <a:t>Contours ?</a:t>
             </a:r>
           </a:p>
           <a:p>
@@ -11039,167 +10830,8 @@
                   <a:srgbClr val="E8750C"/>
                 </a:solidFill>
               </a:rPr>
-              <a:t>Risque mauvais dimensions</a:t>
-            </a:r>
-          </a:p>
-          <a:p>
-            <a:pPr lvl="1"/>
-            <a:r>
-              <a:rPr lang="fr-FR" dirty="0" smtClean="0">
-                <a:solidFill>
-                  <a:srgbClr val="E8750C"/>
-                </a:solidFill>
-              </a:rPr>
-              <a:t>Modèle manuel pas fait</a:t>
-            </a:r>
-          </a:p>
-          <a:p>
-            <a:pPr lvl="2"/>
-            <a:r>
-              <a:rPr lang="fr-FR" dirty="0" smtClean="0">
-                <a:solidFill>
-                  <a:srgbClr val="E8750C"/>
-                </a:solidFill>
-              </a:rPr>
-              <a:t>Trop peu de données</a:t>
-            </a:r>
-          </a:p>
-          <a:p>
-            <a:pPr lvl="3"/>
-            <a:r>
-              <a:rPr lang="fr-FR" dirty="0" err="1" smtClean="0">
-                <a:solidFill>
-                  <a:srgbClr val="E8750C"/>
-                </a:solidFill>
-              </a:rPr>
-              <a:t>Vanishing</a:t>
-            </a:r>
-            <a:r>
-              <a:rPr lang="fr-FR" dirty="0" smtClean="0">
-                <a:solidFill>
-                  <a:srgbClr val="E8750C"/>
-                </a:solidFill>
-              </a:rPr>
-              <a:t> Gradient</a:t>
-            </a:r>
-          </a:p>
-          <a:p>
-            <a:pPr lvl="3"/>
-            <a:r>
-              <a:rPr lang="fr-FR" dirty="0" smtClean="0">
-                <a:solidFill>
-                  <a:srgbClr val="E8750C"/>
-                </a:solidFill>
-              </a:rPr>
-              <a:t>Beaucoup d’images nécessaires (</a:t>
-            </a:r>
-            <a:r>
-              <a:rPr lang="fr-FR" dirty="0" err="1" smtClean="0">
-                <a:solidFill>
-                  <a:srgbClr val="E8750C"/>
-                </a:solidFill>
-              </a:rPr>
-              <a:t>imagenet</a:t>
-            </a:r>
-            <a:r>
-              <a:rPr lang="fr-FR" dirty="0" smtClean="0">
-                <a:solidFill>
-                  <a:srgbClr val="E8750C"/>
-                </a:solidFill>
-              </a:rPr>
-              <a:t>)</a:t>
-            </a:r>
-          </a:p>
-          <a:p>
-            <a:pPr lvl="1"/>
-            <a:r>
-              <a:rPr lang="fr-FR" dirty="0" smtClean="0">
-                <a:solidFill>
-                  <a:srgbClr val="E8750C"/>
-                </a:solidFill>
-              </a:rPr>
-              <a:t>Entrainement du </a:t>
-            </a:r>
-            <a:r>
-              <a:rPr lang="fr-FR" dirty="0" err="1" smtClean="0">
-                <a:solidFill>
-                  <a:srgbClr val="E8750C"/>
-                </a:solidFill>
-              </a:rPr>
-              <a:t>pre-trained</a:t>
-            </a:r>
-            <a:endParaRPr lang="fr-FR" dirty="0" smtClean="0">
-              <a:solidFill>
-                <a:srgbClr val="E8750C"/>
-              </a:solidFill>
-            </a:endParaRPr>
-          </a:p>
-          <a:p>
-            <a:pPr lvl="2"/>
-            <a:r>
-              <a:rPr lang="fr-FR" dirty="0" smtClean="0">
-                <a:solidFill>
-                  <a:srgbClr val="E8750C"/>
-                </a:solidFill>
-              </a:rPr>
-              <a:t>Modifier </a:t>
-            </a:r>
-            <a:r>
-              <a:rPr lang="fr-FR" dirty="0" err="1" smtClean="0">
-                <a:solidFill>
-                  <a:srgbClr val="E8750C"/>
-                </a:solidFill>
-              </a:rPr>
-              <a:t>layers</a:t>
-            </a:r>
-            <a:r>
-              <a:rPr lang="fr-FR" dirty="0" smtClean="0">
-                <a:solidFill>
-                  <a:srgbClr val="E8750C"/>
-                </a:solidFill>
-              </a:rPr>
-              <a:t> de l’extracteur</a:t>
-            </a:r>
-          </a:p>
-          <a:p>
-            <a:pPr lvl="3"/>
-            <a:r>
-              <a:rPr lang="fr-FR" dirty="0" smtClean="0">
-                <a:solidFill>
-                  <a:srgbClr val="E8750C"/>
-                </a:solidFill>
-              </a:rPr>
-              <a:t>Très lent : 1j =Env. 50 </a:t>
-            </a:r>
-            <a:r>
-              <a:rPr lang="fr-FR" dirty="0" err="1" smtClean="0">
-                <a:solidFill>
-                  <a:srgbClr val="E8750C"/>
-                </a:solidFill>
-              </a:rPr>
-              <a:t>Epochs</a:t>
-            </a:r>
-            <a:r>
-              <a:rPr lang="fr-FR" dirty="0" smtClean="0">
-                <a:solidFill>
-                  <a:srgbClr val="E8750C"/>
-                </a:solidFill>
-              </a:rPr>
-              <a:t> -&gt; 64% </a:t>
-            </a:r>
-            <a:r>
-              <a:rPr lang="fr-FR" dirty="0" err="1" smtClean="0">
-                <a:solidFill>
-                  <a:srgbClr val="E8750C"/>
-                </a:solidFill>
-              </a:rPr>
-              <a:t>Acc</a:t>
-            </a:r>
-            <a:endParaRPr lang="fr-FR" dirty="0" smtClean="0">
-              <a:solidFill>
-                <a:srgbClr val="E8750C"/>
-              </a:solidFill>
-            </a:endParaRPr>
+              <a:t>Différentes focales</a:t>
+            </a:r>
           </a:p>
           <a:p>
             <a:endParaRPr lang="fr-FR" sz="2800" dirty="0">
@@ -11235,7 +10867,7 @@
           <a:p>
             <a:fld id="{30547005-2CCE-4AAF-810C-C33FB4661996}" type="datetime1">
               <a:rPr lang="fr-FR" smtClean="0"/>
-              <a:t>18/01/2018</a:t>
+              <a:t>21/01/2018</a:t>
             </a:fld>
             <a:endParaRPr lang="fr-FR"/>
           </a:p>
@@ -11267,7 +10899,7 @@
     </p:spTree>
     <p:extLst>
       <p:ext uri="{BB962C8B-B14F-4D97-AF65-F5344CB8AC3E}">
-        <p14:creationId xmlns:p14="http://schemas.microsoft.com/office/powerpoint/2010/main" val="1159824004"/>
+        <p14:creationId xmlns:p14="http://schemas.microsoft.com/office/powerpoint/2010/main" val="3586137321"/>
       </p:ext>
     </p:extLst>
   </p:cSld>
@@ -11353,7 +10985,18 @@
                   <a:srgbClr val="E8750C"/>
                 </a:solidFill>
               </a:rPr>
-              <a:t>Analyse de l’</a:t>
+              <a:t>CNN</a:t>
+            </a:r>
+          </a:p>
+          <a:p>
+            <a:pPr lvl="1"/>
+            <a:r>
+              <a:rPr lang="fr-FR" dirty="0" smtClean="0">
+                <a:solidFill>
+                  <a:srgbClr val="E8750C"/>
+                </a:solidFill>
+              </a:rPr>
+              <a:t>Nettoyage images : </a:t>
             </a:r>
             <a:r>
               <a:rPr lang="fr-FR" dirty="0" err="1" smtClean="0">
@@ -11361,7 +11004,137 @@
                   <a:srgbClr val="E8750C"/>
                 </a:solidFill>
               </a:rPr>
-              <a:t>overfitting</a:t>
+              <a:t>Regression</a:t>
+            </a:r>
+            <a:r>
+              <a:rPr lang="fr-FR" dirty="0" smtClean="0">
+                <a:solidFill>
+                  <a:srgbClr val="E8750C"/>
+                </a:solidFill>
+              </a:rPr>
+              <a:t> (YOLO)</a:t>
+            </a:r>
+          </a:p>
+          <a:p>
+            <a:pPr lvl="2"/>
+            <a:r>
+              <a:rPr lang="fr-FR" dirty="0" smtClean="0">
+                <a:solidFill>
+                  <a:srgbClr val="E8750C"/>
+                </a:solidFill>
+              </a:rPr>
+              <a:t>Risque mauvais dimensions</a:t>
+            </a:r>
+          </a:p>
+          <a:p>
+            <a:pPr lvl="1"/>
+            <a:r>
+              <a:rPr lang="fr-FR" dirty="0" smtClean="0">
+                <a:solidFill>
+                  <a:srgbClr val="E8750C"/>
+                </a:solidFill>
+              </a:rPr>
+              <a:t>CNN Custom : Mauvaises performances</a:t>
+            </a:r>
+          </a:p>
+          <a:p>
+            <a:pPr lvl="2"/>
+            <a:r>
+              <a:rPr lang="fr-FR" dirty="0" smtClean="0">
+                <a:solidFill>
+                  <a:srgbClr val="E8750C"/>
+                </a:solidFill>
+              </a:rPr>
+              <a:t>Trop </a:t>
+            </a:r>
+            <a:r>
+              <a:rPr lang="fr-FR" dirty="0" smtClean="0">
+                <a:solidFill>
+                  <a:srgbClr val="E8750C"/>
+                </a:solidFill>
+              </a:rPr>
+              <a:t>peu de données</a:t>
+            </a:r>
+          </a:p>
+          <a:p>
+            <a:pPr lvl="3"/>
+            <a:r>
+              <a:rPr lang="fr-FR" dirty="0" err="1" smtClean="0">
+                <a:solidFill>
+                  <a:srgbClr val="E8750C"/>
+                </a:solidFill>
+              </a:rPr>
+              <a:t>Vanishing</a:t>
+            </a:r>
+            <a:r>
+              <a:rPr lang="fr-FR" dirty="0" smtClean="0">
+                <a:solidFill>
+                  <a:srgbClr val="E8750C"/>
+                </a:solidFill>
+              </a:rPr>
+              <a:t> Gradient</a:t>
+            </a:r>
+          </a:p>
+          <a:p>
+            <a:pPr lvl="3"/>
+            <a:r>
+              <a:rPr lang="fr-FR" dirty="0" smtClean="0">
+                <a:solidFill>
+                  <a:srgbClr val="E8750C"/>
+                </a:solidFill>
+              </a:rPr>
+              <a:t>Beaucoup d’images nécessaires (</a:t>
+            </a:r>
+            <a:r>
+              <a:rPr lang="fr-FR" dirty="0" err="1" smtClean="0">
+                <a:solidFill>
+                  <a:srgbClr val="E8750C"/>
+                </a:solidFill>
+              </a:rPr>
+              <a:t>imagenet</a:t>
+            </a:r>
+            <a:r>
+              <a:rPr lang="fr-FR" dirty="0" smtClean="0">
+                <a:solidFill>
+                  <a:srgbClr val="E8750C"/>
+                </a:solidFill>
+              </a:rPr>
+              <a:t>)</a:t>
+            </a:r>
+          </a:p>
+          <a:p>
+            <a:pPr lvl="1"/>
+            <a:r>
+              <a:rPr lang="fr-FR" dirty="0" err="1" smtClean="0">
+                <a:solidFill>
+                  <a:srgbClr val="E8750C"/>
+                </a:solidFill>
+              </a:rPr>
+              <a:t>Ré-entrainement</a:t>
+            </a:r>
+            <a:r>
+              <a:rPr lang="fr-FR" dirty="0" smtClean="0">
+                <a:solidFill>
+                  <a:srgbClr val="E8750C"/>
+                </a:solidFill>
+              </a:rPr>
+              <a:t> </a:t>
+            </a:r>
+            <a:r>
+              <a:rPr lang="fr-FR" dirty="0" smtClean="0">
+                <a:solidFill>
+                  <a:srgbClr val="E8750C"/>
+                </a:solidFill>
+              </a:rPr>
+              <a:t>du </a:t>
+            </a:r>
+            <a:r>
+              <a:rPr lang="fr-FR" dirty="0" err="1" smtClean="0">
+                <a:solidFill>
+                  <a:srgbClr val="E8750C"/>
+                </a:solidFill>
+              </a:rPr>
+              <a:t>pre-trained</a:t>
             </a:r>
             <a:endParaRPr lang="fr-FR" dirty="0" smtClean="0">
               <a:solidFill>
@@ -11370,75 +11143,74 @@
             </a:endParaRPr>
           </a:p>
           <a:p>
-            <a:pPr lvl="1"/>
-            <a:r>
-              <a:rPr lang="fr-FR" sz="2400" dirty="0">
-                <a:solidFill>
-                  <a:srgbClr val="E8750C"/>
-                </a:solidFill>
-              </a:rPr>
-              <a:t>Class Activation </a:t>
-            </a:r>
-            <a:r>
-              <a:rPr lang="fr-FR" sz="2400" dirty="0" err="1" smtClean="0">
-                <a:solidFill>
-                  <a:srgbClr val="E8750C"/>
-                </a:solidFill>
-              </a:rPr>
-              <a:t>Mapping</a:t>
-            </a:r>
-            <a:endParaRPr lang="fr-FR" sz="2400" dirty="0" smtClean="0">
+            <a:pPr lvl="2"/>
+            <a:r>
+              <a:rPr lang="fr-FR" dirty="0" smtClean="0">
+                <a:solidFill>
+                  <a:srgbClr val="E8750C"/>
+                </a:solidFill>
+              </a:rPr>
+              <a:t>Modifier </a:t>
+            </a:r>
+            <a:r>
+              <a:rPr lang="fr-FR" dirty="0" err="1" smtClean="0">
+                <a:solidFill>
+                  <a:srgbClr val="E8750C"/>
+                </a:solidFill>
+              </a:rPr>
+              <a:t>layers</a:t>
+            </a:r>
+            <a:r>
+              <a:rPr lang="fr-FR" dirty="0" smtClean="0">
+                <a:solidFill>
+                  <a:srgbClr val="E8750C"/>
+                </a:solidFill>
+              </a:rPr>
+              <a:t> de l’extracteur</a:t>
+            </a:r>
+          </a:p>
+          <a:p>
+            <a:pPr lvl="3"/>
+            <a:r>
+              <a:rPr lang="fr-FR" dirty="0" smtClean="0">
+                <a:solidFill>
+                  <a:srgbClr val="E8750C"/>
+                </a:solidFill>
+              </a:rPr>
+              <a:t>Très lent : 1j =Env. 50 </a:t>
+            </a:r>
+            <a:r>
+              <a:rPr lang="fr-FR" dirty="0" err="1" smtClean="0">
+                <a:solidFill>
+                  <a:srgbClr val="E8750C"/>
+                </a:solidFill>
+              </a:rPr>
+              <a:t>Epochs</a:t>
+            </a:r>
+            <a:r>
+              <a:rPr lang="fr-FR" dirty="0" smtClean="0">
+                <a:solidFill>
+                  <a:srgbClr val="E8750C"/>
+                </a:solidFill>
+              </a:rPr>
+              <a:t> -&gt; 64% </a:t>
+            </a:r>
+            <a:r>
+              <a:rPr lang="fr-FR" dirty="0" err="1" smtClean="0">
+                <a:solidFill>
+                  <a:srgbClr val="E8750C"/>
+                </a:solidFill>
+              </a:rPr>
+              <a:t>Acc</a:t>
+            </a:r>
+            <a:endParaRPr lang="fr-FR" dirty="0" smtClean="0">
               <a:solidFill>
                 <a:srgbClr val="E8750C"/>
               </a:solidFill>
             </a:endParaRPr>
           </a:p>
           <a:p>
-            <a:pPr lvl="2"/>
-            <a:r>
-              <a:rPr lang="fr-FR" dirty="0" smtClean="0">
-                <a:solidFill>
-                  <a:srgbClr val="E8750C"/>
-                </a:solidFill>
-              </a:rPr>
-              <a:t>Possible sur VGG et </a:t>
-            </a:r>
-            <a:r>
-              <a:rPr lang="fr-FR" dirty="0" err="1" smtClean="0">
-                <a:solidFill>
-                  <a:srgbClr val="E8750C"/>
-                </a:solidFill>
-              </a:rPr>
-              <a:t>MobileNet</a:t>
-            </a:r>
-            <a:endParaRPr lang="fr-FR" dirty="0">
-              <a:solidFill>
-                <a:srgbClr val="E8750C"/>
-              </a:solidFill>
-            </a:endParaRPr>
-          </a:p>
-          <a:p>
-            <a:pPr lvl="2"/>
-            <a:r>
-              <a:rPr lang="fr-FR" dirty="0" smtClean="0">
-                <a:solidFill>
-                  <a:srgbClr val="E8750C"/>
-                </a:solidFill>
-              </a:rPr>
-              <a:t>Pas de classifieur Customisé</a:t>
-            </a:r>
-          </a:p>
-          <a:p>
-            <a:pPr lvl="2"/>
-            <a:r>
-              <a:rPr lang="fr-FR" dirty="0" smtClean="0">
-                <a:solidFill>
-                  <a:srgbClr val="E8750C"/>
-                </a:solidFill>
-              </a:rPr>
-              <a:t>Remonte le réseau pour l’analyse</a:t>
-            </a:r>
-            <a:endParaRPr lang="fr-FR" dirty="0">
+            <a:endParaRPr lang="fr-FR" sz="2800" dirty="0">
               <a:solidFill>
                 <a:srgbClr val="E8750C"/>
               </a:solidFill>
@@ -11471,7 +11243,528 @@
           <a:p>
             <a:fld id="{30547005-2CCE-4AAF-810C-C33FB4661996}" type="datetime1">
               <a:rPr lang="fr-FR" smtClean="0"/>
-              <a:t>18/01/2018</a:t>
+              <a:t>21/01/2018</a:t>
+            </a:fld>
+            <a:endParaRPr lang="fr-FR"/>
+          </a:p>
+        </p:txBody>
+      </p:sp>
+      <p:sp>
+        <p:nvSpPr>
+          <p:cNvPr id="5" name="Espace réservé du pied de page 4"/>
+          <p:cNvSpPr>
+            <a:spLocks noGrp="1"/>
+          </p:cNvSpPr>
+          <p:nvPr>
+            <p:ph type="ftr" sz="quarter" idx="11"/>
+          </p:nvPr>
+        </p:nvSpPr>
+        <p:spPr/>
+        <p:txBody>
+          <a:bodyPr/>
+          <a:lstStyle/>
+          <a:p>
+            <a:r>
+              <a:rPr lang="fr-FR" dirty="0" smtClean="0"/>
+              <a:t>MINE Nicolas</a:t>
+            </a:r>
+            <a:endParaRPr lang="fr-FR" dirty="0"/>
+          </a:p>
+        </p:txBody>
+      </p:sp>
+    </p:spTree>
+    <p:extLst>
+      <p:ext uri="{BB962C8B-B14F-4D97-AF65-F5344CB8AC3E}">
+        <p14:creationId xmlns:p14="http://schemas.microsoft.com/office/powerpoint/2010/main" val="1159824004"/>
+      </p:ext>
+    </p:extLst>
+  </p:cSld>
+  <p:clrMapOvr>
+    <a:masterClrMapping/>
+  </p:clrMapOvr>
+  <p:timing>
+    <p:tnLst>
+      <p:par>
+        <p:cTn id="1" dur="indefinite" restart="never" nodeType="tmRoot"/>
+      </p:par>
+    </p:tnLst>
+  </p:timing>
+</p:sld>
+</file>
+
+<file path=ppt/slides/slide3.xml><?xml version="1.0" encoding="utf-8"?>
+<p:sld xmlns:a="http://schemas.openxmlformats.org/drawingml/2006/main" xmlns:r="http://schemas.openxmlformats.org/officeDocument/2006/relationships" xmlns:p="http://schemas.openxmlformats.org/presentationml/2006/main">
+  <p:cSld>
+    <p:spTree>
+      <p:nvGrpSpPr>
+        <p:cNvPr id="1" name=""/>
+        <p:cNvGrpSpPr/>
+        <p:nvPr/>
+      </p:nvGrpSpPr>
+      <p:grpSpPr>
+        <a:xfrm>
+          <a:off x="0" y="0"/>
+          <a:ext cx="0" cy="0"/>
+          <a:chOff x="0" y="0"/>
+          <a:chExt cx="0" cy="0"/>
+        </a:xfrm>
+      </p:grpSpPr>
+      <p:sp>
+        <p:nvSpPr>
+          <p:cNvPr id="2" name="Titre 1"/>
+          <p:cNvSpPr>
+            <a:spLocks noGrp="1"/>
+          </p:cNvSpPr>
+          <p:nvPr>
+            <p:ph type="title"/>
+          </p:nvPr>
+        </p:nvSpPr>
+        <p:spPr/>
+        <p:txBody>
+          <a:bodyPr>
+            <a:normAutofit/>
+          </a:bodyPr>
+          <a:lstStyle/>
+          <a:p>
+            <a:r>
+              <a:rPr lang="fr-FR" dirty="0"/>
+              <a:t>Présentation et </a:t>
+            </a:r>
+            <a:r>
+              <a:rPr lang="fr-FR" dirty="0" smtClean="0"/>
+              <a:t>Objectifs</a:t>
+            </a:r>
+            <a:endParaRPr lang="fr-FR" dirty="0"/>
+          </a:p>
+        </p:txBody>
+      </p:sp>
+      <p:sp>
+        <p:nvSpPr>
+          <p:cNvPr id="3" name="Espace réservé du contenu 2"/>
+          <p:cNvSpPr>
+            <a:spLocks noGrp="1"/>
+          </p:cNvSpPr>
+          <p:nvPr>
+            <p:ph idx="1"/>
+          </p:nvPr>
+        </p:nvSpPr>
+        <p:spPr/>
+        <p:txBody>
+          <a:bodyPr>
+            <a:normAutofit fontScale="92500"/>
+          </a:bodyPr>
+          <a:lstStyle/>
+          <a:p>
+            <a:r>
+              <a:rPr lang="fr-FR" dirty="0" smtClean="0">
+                <a:solidFill>
+                  <a:srgbClr val="E8750C"/>
+                </a:solidFill>
+              </a:rPr>
+              <a:t>Objectifs</a:t>
+            </a:r>
+          </a:p>
+          <a:p>
+            <a:pPr lvl="1"/>
+            <a:r>
+              <a:rPr lang="fr-FR" dirty="0">
+                <a:solidFill>
+                  <a:srgbClr val="E8750C"/>
+                </a:solidFill>
+              </a:rPr>
+              <a:t>Prédiction </a:t>
+            </a:r>
+            <a:r>
+              <a:rPr lang="fr-FR" dirty="0" smtClean="0">
+                <a:solidFill>
+                  <a:srgbClr val="E8750C"/>
+                </a:solidFill>
+              </a:rPr>
+              <a:t>de la Race d’un chien sur une image</a:t>
+            </a:r>
+            <a:endParaRPr lang="fr-FR" dirty="0">
+              <a:solidFill>
+                <a:srgbClr val="E8750C"/>
+              </a:solidFill>
+            </a:endParaRPr>
+          </a:p>
+          <a:p>
+            <a:pPr lvl="2"/>
+            <a:r>
+              <a:rPr lang="fr-FR" dirty="0">
+                <a:solidFill>
+                  <a:srgbClr val="E8750C"/>
+                </a:solidFill>
+              </a:rPr>
+              <a:t>Méthode </a:t>
+            </a:r>
+            <a:r>
+              <a:rPr lang="fr-FR" dirty="0" smtClean="0">
+                <a:solidFill>
+                  <a:srgbClr val="E8750C"/>
+                </a:solidFill>
+              </a:rPr>
+              <a:t>Classique</a:t>
+            </a:r>
+            <a:endParaRPr lang="fr-FR" dirty="0">
+              <a:solidFill>
+                <a:srgbClr val="E8750C"/>
+              </a:solidFill>
+            </a:endParaRPr>
+          </a:p>
+          <a:p>
+            <a:pPr lvl="2"/>
+            <a:r>
+              <a:rPr lang="fr-FR" dirty="0" smtClean="0">
+                <a:solidFill>
+                  <a:srgbClr val="E8750C"/>
+                </a:solidFill>
+              </a:rPr>
+              <a:t>Réseaux de Neurones</a:t>
+            </a:r>
+          </a:p>
+          <a:p>
+            <a:pPr lvl="1"/>
+            <a:r>
+              <a:rPr lang="fr-FR" dirty="0" smtClean="0">
+                <a:solidFill>
+                  <a:srgbClr val="E8750C"/>
+                </a:solidFill>
+              </a:rPr>
+              <a:t>Mise en place d’une API</a:t>
+            </a:r>
+            <a:endParaRPr lang="fr-FR" dirty="0">
+              <a:solidFill>
+                <a:srgbClr val="E8750C"/>
+              </a:solidFill>
+            </a:endParaRPr>
+          </a:p>
+          <a:p>
+            <a:endParaRPr lang="fr-FR" dirty="0" smtClean="0">
+              <a:solidFill>
+                <a:srgbClr val="E8750C"/>
+              </a:solidFill>
+            </a:endParaRPr>
+          </a:p>
+          <a:p>
+            <a:r>
+              <a:rPr lang="fr-FR" dirty="0" smtClean="0">
+                <a:solidFill>
+                  <a:srgbClr val="E8750C"/>
+                </a:solidFill>
+              </a:rPr>
+              <a:t>Présentation</a:t>
+            </a:r>
+            <a:endParaRPr lang="fr-FR" dirty="0">
+              <a:solidFill>
+                <a:srgbClr val="E8750C"/>
+              </a:solidFill>
+            </a:endParaRPr>
+          </a:p>
+          <a:p>
+            <a:pPr lvl="1"/>
+            <a:r>
+              <a:rPr lang="fr-FR" dirty="0">
+                <a:solidFill>
+                  <a:srgbClr val="E8750C"/>
+                </a:solidFill>
+              </a:rPr>
+              <a:t>Basé sur </a:t>
+            </a:r>
+            <a:r>
+              <a:rPr lang="fr-FR" dirty="0" smtClean="0">
+                <a:solidFill>
+                  <a:srgbClr val="E8750C"/>
+                </a:solidFill>
+              </a:rPr>
+              <a:t>un dataset labélisé de photos de chiens</a:t>
+            </a:r>
+            <a:endParaRPr lang="fr-FR" dirty="0">
+              <a:solidFill>
+                <a:srgbClr val="E8750C"/>
+              </a:solidFill>
+            </a:endParaRPr>
+          </a:p>
+          <a:p>
+            <a:pPr lvl="1"/>
+            <a:r>
+              <a:rPr lang="fr-FR" dirty="0">
+                <a:solidFill>
+                  <a:srgbClr val="E8750C"/>
+                </a:solidFill>
+              </a:rPr>
+              <a:t>Traitement </a:t>
+            </a:r>
+            <a:r>
+              <a:rPr lang="fr-FR" dirty="0" smtClean="0">
+                <a:solidFill>
+                  <a:srgbClr val="E8750C"/>
+                </a:solidFill>
+              </a:rPr>
+              <a:t>d’images</a:t>
+            </a:r>
+            <a:endParaRPr lang="fr-FR" dirty="0">
+              <a:solidFill>
+                <a:srgbClr val="E8750C"/>
+              </a:solidFill>
+            </a:endParaRPr>
+          </a:p>
+        </p:txBody>
+      </p:sp>
+      <p:sp>
+        <p:nvSpPr>
+          <p:cNvPr id="4" name="Espace réservé de la date 3"/>
+          <p:cNvSpPr>
+            <a:spLocks noGrp="1"/>
+          </p:cNvSpPr>
+          <p:nvPr>
+            <p:ph type="dt" sz="half" idx="10"/>
+          </p:nvPr>
+        </p:nvSpPr>
+        <p:spPr/>
+        <p:txBody>
+          <a:bodyPr/>
+          <a:lstStyle/>
+          <a:p>
+            <a:fld id="{30547005-2CCE-4AAF-810C-C33FB4661996}" type="datetime1">
+              <a:rPr lang="fr-FR" smtClean="0"/>
+              <a:t>21/01/2018</a:t>
+            </a:fld>
+            <a:endParaRPr lang="fr-FR"/>
+          </a:p>
+        </p:txBody>
+      </p:sp>
+      <p:sp>
+        <p:nvSpPr>
+          <p:cNvPr id="5" name="Espace réservé du pied de page 4"/>
+          <p:cNvSpPr>
+            <a:spLocks noGrp="1"/>
+          </p:cNvSpPr>
+          <p:nvPr>
+            <p:ph type="ftr" sz="quarter" idx="11"/>
+          </p:nvPr>
+        </p:nvSpPr>
+        <p:spPr/>
+        <p:txBody>
+          <a:bodyPr/>
+          <a:lstStyle/>
+          <a:p>
+            <a:r>
+              <a:rPr lang="fr-FR" dirty="0" smtClean="0"/>
+              <a:t>MINE Nicolas</a:t>
+            </a:r>
+            <a:endParaRPr lang="fr-FR" dirty="0"/>
+          </a:p>
+        </p:txBody>
+      </p:sp>
+    </p:spTree>
+    <p:extLst>
+      <p:ext uri="{BB962C8B-B14F-4D97-AF65-F5344CB8AC3E}">
+        <p14:creationId xmlns:p14="http://schemas.microsoft.com/office/powerpoint/2010/main" val="1742707197"/>
+      </p:ext>
+    </p:extLst>
+  </p:cSld>
+  <p:clrMapOvr>
+    <a:masterClrMapping/>
+  </p:clrMapOvr>
+  <p:timing>
+    <p:tnLst>
+      <p:par>
+        <p:cTn id="1" dur="indefinite" restart="never" nodeType="tmRoot"/>
+      </p:par>
+    </p:tnLst>
+  </p:timing>
+</p:sld>
+</file>
+
+<file path=ppt/slides/slide30.xml><?xml version="1.0" encoding="utf-8"?>
+<p:sld xmlns:a="http://schemas.openxmlformats.org/drawingml/2006/main" xmlns:r="http://schemas.openxmlformats.org/officeDocument/2006/relationships" xmlns:p="http://schemas.openxmlformats.org/presentationml/2006/main">
+  <p:cSld>
+    <p:spTree>
+      <p:nvGrpSpPr>
+        <p:cNvPr id="1" name=""/>
+        <p:cNvGrpSpPr/>
+        <p:nvPr/>
+      </p:nvGrpSpPr>
+      <p:grpSpPr>
+        <a:xfrm>
+          <a:off x="0" y="0"/>
+          <a:ext cx="0" cy="0"/>
+          <a:chOff x="0" y="0"/>
+          <a:chExt cx="0" cy="0"/>
+        </a:xfrm>
+      </p:grpSpPr>
+      <p:sp>
+        <p:nvSpPr>
+          <p:cNvPr id="2" name="Titre 1"/>
+          <p:cNvSpPr>
+            <a:spLocks noGrp="1"/>
+          </p:cNvSpPr>
+          <p:nvPr>
+            <p:ph type="title"/>
+          </p:nvPr>
+        </p:nvSpPr>
+        <p:spPr/>
+        <p:txBody>
+          <a:bodyPr>
+            <a:normAutofit/>
+          </a:bodyPr>
+          <a:lstStyle/>
+          <a:p>
+            <a:r>
+              <a:rPr lang="fr-FR" dirty="0"/>
+              <a:t>Pistes d’évolutions</a:t>
+            </a:r>
+          </a:p>
+        </p:txBody>
+      </p:sp>
+      <p:sp>
+        <p:nvSpPr>
+          <p:cNvPr id="3" name="Espace réservé du contenu 2"/>
+          <p:cNvSpPr>
+            <a:spLocks noGrp="1"/>
+          </p:cNvSpPr>
+          <p:nvPr>
+            <p:ph idx="1"/>
+          </p:nvPr>
+        </p:nvSpPr>
+        <p:spPr>
+          <a:xfrm>
+            <a:off x="457200" y="1600200"/>
+            <a:ext cx="8229600" cy="4709120"/>
+          </a:xfrm>
+        </p:spPr>
+        <p:txBody>
+          <a:bodyPr>
+            <a:normAutofit/>
+          </a:bodyPr>
+          <a:lstStyle/>
+          <a:p>
+            <a:r>
+              <a:rPr lang="fr-FR" dirty="0" smtClean="0">
+                <a:solidFill>
+                  <a:srgbClr val="E8750C"/>
+                </a:solidFill>
+              </a:rPr>
+              <a:t>Analyse de l’</a:t>
+            </a:r>
+            <a:r>
+              <a:rPr lang="fr-FR" dirty="0" err="1" smtClean="0">
+                <a:solidFill>
+                  <a:srgbClr val="E8750C"/>
+                </a:solidFill>
+              </a:rPr>
+              <a:t>overfitting</a:t>
+            </a:r>
+            <a:endParaRPr lang="fr-FR" dirty="0" smtClean="0">
+              <a:solidFill>
+                <a:srgbClr val="E8750C"/>
+              </a:solidFill>
+            </a:endParaRPr>
+          </a:p>
+          <a:p>
+            <a:pPr lvl="1"/>
+            <a:r>
+              <a:rPr lang="fr-FR" sz="2400" dirty="0">
+                <a:solidFill>
+                  <a:srgbClr val="E8750C"/>
+                </a:solidFill>
+              </a:rPr>
+              <a:t>Class Activation </a:t>
+            </a:r>
+            <a:r>
+              <a:rPr lang="fr-FR" sz="2400" dirty="0" err="1" smtClean="0">
+                <a:solidFill>
+                  <a:srgbClr val="E8750C"/>
+                </a:solidFill>
+              </a:rPr>
+              <a:t>Mapping</a:t>
+            </a:r>
+            <a:endParaRPr lang="fr-FR" sz="2400" dirty="0" smtClean="0">
+              <a:solidFill>
+                <a:srgbClr val="E8750C"/>
+              </a:solidFill>
+            </a:endParaRPr>
+          </a:p>
+          <a:p>
+            <a:pPr lvl="2"/>
+            <a:r>
+              <a:rPr lang="fr-FR" dirty="0" smtClean="0">
+                <a:solidFill>
+                  <a:srgbClr val="E8750C"/>
+                </a:solidFill>
+              </a:rPr>
+              <a:t>Possible sur VGG et </a:t>
+            </a:r>
+            <a:r>
+              <a:rPr lang="fr-FR" dirty="0" err="1" smtClean="0">
+                <a:solidFill>
+                  <a:srgbClr val="E8750C"/>
+                </a:solidFill>
+              </a:rPr>
+              <a:t>MobileNet</a:t>
+            </a:r>
+            <a:endParaRPr lang="fr-FR" dirty="0">
+              <a:solidFill>
+                <a:srgbClr val="E8750C"/>
+              </a:solidFill>
+            </a:endParaRPr>
+          </a:p>
+          <a:p>
+            <a:pPr lvl="2"/>
+            <a:r>
+              <a:rPr lang="fr-FR" dirty="0" smtClean="0">
+                <a:solidFill>
+                  <a:srgbClr val="E8750C"/>
+                </a:solidFill>
+              </a:rPr>
+              <a:t>Pas de classifieur Customisé</a:t>
+            </a:r>
+          </a:p>
+          <a:p>
+            <a:pPr lvl="2"/>
+            <a:r>
+              <a:rPr lang="fr-FR" dirty="0" smtClean="0">
+                <a:solidFill>
+                  <a:srgbClr val="E8750C"/>
+                </a:solidFill>
+              </a:rPr>
+              <a:t>Remonte le réseau pour l’analyse</a:t>
+            </a:r>
+            <a:endParaRPr lang="fr-FR" dirty="0">
+              <a:solidFill>
+                <a:srgbClr val="E8750C"/>
+              </a:solidFill>
+            </a:endParaRPr>
+          </a:p>
+          <a:p>
+            <a:pPr lvl="1"/>
+            <a:endParaRPr lang="fr-FR" sz="2400" dirty="0">
+              <a:solidFill>
+                <a:srgbClr val="E8750C"/>
+              </a:solidFill>
+            </a:endParaRPr>
+          </a:p>
+        </p:txBody>
+      </p:sp>
+      <p:sp>
+        <p:nvSpPr>
+          <p:cNvPr id="4" name="Espace réservé de la date 3"/>
+          <p:cNvSpPr>
+            <a:spLocks noGrp="1"/>
+          </p:cNvSpPr>
+          <p:nvPr>
+            <p:ph type="dt" sz="half" idx="10"/>
+          </p:nvPr>
+        </p:nvSpPr>
+        <p:spPr/>
+        <p:txBody>
+          <a:bodyPr/>
+          <a:lstStyle/>
+          <a:p>
+            <a:fld id="{30547005-2CCE-4AAF-810C-C33FB4661996}" type="datetime1">
+              <a:rPr lang="fr-FR" smtClean="0"/>
+              <a:t>21/01/2018</a:t>
             </a:fld>
             <a:endParaRPr lang="fr-FR"/>
           </a:p>
@@ -11571,7 +11864,7 @@
 </p:sld>
 </file>
 
-<file path=ppt/slides/slide3.xml><?xml version="1.0" encoding="utf-8"?>
+<file path=ppt/slides/slide31.xml><?xml version="1.0" encoding="utf-8"?>
 <p:sld xmlns:a="http://schemas.openxmlformats.org/drawingml/2006/main" xmlns:r="http://schemas.openxmlformats.org/officeDocument/2006/relationships" xmlns:p="http://schemas.openxmlformats.org/presentationml/2006/main">
   <p:cSld>
     <p:spTree>
@@ -11607,186 +11900,8 @@
           <a:p>
             <a:r>
               <a:rPr lang="fr-FR" dirty="0"/>
-              <a:t>Présentation et </a:t>
-            </a:r>
-            <a:r>
-              <a:rPr lang="fr-FR" dirty="0" smtClean="0"/>
-              <a:t>Objectifs</a:t>
-            </a:r>
-            <a:endParaRPr lang="fr-FR" dirty="0"/>
-          </a:p>
-        </p:txBody>
-      </p:sp>
-      <p:sp>
-        <p:nvSpPr>
-          <p:cNvPr id="3" name="Espace réservé du contenu 2"/>
-          <p:cNvSpPr>
-            <a:spLocks noGrp="1"/>
-          </p:cNvSpPr>
-          <p:nvPr>
-            <p:ph idx="1"/>
-          </p:nvPr>
-        </p:nvSpPr>
-        <p:spPr/>
-        <p:txBody>
-          <a:bodyPr>
-            <a:normAutofit fontScale="92500"/>
-          </a:bodyPr>
-          <a:lstStyle/>
-          <a:p>
-            <a:r>
-              <a:rPr lang="fr-FR" dirty="0" smtClean="0">
-                <a:solidFill>
-                  <a:srgbClr val="E8750C"/>
-                </a:solidFill>
-              </a:rPr>
-              <a:t>Objectifs</a:t>
-            </a:r>
-          </a:p>
-          <a:p>
-            <a:pPr lvl="1"/>
-            <a:r>
-              <a:rPr lang="fr-FR" dirty="0">
-                <a:solidFill>
-                  <a:srgbClr val="E8750C"/>
-                </a:solidFill>
-              </a:rPr>
-              <a:t>Prédiction </a:t>
-            </a:r>
-            <a:r>
-              <a:rPr lang="fr-FR" dirty="0" smtClean="0">
-                <a:solidFill>
-                  <a:srgbClr val="E8750C"/>
-                </a:solidFill>
-              </a:rPr>
-              <a:t>de la Race d’un chien sur une image</a:t>
-            </a:r>
-            <a:endParaRPr lang="fr-FR" dirty="0">
-              <a:solidFill>
-                <a:srgbClr val="E8750C"/>
-              </a:solidFill>
-            </a:endParaRPr>
-          </a:p>
-          <a:p>
-            <a:pPr lvl="2"/>
-            <a:r>
-              <a:rPr lang="fr-FR" dirty="0">
-                <a:solidFill>
-                  <a:srgbClr val="E8750C"/>
-                </a:solidFill>
-              </a:rPr>
-              <a:t>Méthode </a:t>
-            </a:r>
-            <a:r>
-              <a:rPr lang="fr-FR" dirty="0" smtClean="0">
-                <a:solidFill>
-                  <a:srgbClr val="E8750C"/>
-                </a:solidFill>
-              </a:rPr>
-              <a:t>Classique</a:t>
-            </a:r>
-            <a:endParaRPr lang="fr-FR" dirty="0">
-              <a:solidFill>
-                <a:srgbClr val="E8750C"/>
-              </a:solidFill>
-            </a:endParaRPr>
-          </a:p>
-          <a:p>
-            <a:pPr lvl="2"/>
-            <a:r>
-              <a:rPr lang="fr-FR" dirty="0" smtClean="0">
-                <a:solidFill>
-                  <a:srgbClr val="E8750C"/>
-                </a:solidFill>
-              </a:rPr>
-              <a:t>Réseaux de Neurones</a:t>
-            </a:r>
-          </a:p>
-          <a:p>
-            <a:pPr lvl="1"/>
-            <a:r>
-              <a:rPr lang="fr-FR" dirty="0" smtClean="0">
-                <a:solidFill>
-                  <a:srgbClr val="E8750C"/>
-                </a:solidFill>
-              </a:rPr>
-              <a:t>Mise en place d’une API</a:t>
-            </a:r>
-            <a:endParaRPr lang="fr-FR" dirty="0">
-              <a:solidFill>
-                <a:srgbClr val="E8750C"/>
-              </a:solidFill>
-            </a:endParaRPr>
-          </a:p>
-          <a:p>
-            <a:endParaRPr lang="fr-FR" dirty="0" smtClean="0">
-              <a:solidFill>
-                <a:srgbClr val="E8750C"/>
-              </a:solidFill>
-            </a:endParaRPr>
-          </a:p>
-          <a:p>
-            <a:r>
-              <a:rPr lang="fr-FR" dirty="0" smtClean="0">
-                <a:solidFill>
-                  <a:srgbClr val="E8750C"/>
-                </a:solidFill>
-              </a:rPr>
-              <a:t>Présentation</a:t>
-            </a:r>
-            <a:endParaRPr lang="fr-FR" dirty="0">
-              <a:solidFill>
-                <a:srgbClr val="E8750C"/>
-              </a:solidFill>
-            </a:endParaRPr>
-          </a:p>
-          <a:p>
-            <a:pPr lvl="1"/>
-            <a:r>
-              <a:rPr lang="fr-FR" dirty="0">
-                <a:solidFill>
-                  <a:srgbClr val="E8750C"/>
-                </a:solidFill>
-              </a:rPr>
-              <a:t>Basé sur </a:t>
-            </a:r>
-            <a:r>
-              <a:rPr lang="fr-FR" dirty="0" smtClean="0">
-                <a:solidFill>
-                  <a:srgbClr val="E8750C"/>
-                </a:solidFill>
-              </a:rPr>
-              <a:t>un dataset labélisé de photos de chiens</a:t>
-            </a:r>
-            <a:endParaRPr lang="fr-FR" dirty="0">
-              <a:solidFill>
-                <a:srgbClr val="E8750C"/>
-              </a:solidFill>
-            </a:endParaRPr>
-          </a:p>
-          <a:p>
-            <a:pPr lvl="1"/>
-            <a:r>
-              <a:rPr lang="fr-FR" dirty="0">
-                <a:solidFill>
-                  <a:srgbClr val="E8750C"/>
-                </a:solidFill>
-              </a:rPr>
-              <a:t>Traitement </a:t>
-            </a:r>
-            <a:r>
-              <a:rPr lang="fr-FR" dirty="0" smtClean="0">
-                <a:solidFill>
-                  <a:srgbClr val="E8750C"/>
-                </a:solidFill>
-              </a:rPr>
-              <a:t>d’images</a:t>
-            </a:r>
-            <a:endParaRPr lang="fr-FR" dirty="0">
-              <a:solidFill>
-                <a:srgbClr val="E8750C"/>
-              </a:solidFill>
-            </a:endParaRPr>
+              <a:t>Pistes d’évolutions</a:t>
+            </a:r>
           </a:p>
         </p:txBody>
       </p:sp>
@@ -11807,114 +11922,7 @@
           <a:p>
             <a:fld id="{30547005-2CCE-4AAF-810C-C33FB4661996}" type="datetime1">
               <a:rPr lang="fr-FR" smtClean="0"/>
-              <a:t>18/01/2018</a:t>
-            </a:fld>
-            <a:endParaRPr lang="fr-FR"/>
-          </a:p>
-        </p:txBody>
-      </p:sp>
-      <p:sp>
-        <p:nvSpPr>
-          <p:cNvPr id="5" name="Espace réservé du pied de page 4"/>
-          <p:cNvSpPr>
-            <a:spLocks noGrp="1"/>
-          </p:cNvSpPr>
-          <p:nvPr>
-            <p:ph type="ftr" sz="quarter" idx="11"/>
-          </p:nvPr>
-        </p:nvSpPr>
-        <p:spPr/>
-        <p:txBody>
-          <a:bodyPr/>
-          <a:lstStyle/>
-          <a:p>
-            <a:r>
-              <a:rPr lang="fr-FR" dirty="0" smtClean="0"/>
-              <a:t>MINE Nicolas</a:t>
-            </a:r>
-            <a:endParaRPr lang="fr-FR" dirty="0"/>
-          </a:p>
-        </p:txBody>
-      </p:sp>
-    </p:spTree>
-    <p:extLst>
-      <p:ext uri="{BB962C8B-B14F-4D97-AF65-F5344CB8AC3E}">
-        <p14:creationId xmlns:p14="http://schemas.microsoft.com/office/powerpoint/2010/main" val="1742707197"/>
-      </p:ext>
-    </p:extLst>
-  </p:cSld>
-  <p:clrMapOvr>
-    <a:masterClrMapping/>
-  </p:clrMapOvr>
-  <p:timing>
-    <p:tnLst>
-      <p:par>
-        <p:cTn id="1" dur="indefinite" restart="never" nodeType="tmRoot"/>
-      </p:par>
-    </p:tnLst>
-  </p:timing>
-</p:sld>
-</file>
-
-<file path=ppt/slides/slide30.xml><?xml version="1.0" encoding="utf-8"?>
-<p:sld xmlns:a="http://schemas.openxmlformats.org/drawingml/2006/main" xmlns:r="http://schemas.openxmlformats.org/officeDocument/2006/relationships" xmlns:p="http://schemas.openxmlformats.org/presentationml/2006/main">
-  <p:cSld>
-    <p:spTree>
-      <p:nvGrpSpPr>
-        <p:cNvPr id="1" name=""/>
-        <p:cNvGrpSpPr/>
-        <p:nvPr/>
-      </p:nvGrpSpPr>
-      <p:grpSpPr>
-        <a:xfrm>
-          <a:off x="0" y="0"/>
-          <a:ext cx="0" cy="0"/>
-          <a:chOff x="0" y="0"/>
-          <a:chExt cx="0" cy="0"/>
-        </a:xfrm>
-      </p:grpSpPr>
-      <p:sp>
-        <p:nvSpPr>
-          <p:cNvPr id="2" name="Titre 1"/>
-          <p:cNvSpPr>
-            <a:spLocks noGrp="1"/>
-          </p:cNvSpPr>
-          <p:nvPr>
-            <p:ph type="title"/>
-          </p:nvPr>
-        </p:nvSpPr>
-        <p:spPr/>
-        <p:txBody>
-          <a:bodyPr>
-            <a:normAutofit/>
-          </a:bodyPr>
-          <a:lstStyle/>
-          <a:p>
-            <a:r>
-              <a:rPr lang="fr-FR" dirty="0"/>
-              <a:t>Pistes d’évolutions</a:t>
-            </a:r>
-          </a:p>
-        </p:txBody>
-      </p:sp>
-      <p:sp>
-        <p:nvSpPr>
-          <p:cNvPr id="4" name="Espace réservé de la date 3"/>
-          <p:cNvSpPr>
-            <a:spLocks noGrp="1"/>
-          </p:cNvSpPr>
-          <p:nvPr>
-            <p:ph type="dt" sz="half" idx="10"/>
-          </p:nvPr>
-        </p:nvSpPr>
-        <p:spPr/>
-        <p:txBody>
-          <a:bodyPr/>
-          <a:lstStyle/>
-          <a:p>
-            <a:fld id="{30547005-2CCE-4AAF-810C-C33FB4661996}" type="datetime1">
-              <a:rPr lang="fr-FR" smtClean="0"/>
-              <a:t>18/01/2018</a:t>
+              <a:t>21/01/2018</a:t>
             </a:fld>
             <a:endParaRPr lang="fr-FR"/>
           </a:p>
@@ -12004,7 +12012,7 @@
 </p:sld>
 </file>
 
-<file path=ppt/slides/slide31.xml><?xml version="1.0" encoding="utf-8"?>
+<file path=ppt/slides/slide32.xml><?xml version="1.0" encoding="utf-8"?>
 <p:sld xmlns:a="http://schemas.openxmlformats.org/drawingml/2006/main" xmlns:r="http://schemas.openxmlformats.org/officeDocument/2006/relationships" xmlns:p="http://schemas.openxmlformats.org/presentationml/2006/main">
   <p:cSld>
     <p:spTree>
@@ -12174,7 +12182,7 @@
           <a:p>
             <a:fld id="{30547005-2CCE-4AAF-810C-C33FB4661996}" type="datetime1">
               <a:rPr lang="fr-FR" smtClean="0"/>
-              <a:t>18/01/2018</a:t>
+              <a:t>21/01/2018</a:t>
             </a:fld>
             <a:endParaRPr lang="fr-FR"/>
           </a:p>
@@ -12223,7 +12231,7 @@
 </p:sld>
 </file>
 
-<file path=ppt/slides/slide32.xml><?xml version="1.0" encoding="utf-8"?>
+<file path=ppt/slides/slide33.xml><?xml version="1.0" encoding="utf-8"?>
 <p:sld xmlns:a="http://schemas.openxmlformats.org/drawingml/2006/main" xmlns:r="http://schemas.openxmlformats.org/officeDocument/2006/relationships" xmlns:p="http://schemas.openxmlformats.org/presentationml/2006/main">
   <p:cSld>
     <p:spTree>
@@ -12257,7 +12265,7 @@
           <a:p>
             <a:fld id="{30547005-2CCE-4AAF-810C-C33FB4661996}" type="datetime1">
               <a:rPr lang="fr-FR" smtClean="0"/>
-              <a:t>18/01/2018</a:t>
+              <a:t>21/01/2018</a:t>
             </a:fld>
             <a:endParaRPr lang="fr-FR"/>
           </a:p>
@@ -12587,7 +12595,7 @@
           <a:p>
             <a:fld id="{30547005-2CCE-4AAF-810C-C33FB4661996}" type="datetime1">
               <a:rPr lang="fr-FR" smtClean="0"/>
-              <a:t>18/01/2018</a:t>
+              <a:t>21/01/2018</a:t>
             </a:fld>
             <a:endParaRPr lang="fr-FR"/>
           </a:p>
@@ -12764,7 +12772,7 @@
           <a:p>
             <a:fld id="{30547005-2CCE-4AAF-810C-C33FB4661996}" type="datetime1">
               <a:rPr lang="fr-FR" smtClean="0"/>
-              <a:t>18/01/2018</a:t>
+              <a:t>21/01/2018</a:t>
             </a:fld>
             <a:endParaRPr lang="fr-FR"/>
           </a:p>
@@ -13031,7 +13039,7 @@
           <a:p>
             <a:fld id="{30547005-2CCE-4AAF-810C-C33FB4661996}" type="datetime1">
               <a:rPr lang="fr-FR" smtClean="0"/>
-              <a:t>18/01/2018</a:t>
+              <a:t>21/01/2018</a:t>
             </a:fld>
             <a:endParaRPr lang="fr-FR"/>
           </a:p>
@@ -13293,7 +13301,7 @@
           <a:p>
             <a:fld id="{30547005-2CCE-4AAF-810C-C33FB4661996}" type="datetime1">
               <a:rPr lang="fr-FR" smtClean="0"/>
-              <a:t>18/01/2018</a:t>
+              <a:t>21/01/2018</a:t>
             </a:fld>
             <a:endParaRPr lang="fr-FR"/>
           </a:p>
@@ -13590,7 +13598,7 @@
           <a:p>
             <a:fld id="{30547005-2CCE-4AAF-810C-C33FB4661996}" type="datetime1">
               <a:rPr lang="fr-FR" smtClean="0"/>
-              <a:t>18/01/2018</a:t>
+              <a:t>21/01/2018</a:t>
             </a:fld>
             <a:endParaRPr lang="fr-FR"/>
           </a:p>
@@ -13824,11 +13832,6 @@
               </a:rPr>
               <a:t>Extraire les points facilement « détectables »</a:t>
             </a:r>
-            <a:endParaRPr lang="fr-FR" dirty="0" smtClean="0">
-              <a:solidFill>
-                <a:srgbClr val="E8750C"/>
-              </a:solidFill>
-            </a:endParaRPr>
           </a:p>
         </p:txBody>
       </p:sp>
@@ -13849,7 +13852,7 @@
           <a:p>
             <a:fld id="{30547005-2CCE-4AAF-810C-C33FB4661996}" type="datetime1">
               <a:rPr lang="fr-FR" smtClean="0"/>
-              <a:t>18/01/2018</a:t>
+              <a:t>21/01/2018</a:t>
             </a:fld>
             <a:endParaRPr lang="fr-FR"/>
           </a:p>

</xml_diff>